<commit_message>
Updates, mostly minor, but one big change:  there's a whole new section on conversion factors.
</commit_message>
<xml_diff>
--- a/sbml-level-3/version-1/comp/Submodel.pptx
+++ b/sbml-level-3/version-1/comp/Submodel.pptx
@@ -192,7 +192,7 @@
           <a:p>
             <a:fld id="{7754A941-C6C2-4027-B1F4-A5E937B2245F}" type="datetimeFigureOut">
               <a:rPr lang="en-US" smtClean="0"/>
-              <a:t>9/28/2010</a:t>
+              <a:t>9/30/2010</a:t>
             </a:fld>
             <a:endParaRPr lang="en-US"/>
           </a:p>
@@ -730,7 +730,7 @@
           <a:p>
             <a:fld id="{F0172217-DC24-48CD-AE89-68C8C8D878B4}" type="datetimeFigureOut">
               <a:rPr lang="en-US" smtClean="0"/>
-              <a:t>9/28/2010</a:t>
+              <a:t>9/30/2010</a:t>
             </a:fld>
             <a:endParaRPr lang="en-US"/>
           </a:p>
@@ -900,7 +900,7 @@
           <a:p>
             <a:fld id="{F0172217-DC24-48CD-AE89-68C8C8D878B4}" type="datetimeFigureOut">
               <a:rPr lang="en-US" smtClean="0"/>
-              <a:t>9/28/2010</a:t>
+              <a:t>9/30/2010</a:t>
             </a:fld>
             <a:endParaRPr lang="en-US"/>
           </a:p>
@@ -1080,7 +1080,7 @@
           <a:p>
             <a:fld id="{F0172217-DC24-48CD-AE89-68C8C8D878B4}" type="datetimeFigureOut">
               <a:rPr lang="en-US" smtClean="0"/>
-              <a:t>9/28/2010</a:t>
+              <a:t>9/30/2010</a:t>
             </a:fld>
             <a:endParaRPr lang="en-US"/>
           </a:p>
@@ -1250,7 +1250,7 @@
           <a:p>
             <a:fld id="{F0172217-DC24-48CD-AE89-68C8C8D878B4}" type="datetimeFigureOut">
               <a:rPr lang="en-US" smtClean="0"/>
-              <a:t>9/28/2010</a:t>
+              <a:t>9/30/2010</a:t>
             </a:fld>
             <a:endParaRPr lang="en-US"/>
           </a:p>
@@ -1496,7 +1496,7 @@
           <a:p>
             <a:fld id="{F0172217-DC24-48CD-AE89-68C8C8D878B4}" type="datetimeFigureOut">
               <a:rPr lang="en-US" smtClean="0"/>
-              <a:t>9/28/2010</a:t>
+              <a:t>9/30/2010</a:t>
             </a:fld>
             <a:endParaRPr lang="en-US"/>
           </a:p>
@@ -1784,7 +1784,7 @@
           <a:p>
             <a:fld id="{F0172217-DC24-48CD-AE89-68C8C8D878B4}" type="datetimeFigureOut">
               <a:rPr lang="en-US" smtClean="0"/>
-              <a:t>9/28/2010</a:t>
+              <a:t>9/30/2010</a:t>
             </a:fld>
             <a:endParaRPr lang="en-US"/>
           </a:p>
@@ -2206,7 +2206,7 @@
           <a:p>
             <a:fld id="{F0172217-DC24-48CD-AE89-68C8C8D878B4}" type="datetimeFigureOut">
               <a:rPr lang="en-US" smtClean="0"/>
-              <a:t>9/28/2010</a:t>
+              <a:t>9/30/2010</a:t>
             </a:fld>
             <a:endParaRPr lang="en-US"/>
           </a:p>
@@ -2324,7 +2324,7 @@
           <a:p>
             <a:fld id="{F0172217-DC24-48CD-AE89-68C8C8D878B4}" type="datetimeFigureOut">
               <a:rPr lang="en-US" smtClean="0"/>
-              <a:t>9/28/2010</a:t>
+              <a:t>9/30/2010</a:t>
             </a:fld>
             <a:endParaRPr lang="en-US"/>
           </a:p>
@@ -2419,7 +2419,7 @@
           <a:p>
             <a:fld id="{F0172217-DC24-48CD-AE89-68C8C8D878B4}" type="datetimeFigureOut">
               <a:rPr lang="en-US" smtClean="0"/>
-              <a:t>9/28/2010</a:t>
+              <a:t>9/30/2010</a:t>
             </a:fld>
             <a:endParaRPr lang="en-US"/>
           </a:p>
@@ -2696,7 +2696,7 @@
           <a:p>
             <a:fld id="{F0172217-DC24-48CD-AE89-68C8C8D878B4}" type="datetimeFigureOut">
               <a:rPr lang="en-US" smtClean="0"/>
-              <a:t>9/28/2010</a:t>
+              <a:t>9/30/2010</a:t>
             </a:fld>
             <a:endParaRPr lang="en-US"/>
           </a:p>
@@ -2949,7 +2949,7 @@
           <a:p>
             <a:fld id="{F0172217-DC24-48CD-AE89-68C8C8D878B4}" type="datetimeFigureOut">
               <a:rPr lang="en-US" smtClean="0"/>
-              <a:t>9/28/2010</a:t>
+              <a:t>9/30/2010</a:t>
             </a:fld>
             <a:endParaRPr lang="en-US"/>
           </a:p>
@@ -3162,7 +3162,7 @@
           <a:p>
             <a:fld id="{F0172217-DC24-48CD-AE89-68C8C8D878B4}" type="datetimeFigureOut">
               <a:rPr lang="en-US" smtClean="0"/>
-              <a:t>9/28/2010</a:t>
+              <a:t>9/30/2010</a:t>
             </a:fld>
             <a:endParaRPr lang="en-US"/>
           </a:p>
@@ -3537,1315 +3537,1002 @@
           <a:chExt cx="0" cy="0"/>
         </a:xfrm>
       </p:grpSpPr>
+      <p:cxnSp>
+        <p:nvCxnSpPr>
+          <p:cNvPr id="31" name="Straight Connector 30"/>
+          <p:cNvCxnSpPr/>
+          <p:nvPr/>
+        </p:nvCxnSpPr>
+        <p:spPr>
+          <a:xfrm>
+            <a:off x="91207" y="285229"/>
+            <a:ext cx="2764770" cy="0"/>
+          </a:xfrm>
+          <a:prstGeom prst="line">
+            <a:avLst/>
+          </a:prstGeom>
+          <a:ln w="6350">
+            <a:solidFill>
+              <a:srgbClr val="0070C0"/>
+            </a:solidFill>
+          </a:ln>
+        </p:spPr>
+        <p:style>
+          <a:lnRef idx="1">
+            <a:schemeClr val="accent1"/>
+          </a:lnRef>
+          <a:fillRef idx="0">
+            <a:schemeClr val="accent1"/>
+          </a:fillRef>
+          <a:effectRef idx="0">
+            <a:schemeClr val="accent1"/>
+          </a:effectRef>
+          <a:fontRef idx="minor">
+            <a:schemeClr val="tx1"/>
+          </a:fontRef>
+        </p:style>
+      </p:cxnSp>
+      <p:sp>
+        <p:nvSpPr>
+          <p:cNvPr id="33" name="Rectangle 32"/>
+          <p:cNvSpPr/>
+          <p:nvPr/>
+        </p:nvSpPr>
+        <p:spPr>
+          <a:xfrm>
+            <a:off x="91207" y="84619"/>
+            <a:ext cx="2764770" cy="1174265"/>
+          </a:xfrm>
+          <a:prstGeom prst="rect">
+            <a:avLst/>
+          </a:prstGeom>
+          <a:noFill/>
+          <a:ln w="6350">
+            <a:solidFill>
+              <a:srgbClr val="0070C0"/>
+            </a:solidFill>
+          </a:ln>
+        </p:spPr>
+        <p:style>
+          <a:lnRef idx="2">
+            <a:schemeClr val="accent1">
+              <a:shade val="50000"/>
+            </a:schemeClr>
+          </a:lnRef>
+          <a:fillRef idx="1">
+            <a:schemeClr val="accent1"/>
+          </a:fillRef>
+          <a:effectRef idx="0">
+            <a:schemeClr val="accent1"/>
+          </a:effectRef>
+          <a:fontRef idx="minor">
+            <a:schemeClr val="lt1"/>
+          </a:fontRef>
+        </p:style>
+        <p:txBody>
+          <a:bodyPr rtlCol="0" anchor="t"/>
+          <a:lstStyle/>
+          <a:p>
+            <a:pPr algn="ctr"/>
+            <a:r>
+              <a:rPr lang="en-US" sz="1100" b="1" dirty="0" smtClean="0">
+                <a:solidFill>
+                  <a:srgbClr val="0070C0"/>
+                </a:solidFill>
+              </a:rPr>
+              <a:t>Submodel</a:t>
+            </a:r>
+            <a:endParaRPr lang="en-US" sz="1100" b="1" dirty="0">
+              <a:solidFill>
+                <a:srgbClr val="0070C0"/>
+              </a:solidFill>
+            </a:endParaRPr>
+          </a:p>
+          <a:p>
+            <a:r>
+              <a:rPr lang="en-US" sz="900" dirty="0" smtClean="0">
+                <a:solidFill>
+                  <a:srgbClr val="0070C0"/>
+                </a:solidFill>
+              </a:rPr>
+              <a:t>id: </a:t>
+            </a:r>
+            <a:r>
+              <a:rPr lang="en-US" sz="900" dirty="0" err="1" smtClean="0">
+                <a:solidFill>
+                  <a:srgbClr val="0070C0"/>
+                </a:solidFill>
+              </a:rPr>
+              <a:t>SId</a:t>
+            </a:r>
+            <a:r>
+              <a:rPr lang="en-US" sz="900" dirty="0" smtClean="0">
+                <a:solidFill>
+                  <a:srgbClr val="0070C0"/>
+                </a:solidFill>
+              </a:rPr>
+              <a:t> {use=“optional”}</a:t>
+            </a:r>
+          </a:p>
+          <a:p>
+            <a:r>
+              <a:rPr lang="en-US" sz="900" dirty="0" err="1">
+                <a:solidFill>
+                  <a:srgbClr val="0070C0"/>
+                </a:solidFill>
+              </a:rPr>
+              <a:t>lengthConversionFactor</a:t>
+            </a:r>
+            <a:r>
+              <a:rPr lang="en-US" sz="900" dirty="0">
+                <a:solidFill>
+                  <a:srgbClr val="0070C0"/>
+                </a:solidFill>
+              </a:rPr>
+              <a:t>: </a:t>
+            </a:r>
+            <a:r>
+              <a:rPr lang="en-US" sz="900" dirty="0" err="1">
+                <a:solidFill>
+                  <a:srgbClr val="0070C0"/>
+                </a:solidFill>
+              </a:rPr>
+              <a:t>SIdRef</a:t>
+            </a:r>
+            <a:r>
+              <a:rPr lang="en-US" sz="900" dirty="0">
+                <a:solidFill>
+                  <a:srgbClr val="0070C0"/>
+                </a:solidFill>
+              </a:rPr>
+              <a:t> {use=“optional”}</a:t>
+            </a:r>
+          </a:p>
+          <a:p>
+            <a:r>
+              <a:rPr lang="en-US" sz="900" dirty="0" err="1">
+                <a:solidFill>
+                  <a:srgbClr val="0070C0"/>
+                </a:solidFill>
+              </a:rPr>
+              <a:t>volumeConversionFactor</a:t>
+            </a:r>
+            <a:r>
+              <a:rPr lang="en-US" sz="900" dirty="0">
+                <a:solidFill>
+                  <a:srgbClr val="0070C0"/>
+                </a:solidFill>
+              </a:rPr>
+              <a:t>: </a:t>
+            </a:r>
+            <a:r>
+              <a:rPr lang="en-US" sz="900" dirty="0" err="1">
+                <a:solidFill>
+                  <a:srgbClr val="0070C0"/>
+                </a:solidFill>
+              </a:rPr>
+              <a:t>SIdRef</a:t>
+            </a:r>
+            <a:r>
+              <a:rPr lang="en-US" sz="900" dirty="0">
+                <a:solidFill>
+                  <a:srgbClr val="0070C0"/>
+                </a:solidFill>
+              </a:rPr>
+              <a:t> {use=“optional”}</a:t>
+            </a:r>
+          </a:p>
+          <a:p>
+            <a:r>
+              <a:rPr lang="en-US" sz="900" dirty="0" err="1" smtClean="0">
+                <a:solidFill>
+                  <a:srgbClr val="0070C0"/>
+                </a:solidFill>
+              </a:rPr>
+              <a:t>areaConversionFactor</a:t>
+            </a:r>
+            <a:r>
+              <a:rPr lang="en-US" sz="900" dirty="0" smtClean="0">
+                <a:solidFill>
+                  <a:srgbClr val="0070C0"/>
+                </a:solidFill>
+              </a:rPr>
+              <a:t>: </a:t>
+            </a:r>
+            <a:r>
+              <a:rPr lang="en-US" sz="900" dirty="0" err="1" smtClean="0">
+                <a:solidFill>
+                  <a:srgbClr val="0070C0"/>
+                </a:solidFill>
+              </a:rPr>
+              <a:t>SIdRef</a:t>
+            </a:r>
+            <a:r>
+              <a:rPr lang="en-US" sz="900" dirty="0" smtClean="0">
+                <a:solidFill>
+                  <a:srgbClr val="0070C0"/>
+                </a:solidFill>
+              </a:rPr>
+              <a:t> {use=“optional”}</a:t>
+            </a:r>
+          </a:p>
+          <a:p>
+            <a:r>
+              <a:rPr lang="en-US" sz="900" dirty="0" err="1" smtClean="0">
+                <a:solidFill>
+                  <a:srgbClr val="0070C0"/>
+                </a:solidFill>
+              </a:rPr>
+              <a:t>substanceConversionFactor</a:t>
+            </a:r>
+            <a:r>
+              <a:rPr lang="en-US" sz="900" dirty="0" smtClean="0">
+                <a:solidFill>
+                  <a:srgbClr val="0070C0"/>
+                </a:solidFill>
+              </a:rPr>
+              <a:t>: </a:t>
+            </a:r>
+            <a:r>
+              <a:rPr lang="en-US" sz="900" dirty="0" err="1" smtClean="0">
+                <a:solidFill>
+                  <a:srgbClr val="0070C0"/>
+                </a:solidFill>
+              </a:rPr>
+              <a:t>SIdRef</a:t>
+            </a:r>
+            <a:r>
+              <a:rPr lang="en-US" sz="900" dirty="0" smtClean="0">
+                <a:solidFill>
+                  <a:srgbClr val="0070C0"/>
+                </a:solidFill>
+              </a:rPr>
+              <a:t> {use=“optional”}</a:t>
+            </a:r>
+          </a:p>
+          <a:p>
+            <a:r>
+              <a:rPr lang="en-US" sz="900" dirty="0" err="1" smtClean="0">
+                <a:solidFill>
+                  <a:srgbClr val="0070C0"/>
+                </a:solidFill>
+              </a:rPr>
+              <a:t>timeConversionFactor</a:t>
+            </a:r>
+            <a:r>
+              <a:rPr lang="en-US" sz="900" dirty="0" smtClean="0">
+                <a:solidFill>
+                  <a:srgbClr val="0070C0"/>
+                </a:solidFill>
+              </a:rPr>
+              <a:t>: </a:t>
+            </a:r>
+            <a:r>
+              <a:rPr lang="en-US" sz="900" dirty="0" err="1" smtClean="0">
+                <a:solidFill>
+                  <a:srgbClr val="0070C0"/>
+                </a:solidFill>
+              </a:rPr>
+              <a:t>SIdRef</a:t>
+            </a:r>
+            <a:r>
+              <a:rPr lang="en-US" sz="900" dirty="0" smtClean="0">
+                <a:solidFill>
+                  <a:srgbClr val="0070C0"/>
+                </a:solidFill>
+              </a:rPr>
+              <a:t> {use=“optional</a:t>
+            </a:r>
+            <a:r>
+              <a:rPr lang="en-US" sz="900" dirty="0" smtClean="0">
+                <a:solidFill>
+                  <a:srgbClr val="0070C0"/>
+                </a:solidFill>
+              </a:rPr>
+              <a:t>”}</a:t>
+            </a:r>
+          </a:p>
+          <a:p>
+            <a:r>
+              <a:rPr lang="en-US" sz="900" dirty="0" err="1" smtClean="0">
+                <a:solidFill>
+                  <a:srgbClr val="0070C0"/>
+                </a:solidFill>
+              </a:rPr>
+              <a:t>extentConversionFactor</a:t>
+            </a:r>
+            <a:r>
+              <a:rPr lang="en-US" sz="900" dirty="0" smtClean="0">
+                <a:solidFill>
+                  <a:srgbClr val="0070C0"/>
+                </a:solidFill>
+              </a:rPr>
+              <a:t>: </a:t>
+            </a:r>
+            <a:r>
+              <a:rPr lang="en-US" sz="900" dirty="0" err="1" smtClean="0">
+                <a:solidFill>
+                  <a:srgbClr val="0070C0"/>
+                </a:solidFill>
+              </a:rPr>
+              <a:t>SIdRef</a:t>
+            </a:r>
+            <a:r>
+              <a:rPr lang="en-US" sz="900" dirty="0" smtClean="0">
+                <a:solidFill>
+                  <a:srgbClr val="0070C0"/>
+                </a:solidFill>
+              </a:rPr>
+              <a:t> {use=“optional”}</a:t>
+            </a:r>
+            <a:endParaRPr lang="en-US" sz="900" dirty="0" smtClean="0">
+              <a:solidFill>
+                <a:srgbClr val="0070C0"/>
+              </a:solidFill>
+            </a:endParaRPr>
+          </a:p>
+          <a:p>
+            <a:endParaRPr lang="en-US" sz="900" dirty="0">
+              <a:solidFill>
+                <a:srgbClr val="0070C0"/>
+              </a:solidFill>
+            </a:endParaRPr>
+          </a:p>
+        </p:txBody>
+      </p:sp>
+      <p:sp>
+        <p:nvSpPr>
+          <p:cNvPr id="34" name="Diamond 33"/>
+          <p:cNvSpPr/>
+          <p:nvPr/>
+        </p:nvSpPr>
+        <p:spPr>
+          <a:xfrm>
+            <a:off x="57847" y="1261265"/>
+            <a:ext cx="66869" cy="167916"/>
+          </a:xfrm>
+          <a:prstGeom prst="diamond">
+            <a:avLst/>
+          </a:prstGeom>
+          <a:solidFill>
+            <a:srgbClr val="0070C0"/>
+          </a:solidFill>
+          <a:ln w="6350">
+            <a:solidFill>
+              <a:srgbClr val="0070C0"/>
+            </a:solidFill>
+          </a:ln>
+        </p:spPr>
+        <p:style>
+          <a:lnRef idx="2">
+            <a:schemeClr val="accent1">
+              <a:shade val="50000"/>
+            </a:schemeClr>
+          </a:lnRef>
+          <a:fillRef idx="1">
+            <a:schemeClr val="accent1"/>
+          </a:fillRef>
+          <a:effectRef idx="0">
+            <a:schemeClr val="accent1"/>
+          </a:effectRef>
+          <a:fontRef idx="minor">
+            <a:schemeClr val="lt1"/>
+          </a:fontRef>
+        </p:style>
+        <p:txBody>
+          <a:bodyPr lIns="91440" tIns="45720" rIns="91440" bIns="45720" spcCol="0" rtlCol="0" anchor="ctr"/>
+          <a:lstStyle/>
+          <a:p>
+            <a:pPr algn="ctr"/>
+            <a:endParaRPr lang="en-US">
+              <a:solidFill>
+                <a:srgbClr val="0070C0"/>
+              </a:solidFill>
+            </a:endParaRPr>
+          </a:p>
+        </p:txBody>
+      </p:sp>
+      <p:cxnSp>
+        <p:nvCxnSpPr>
+          <p:cNvPr id="35" name="Elbow Connector 34"/>
+          <p:cNvCxnSpPr>
+            <a:stCxn id="34" idx="2"/>
+            <a:endCxn id="53" idx="0"/>
+          </p:cNvCxnSpPr>
+          <p:nvPr/>
+        </p:nvCxnSpPr>
+        <p:spPr>
+          <a:xfrm rot="16200000" flipH="1">
+            <a:off x="498351" y="1022112"/>
+            <a:ext cx="159241" cy="973378"/>
+          </a:xfrm>
+          <a:prstGeom prst="bentConnector3">
+            <a:avLst>
+              <a:gd name="adj1" fmla="val 50000"/>
+            </a:avLst>
+          </a:prstGeom>
+          <a:ln w="6350">
+            <a:solidFill>
+              <a:srgbClr val="0070C0"/>
+            </a:solidFill>
+          </a:ln>
+        </p:spPr>
+        <p:style>
+          <a:lnRef idx="1">
+            <a:schemeClr val="accent1"/>
+          </a:lnRef>
+          <a:fillRef idx="0">
+            <a:schemeClr val="accent1"/>
+          </a:fillRef>
+          <a:effectRef idx="0">
+            <a:schemeClr val="accent1"/>
+          </a:effectRef>
+          <a:fontRef idx="minor">
+            <a:schemeClr val="tx1"/>
+          </a:fontRef>
+        </p:style>
+      </p:cxnSp>
+      <p:cxnSp>
+        <p:nvCxnSpPr>
+          <p:cNvPr id="36" name="Elbow Connector 35"/>
+          <p:cNvCxnSpPr>
+            <a:stCxn id="50" idx="2"/>
+            <a:endCxn id="44" idx="0"/>
+          </p:cNvCxnSpPr>
+          <p:nvPr/>
+        </p:nvCxnSpPr>
+        <p:spPr>
+          <a:xfrm rot="16200000" flipH="1">
+            <a:off x="554824" y="2756045"/>
+            <a:ext cx="282302" cy="1014661"/>
+          </a:xfrm>
+          <a:prstGeom prst="bentConnector3">
+            <a:avLst>
+              <a:gd name="adj1" fmla="val 50000"/>
+            </a:avLst>
+          </a:prstGeom>
+          <a:ln w="6350">
+            <a:solidFill>
+              <a:srgbClr val="0070C0"/>
+            </a:solidFill>
+          </a:ln>
+        </p:spPr>
+        <p:style>
+          <a:lnRef idx="1">
+            <a:schemeClr val="accent1"/>
+          </a:lnRef>
+          <a:fillRef idx="0">
+            <a:schemeClr val="accent1"/>
+          </a:fillRef>
+          <a:effectRef idx="0">
+            <a:schemeClr val="accent1"/>
+          </a:effectRef>
+          <a:fontRef idx="minor">
+            <a:schemeClr val="tx1"/>
+          </a:fontRef>
+        </p:style>
+      </p:cxnSp>
+      <p:cxnSp>
+        <p:nvCxnSpPr>
+          <p:cNvPr id="37" name="Elbow Connector 36"/>
+          <p:cNvCxnSpPr>
+            <a:stCxn id="34" idx="2"/>
+            <a:endCxn id="49" idx="0"/>
+          </p:cNvCxnSpPr>
+          <p:nvPr/>
+        </p:nvCxnSpPr>
+        <p:spPr>
+          <a:xfrm rot="16200000" flipH="1">
+            <a:off x="-112906" y="1633369"/>
+            <a:ext cx="1233465" cy="825088"/>
+          </a:xfrm>
+          <a:prstGeom prst="bentConnector3">
+            <a:avLst>
+              <a:gd name="adj1" fmla="val 85203"/>
+            </a:avLst>
+          </a:prstGeom>
+          <a:ln w="6350">
+            <a:solidFill>
+              <a:srgbClr val="0070C0"/>
+            </a:solidFill>
+          </a:ln>
+        </p:spPr>
+        <p:style>
+          <a:lnRef idx="1">
+            <a:schemeClr val="accent1"/>
+          </a:lnRef>
+          <a:fillRef idx="0">
+            <a:schemeClr val="accent1"/>
+          </a:fillRef>
+          <a:effectRef idx="0">
+            <a:schemeClr val="accent1"/>
+          </a:effectRef>
+          <a:fontRef idx="minor">
+            <a:schemeClr val="tx1"/>
+          </a:fontRef>
+        </p:style>
+      </p:cxnSp>
+      <p:sp>
+        <p:nvSpPr>
+          <p:cNvPr id="39" name="Rectangle 38"/>
+          <p:cNvSpPr/>
+          <p:nvPr/>
+        </p:nvSpPr>
+        <p:spPr>
+          <a:xfrm>
+            <a:off x="3389263" y="145916"/>
+            <a:ext cx="582169" cy="304800"/>
+          </a:xfrm>
+          <a:prstGeom prst="rect">
+            <a:avLst/>
+          </a:prstGeom>
+          <a:noFill/>
+          <a:ln w="6350">
+            <a:solidFill>
+              <a:srgbClr val="002060"/>
+            </a:solidFill>
+          </a:ln>
+        </p:spPr>
+        <p:style>
+          <a:lnRef idx="2">
+            <a:schemeClr val="accent1">
+              <a:shade val="50000"/>
+            </a:schemeClr>
+          </a:lnRef>
+          <a:fillRef idx="1">
+            <a:schemeClr val="accent1"/>
+          </a:fillRef>
+          <a:effectRef idx="0">
+            <a:schemeClr val="accent1"/>
+          </a:effectRef>
+          <a:fontRef idx="minor">
+            <a:schemeClr val="lt1"/>
+          </a:fontRef>
+        </p:style>
+        <p:txBody>
+          <a:bodyPr lIns="91440" tIns="45720" rIns="91440" bIns="45720" spcCol="0" rtlCol="0" anchor="ctr"/>
+          <a:lstStyle/>
+          <a:p>
+            <a:pPr algn="ctr"/>
+            <a:r>
+              <a:rPr lang="en-US" sz="1100" b="1" dirty="0">
+                <a:solidFill>
+                  <a:schemeClr val="tx1"/>
+                </a:solidFill>
+              </a:rPr>
+              <a:t>SBase</a:t>
+            </a:r>
+          </a:p>
+        </p:txBody>
+      </p:sp>
+      <p:sp>
+        <p:nvSpPr>
+          <p:cNvPr id="40" name="Isosceles Triangle 39"/>
+          <p:cNvSpPr/>
+          <p:nvPr/>
+        </p:nvSpPr>
+        <p:spPr>
+          <a:xfrm>
+            <a:off x="3617865" y="453648"/>
+            <a:ext cx="159199" cy="114300"/>
+          </a:xfrm>
+          <a:prstGeom prst="triangle">
+            <a:avLst/>
+          </a:prstGeom>
+          <a:noFill/>
+          <a:ln w="6350">
+            <a:solidFill>
+              <a:schemeClr val="accent1"/>
+            </a:solidFill>
+          </a:ln>
+        </p:spPr>
+        <p:style>
+          <a:lnRef idx="2">
+            <a:schemeClr val="accent1">
+              <a:shade val="50000"/>
+            </a:schemeClr>
+          </a:lnRef>
+          <a:fillRef idx="1">
+            <a:schemeClr val="accent1"/>
+          </a:fillRef>
+          <a:effectRef idx="0">
+            <a:schemeClr val="accent1"/>
+          </a:effectRef>
+          <a:fontRef idx="minor">
+            <a:schemeClr val="lt1"/>
+          </a:fontRef>
+        </p:style>
+        <p:txBody>
+          <a:bodyPr lIns="91440" tIns="45720" rIns="91440" bIns="45720" spcCol="0" rtlCol="0" anchor="ctr"/>
+          <a:lstStyle/>
+          <a:p>
+            <a:pPr algn="ctr"/>
+            <a:endParaRPr lang="en-US" sz="1100" b="1" dirty="0">
+              <a:solidFill>
+                <a:schemeClr val="tx1"/>
+              </a:solidFill>
+            </a:endParaRPr>
+          </a:p>
+        </p:txBody>
+      </p:sp>
+      <p:cxnSp>
+        <p:nvCxnSpPr>
+          <p:cNvPr id="41" name="Elbow Connector 40"/>
+          <p:cNvCxnSpPr>
+            <a:stCxn id="49" idx="3"/>
+            <a:endCxn id="40" idx="3"/>
+          </p:cNvCxnSpPr>
+          <p:nvPr/>
+        </p:nvCxnSpPr>
+        <p:spPr>
+          <a:xfrm flipV="1">
+            <a:off x="1644883" y="567948"/>
+            <a:ext cx="2052582" cy="2247098"/>
+          </a:xfrm>
+          <a:prstGeom prst="bentConnector2">
+            <a:avLst/>
+          </a:prstGeom>
+          <a:ln w="6350">
+            <a:solidFill>
+              <a:srgbClr val="0070C0"/>
+            </a:solidFill>
+          </a:ln>
+        </p:spPr>
+        <p:style>
+          <a:lnRef idx="1">
+            <a:schemeClr val="accent1"/>
+          </a:lnRef>
+          <a:fillRef idx="0">
+            <a:schemeClr val="accent1"/>
+          </a:fillRef>
+          <a:effectRef idx="0">
+            <a:schemeClr val="accent1"/>
+          </a:effectRef>
+          <a:fontRef idx="minor">
+            <a:schemeClr val="tx1"/>
+          </a:fontRef>
+        </p:style>
+      </p:cxnSp>
+      <p:sp>
+        <p:nvSpPr>
+          <p:cNvPr id="42" name="Rectangle 41"/>
+          <p:cNvSpPr/>
+          <p:nvPr/>
+        </p:nvSpPr>
+        <p:spPr>
+          <a:xfrm>
+            <a:off x="57873" y="2309846"/>
+            <a:ext cx="880369" cy="369332"/>
+          </a:xfrm>
+          <a:prstGeom prst="rect">
+            <a:avLst/>
+          </a:prstGeom>
+          <a:ln>
+            <a:noFill/>
+          </a:ln>
+        </p:spPr>
+        <p:txBody>
+          <a:bodyPr wrap="none" lIns="91440" tIns="45720" rIns="91440" bIns="45720">
+            <a:spAutoFit/>
+          </a:bodyPr>
+          <a:lstStyle/>
+          <a:p>
+            <a:r>
+              <a:rPr lang="en-US" sz="900" dirty="0" err="1" smtClean="0">
+                <a:solidFill>
+                  <a:srgbClr val="0070C0"/>
+                </a:solidFill>
+              </a:rPr>
+              <a:t>listOfDeletions</a:t>
+            </a:r>
+            <a:endParaRPr lang="en-US" sz="900" dirty="0">
+              <a:solidFill>
+                <a:srgbClr val="0070C0"/>
+              </a:solidFill>
+            </a:endParaRPr>
+          </a:p>
+          <a:p>
+            <a:r>
+              <a:rPr lang="en-US" sz="900" dirty="0">
+                <a:solidFill>
+                  <a:srgbClr val="0070C0"/>
+                </a:solidFill>
+              </a:rPr>
+              <a:t>0,1</a:t>
+            </a:r>
+          </a:p>
+        </p:txBody>
+      </p:sp>
+      <p:sp>
+        <p:nvSpPr>
+          <p:cNvPr id="43" name="Rectangle 42"/>
+          <p:cNvSpPr/>
+          <p:nvPr/>
+        </p:nvSpPr>
+        <p:spPr>
+          <a:xfrm>
+            <a:off x="51292" y="1320181"/>
+            <a:ext cx="639919" cy="230832"/>
+          </a:xfrm>
+          <a:prstGeom prst="rect">
+            <a:avLst/>
+          </a:prstGeom>
+          <a:ln>
+            <a:noFill/>
+          </a:ln>
+        </p:spPr>
+        <p:txBody>
+          <a:bodyPr wrap="none" lIns="91440" tIns="45720" rIns="91440" bIns="45720">
+            <a:spAutoFit/>
+          </a:bodyPr>
+          <a:lstStyle/>
+          <a:p>
+            <a:r>
+              <a:rPr lang="en-US" sz="900" dirty="0" err="1" smtClean="0">
+                <a:solidFill>
+                  <a:srgbClr val="0070C0"/>
+                </a:solidFill>
+              </a:rPr>
+              <a:t>modelRef</a:t>
+            </a:r>
+            <a:endParaRPr lang="en-US" sz="900" dirty="0">
+              <a:solidFill>
+                <a:srgbClr val="0070C0"/>
+              </a:solidFill>
+            </a:endParaRPr>
+          </a:p>
+        </p:txBody>
+      </p:sp>
+      <p:sp>
+        <p:nvSpPr>
+          <p:cNvPr id="44" name="Rectangle 43"/>
+          <p:cNvSpPr/>
+          <p:nvPr/>
+        </p:nvSpPr>
+        <p:spPr>
+          <a:xfrm>
+            <a:off x="378821" y="3404527"/>
+            <a:ext cx="1648969" cy="472281"/>
+          </a:xfrm>
+          <a:prstGeom prst="rect">
+            <a:avLst/>
+          </a:prstGeom>
+          <a:noFill/>
+          <a:ln w="6350">
+            <a:solidFill>
+              <a:srgbClr val="0070C0"/>
+            </a:solidFill>
+          </a:ln>
+        </p:spPr>
+        <p:style>
+          <a:lnRef idx="2">
+            <a:schemeClr val="accent1">
+              <a:shade val="50000"/>
+            </a:schemeClr>
+          </a:lnRef>
+          <a:fillRef idx="1">
+            <a:schemeClr val="accent1"/>
+          </a:fillRef>
+          <a:effectRef idx="0">
+            <a:schemeClr val="accent1"/>
+          </a:effectRef>
+          <a:fontRef idx="minor">
+            <a:schemeClr val="lt1"/>
+          </a:fontRef>
+        </p:style>
+        <p:txBody>
+          <a:bodyPr lIns="91440" tIns="45720" rIns="91440" bIns="45720" spcCol="0" rtlCol="0" anchor="t"/>
+          <a:lstStyle/>
+          <a:p>
+            <a:pPr algn="ctr"/>
+            <a:r>
+              <a:rPr lang="en-US" sz="1100" b="1" dirty="0" smtClean="0">
+                <a:solidFill>
+                  <a:srgbClr val="0070C0"/>
+                </a:solidFill>
+              </a:rPr>
+              <a:t>Deletion</a:t>
+            </a:r>
+          </a:p>
+          <a:p>
+            <a:r>
+              <a:rPr lang="en-US" sz="900" dirty="0">
+                <a:solidFill>
+                  <a:srgbClr val="0070C0"/>
+                </a:solidFill>
+              </a:rPr>
+              <a:t>id: </a:t>
+            </a:r>
+            <a:r>
+              <a:rPr lang="en-US" sz="900" dirty="0" err="1" smtClean="0">
+                <a:solidFill>
+                  <a:srgbClr val="0070C0"/>
+                </a:solidFill>
+              </a:rPr>
+              <a:t>SId</a:t>
+            </a:r>
+            <a:r>
+              <a:rPr lang="en-US" sz="900" dirty="0" smtClean="0">
+                <a:solidFill>
+                  <a:srgbClr val="0070C0"/>
+                </a:solidFill>
+              </a:rPr>
+              <a:t> </a:t>
+            </a:r>
+            <a:r>
+              <a:rPr lang="en-US" sz="900" dirty="0">
+                <a:solidFill>
+                  <a:srgbClr val="0070C0"/>
+                </a:solidFill>
+              </a:rPr>
+              <a:t>{use=“optional</a:t>
+            </a:r>
+            <a:r>
+              <a:rPr lang="en-US" sz="900" dirty="0" smtClean="0">
+                <a:solidFill>
+                  <a:srgbClr val="0070C0"/>
+                </a:solidFill>
+              </a:rPr>
+              <a:t>”}</a:t>
+            </a:r>
+            <a:endParaRPr lang="en-US" sz="900" dirty="0">
+              <a:solidFill>
+                <a:srgbClr val="0070C0"/>
+              </a:solidFill>
+            </a:endParaRPr>
+          </a:p>
+        </p:txBody>
+      </p:sp>
+      <p:sp>
+        <p:nvSpPr>
+          <p:cNvPr id="45" name="Rectangle 44"/>
+          <p:cNvSpPr/>
+          <p:nvPr/>
+        </p:nvSpPr>
+        <p:spPr>
+          <a:xfrm>
+            <a:off x="134512" y="3064104"/>
+            <a:ext cx="575799" cy="369332"/>
+          </a:xfrm>
+          <a:prstGeom prst="rect">
+            <a:avLst/>
+          </a:prstGeom>
+          <a:ln>
+            <a:noFill/>
+          </a:ln>
+        </p:spPr>
+        <p:txBody>
+          <a:bodyPr wrap="none" lIns="91440" tIns="45720" rIns="91440" bIns="45720">
+            <a:spAutoFit/>
+          </a:bodyPr>
+          <a:lstStyle/>
+          <a:p>
+            <a:r>
+              <a:rPr lang="en-US" sz="900" dirty="0" smtClean="0">
+                <a:solidFill>
+                  <a:srgbClr val="0070C0"/>
+                </a:solidFill>
+              </a:rPr>
+              <a:t>deletion</a:t>
+            </a:r>
+            <a:endParaRPr lang="en-US" sz="900" dirty="0">
+              <a:solidFill>
+                <a:srgbClr val="0070C0"/>
+              </a:solidFill>
+            </a:endParaRPr>
+          </a:p>
+          <a:p>
+            <a:r>
+              <a:rPr lang="en-US" sz="900" dirty="0">
+                <a:solidFill>
+                  <a:srgbClr val="0070C0"/>
+                </a:solidFill>
+              </a:rPr>
+              <a:t>0,…,*</a:t>
+            </a:r>
+          </a:p>
+        </p:txBody>
+      </p:sp>
+      <p:cxnSp>
+        <p:nvCxnSpPr>
+          <p:cNvPr id="46" name="Elbow Connector 45"/>
+          <p:cNvCxnSpPr>
+            <a:stCxn id="53" idx="3"/>
+            <a:endCxn id="40" idx="3"/>
+          </p:cNvCxnSpPr>
+          <p:nvPr/>
+        </p:nvCxnSpPr>
+        <p:spPr>
+          <a:xfrm flipV="1">
+            <a:off x="1941463" y="567948"/>
+            <a:ext cx="1756002" cy="1357024"/>
+          </a:xfrm>
+          <a:prstGeom prst="bentConnector2">
+            <a:avLst/>
+          </a:prstGeom>
+          <a:ln w="6350">
+            <a:solidFill>
+              <a:srgbClr val="0070C0"/>
+            </a:solidFill>
+          </a:ln>
+        </p:spPr>
+        <p:style>
+          <a:lnRef idx="1">
+            <a:schemeClr val="accent1"/>
+          </a:lnRef>
+          <a:fillRef idx="0">
+            <a:schemeClr val="accent1"/>
+          </a:fillRef>
+          <a:effectRef idx="0">
+            <a:schemeClr val="accent1"/>
+          </a:effectRef>
+          <a:fontRef idx="minor">
+            <a:schemeClr val="tx1"/>
+          </a:fontRef>
+        </p:style>
+      </p:cxnSp>
+      <p:cxnSp>
+        <p:nvCxnSpPr>
+          <p:cNvPr id="47" name="Elbow Connector 46"/>
+          <p:cNvCxnSpPr>
+            <a:stCxn id="55" idx="3"/>
+            <a:endCxn id="40" idx="3"/>
+          </p:cNvCxnSpPr>
+          <p:nvPr/>
+        </p:nvCxnSpPr>
+        <p:spPr>
+          <a:xfrm flipV="1">
+            <a:off x="3432353" y="567948"/>
+            <a:ext cx="265112" cy="2572133"/>
+          </a:xfrm>
+          <a:prstGeom prst="bentConnector2">
+            <a:avLst/>
+          </a:prstGeom>
+          <a:ln w="6350">
+            <a:solidFill>
+              <a:srgbClr val="0070C0"/>
+            </a:solidFill>
+          </a:ln>
+        </p:spPr>
+        <p:style>
+          <a:lnRef idx="1">
+            <a:schemeClr val="accent1"/>
+          </a:lnRef>
+          <a:fillRef idx="0">
+            <a:schemeClr val="accent1"/>
+          </a:fillRef>
+          <a:effectRef idx="0">
+            <a:schemeClr val="accent1"/>
+          </a:effectRef>
+          <a:fontRef idx="minor">
+            <a:schemeClr val="tx1"/>
+          </a:fontRef>
+        </p:style>
+      </p:cxnSp>
       <p:grpSp>
         <p:nvGrpSpPr>
-          <p:cNvPr id="2" name="Group 1"/>
+          <p:cNvPr id="48" name="Group 47"/>
           <p:cNvGrpSpPr/>
           <p:nvPr/>
         </p:nvGrpSpPr>
         <p:grpSpPr>
           <a:xfrm>
-            <a:off x="51292" y="145916"/>
-            <a:ext cx="3920140" cy="3730892"/>
-            <a:chOff x="51292" y="145916"/>
-            <a:chExt cx="3920140" cy="3730892"/>
+            <a:off x="155210" y="2662646"/>
+            <a:ext cx="1489673" cy="459579"/>
+            <a:chOff x="162625" y="2625999"/>
+            <a:chExt cx="1489673" cy="459579"/>
           </a:xfrm>
         </p:grpSpPr>
-        <p:cxnSp>
-          <p:nvCxnSpPr>
-            <p:cNvPr id="31" name="Straight Connector 30"/>
-            <p:cNvCxnSpPr/>
-            <p:nvPr/>
-          </p:nvCxnSpPr>
-          <p:spPr>
-            <a:xfrm>
-              <a:off x="91207" y="331201"/>
-              <a:ext cx="2764770" cy="0"/>
-            </a:xfrm>
-            <a:prstGeom prst="line">
-              <a:avLst/>
-            </a:prstGeom>
-            <a:ln w="6350">
-              <a:solidFill>
-                <a:srgbClr val="0070C0"/>
-              </a:solidFill>
-            </a:ln>
-          </p:spPr>
-          <p:style>
-            <a:lnRef idx="1">
-              <a:schemeClr val="accent1"/>
-            </a:lnRef>
-            <a:fillRef idx="0">
-              <a:schemeClr val="accent1"/>
-            </a:fillRef>
-            <a:effectRef idx="0">
-              <a:schemeClr val="accent1"/>
-            </a:effectRef>
-            <a:fontRef idx="minor">
-              <a:schemeClr val="tx1"/>
-            </a:fontRef>
-          </p:style>
-        </p:cxnSp>
-        <p:grpSp>
-          <p:nvGrpSpPr>
-            <p:cNvPr id="32" name="Group 31"/>
-            <p:cNvGrpSpPr/>
-            <p:nvPr/>
-          </p:nvGrpSpPr>
-          <p:grpSpPr>
-            <a:xfrm>
-              <a:off x="57772" y="145916"/>
-              <a:ext cx="2798205" cy="1279748"/>
-              <a:chOff x="65187" y="109269"/>
-              <a:chExt cx="2798205" cy="1161479"/>
-            </a:xfrm>
-          </p:grpSpPr>
-          <p:sp>
-            <p:nvSpPr>
-              <p:cNvPr id="33" name="Rectangle 32"/>
-              <p:cNvSpPr/>
-              <p:nvPr/>
-            </p:nvSpPr>
-            <p:spPr>
-              <a:xfrm>
-                <a:off x="98622" y="109269"/>
-                <a:ext cx="2764770" cy="1007141"/>
-              </a:xfrm>
-              <a:prstGeom prst="rect">
-                <a:avLst/>
-              </a:prstGeom>
-              <a:noFill/>
-              <a:ln w="6350">
-                <a:solidFill>
-                  <a:srgbClr val="0070C0"/>
-                </a:solidFill>
-              </a:ln>
-            </p:spPr>
-            <p:style>
-              <a:lnRef idx="2">
-                <a:schemeClr val="accent1">
-                  <a:shade val="50000"/>
-                </a:schemeClr>
-              </a:lnRef>
-              <a:fillRef idx="1">
-                <a:schemeClr val="accent1"/>
-              </a:fillRef>
-              <a:effectRef idx="0">
-                <a:schemeClr val="accent1"/>
-              </a:effectRef>
-              <a:fontRef idx="minor">
-                <a:schemeClr val="lt1"/>
-              </a:fontRef>
-            </p:style>
-            <p:txBody>
-              <a:bodyPr rtlCol="0" anchor="t"/>
-              <a:lstStyle/>
-              <a:p>
-                <a:pPr algn="ctr"/>
-                <a:r>
-                  <a:rPr lang="en-US" sz="1100" b="1" dirty="0" smtClean="0">
-                    <a:solidFill>
-                      <a:srgbClr val="0070C0"/>
-                    </a:solidFill>
-                  </a:rPr>
-                  <a:t>Submodel</a:t>
-                </a:r>
-                <a:endParaRPr lang="en-US" sz="1100" b="1" dirty="0">
-                  <a:solidFill>
-                    <a:srgbClr val="0070C0"/>
-                  </a:solidFill>
-                </a:endParaRPr>
-              </a:p>
-              <a:p>
-                <a:r>
-                  <a:rPr lang="en-US" sz="900" dirty="0" smtClean="0">
-                    <a:solidFill>
-                      <a:srgbClr val="0070C0"/>
-                    </a:solidFill>
-                  </a:rPr>
-                  <a:t>id: </a:t>
-                </a:r>
-                <a:r>
-                  <a:rPr lang="en-US" sz="900" dirty="0" err="1" smtClean="0">
-                    <a:solidFill>
-                      <a:srgbClr val="0070C0"/>
-                    </a:solidFill>
-                  </a:rPr>
-                  <a:t>SId</a:t>
-                </a:r>
-                <a:r>
-                  <a:rPr lang="en-US" sz="900" dirty="0" smtClean="0">
-                    <a:solidFill>
-                      <a:srgbClr val="0070C0"/>
-                    </a:solidFill>
-                  </a:rPr>
-                  <a:t> {use=“optional”}</a:t>
-                </a:r>
-              </a:p>
-              <a:p>
-                <a:r>
-                  <a:rPr lang="en-US" sz="900" dirty="0" err="1" smtClean="0">
-                    <a:solidFill>
-                      <a:srgbClr val="0070C0"/>
-                    </a:solidFill>
-                  </a:rPr>
-                  <a:t>areaConversionFactor</a:t>
-                </a:r>
-                <a:r>
-                  <a:rPr lang="en-US" sz="900" dirty="0" smtClean="0">
-                    <a:solidFill>
-                      <a:srgbClr val="0070C0"/>
-                    </a:solidFill>
-                  </a:rPr>
-                  <a:t>: </a:t>
-                </a:r>
-                <a:r>
-                  <a:rPr lang="en-US" sz="900" dirty="0" err="1" smtClean="0">
-                    <a:solidFill>
-                      <a:srgbClr val="0070C0"/>
-                    </a:solidFill>
-                  </a:rPr>
-                  <a:t>SIdRef</a:t>
-                </a:r>
-                <a:r>
-                  <a:rPr lang="en-US" sz="900" dirty="0" smtClean="0">
-                    <a:solidFill>
-                      <a:srgbClr val="0070C0"/>
-                    </a:solidFill>
-                  </a:rPr>
-                  <a:t> {use=“optional”}</a:t>
-                </a:r>
-              </a:p>
-              <a:p>
-                <a:r>
-                  <a:rPr lang="en-US" sz="900" dirty="0" err="1" smtClean="0">
-                    <a:solidFill>
-                      <a:srgbClr val="0070C0"/>
-                    </a:solidFill>
-                  </a:rPr>
-                  <a:t>lengthConversionFactor</a:t>
-                </a:r>
-                <a:r>
-                  <a:rPr lang="en-US" sz="900" dirty="0" smtClean="0">
-                    <a:solidFill>
-                      <a:srgbClr val="0070C0"/>
-                    </a:solidFill>
-                  </a:rPr>
-                  <a:t>: </a:t>
-                </a:r>
-                <a:r>
-                  <a:rPr lang="en-US" sz="900" dirty="0" err="1" smtClean="0">
-                    <a:solidFill>
-                      <a:srgbClr val="0070C0"/>
-                    </a:solidFill>
-                  </a:rPr>
-                  <a:t>SIdRef</a:t>
-                </a:r>
-                <a:r>
-                  <a:rPr lang="en-US" sz="900" dirty="0" smtClean="0">
-                    <a:solidFill>
-                      <a:srgbClr val="0070C0"/>
-                    </a:solidFill>
-                  </a:rPr>
-                  <a:t> {use=“optional”}</a:t>
-                </a:r>
-              </a:p>
-              <a:p>
-                <a:r>
-                  <a:rPr lang="en-US" sz="900" dirty="0" err="1" smtClean="0">
-                    <a:solidFill>
-                      <a:srgbClr val="0070C0"/>
-                    </a:solidFill>
-                  </a:rPr>
-                  <a:t>substanceConversionFactor</a:t>
-                </a:r>
-                <a:r>
-                  <a:rPr lang="en-US" sz="900" dirty="0" smtClean="0">
-                    <a:solidFill>
-                      <a:srgbClr val="0070C0"/>
-                    </a:solidFill>
-                  </a:rPr>
-                  <a:t>: </a:t>
-                </a:r>
-                <a:r>
-                  <a:rPr lang="en-US" sz="900" dirty="0" err="1" smtClean="0">
-                    <a:solidFill>
-                      <a:srgbClr val="0070C0"/>
-                    </a:solidFill>
-                  </a:rPr>
-                  <a:t>SIdRef</a:t>
-                </a:r>
-                <a:r>
-                  <a:rPr lang="en-US" sz="900" dirty="0" smtClean="0">
-                    <a:solidFill>
-                      <a:srgbClr val="0070C0"/>
-                    </a:solidFill>
-                  </a:rPr>
-                  <a:t> {use=“optional”}</a:t>
-                </a:r>
-              </a:p>
-              <a:p>
-                <a:r>
-                  <a:rPr lang="en-US" sz="900" dirty="0" err="1" smtClean="0">
-                    <a:solidFill>
-                      <a:srgbClr val="0070C0"/>
-                    </a:solidFill>
-                  </a:rPr>
-                  <a:t>timeConversionFactor</a:t>
-                </a:r>
-                <a:r>
-                  <a:rPr lang="en-US" sz="900" dirty="0" smtClean="0">
-                    <a:solidFill>
-                      <a:srgbClr val="0070C0"/>
-                    </a:solidFill>
-                  </a:rPr>
-                  <a:t>: </a:t>
-                </a:r>
-                <a:r>
-                  <a:rPr lang="en-US" sz="900" dirty="0" err="1" smtClean="0">
-                    <a:solidFill>
-                      <a:srgbClr val="0070C0"/>
-                    </a:solidFill>
-                  </a:rPr>
-                  <a:t>SIdRef</a:t>
-                </a:r>
-                <a:r>
-                  <a:rPr lang="en-US" sz="900" dirty="0" smtClean="0">
-                    <a:solidFill>
-                      <a:srgbClr val="0070C0"/>
-                    </a:solidFill>
-                  </a:rPr>
-                  <a:t> {use=“optional”}</a:t>
-                </a:r>
-              </a:p>
-              <a:p>
-                <a:r>
-                  <a:rPr lang="en-US" sz="900" dirty="0" err="1" smtClean="0">
-                    <a:solidFill>
-                      <a:srgbClr val="0070C0"/>
-                    </a:solidFill>
-                  </a:rPr>
-                  <a:t>volumeConversionFactor</a:t>
-                </a:r>
-                <a:r>
-                  <a:rPr lang="en-US" sz="900" dirty="0" smtClean="0">
-                    <a:solidFill>
-                      <a:srgbClr val="0070C0"/>
-                    </a:solidFill>
-                  </a:rPr>
-                  <a:t>: </a:t>
-                </a:r>
-                <a:r>
-                  <a:rPr lang="en-US" sz="900" dirty="0" err="1" smtClean="0">
-                    <a:solidFill>
-                      <a:srgbClr val="0070C0"/>
-                    </a:solidFill>
-                  </a:rPr>
-                  <a:t>SIdRef</a:t>
-                </a:r>
-                <a:r>
-                  <a:rPr lang="en-US" sz="900" dirty="0" smtClean="0">
-                    <a:solidFill>
-                      <a:srgbClr val="0070C0"/>
-                    </a:solidFill>
-                  </a:rPr>
-                  <a:t> {use=“optional”}</a:t>
-                </a:r>
-              </a:p>
-              <a:p>
-                <a:endParaRPr lang="en-US" sz="900" dirty="0">
-                  <a:solidFill>
-                    <a:srgbClr val="0070C0"/>
-                  </a:solidFill>
-                </a:endParaRPr>
-              </a:p>
-            </p:txBody>
-          </p:sp>
-          <p:sp>
-            <p:nvSpPr>
-              <p:cNvPr id="34" name="Diamond 33"/>
-              <p:cNvSpPr/>
-              <p:nvPr/>
-            </p:nvSpPr>
-            <p:spPr>
-              <a:xfrm>
-                <a:off x="65187" y="1118350"/>
-                <a:ext cx="66869" cy="152398"/>
-              </a:xfrm>
-              <a:prstGeom prst="diamond">
-                <a:avLst/>
-              </a:prstGeom>
-              <a:solidFill>
-                <a:srgbClr val="0070C0"/>
-              </a:solidFill>
-              <a:ln w="6350">
-                <a:solidFill>
-                  <a:srgbClr val="0070C0"/>
-                </a:solidFill>
-              </a:ln>
-            </p:spPr>
-            <p:style>
-              <a:lnRef idx="2">
-                <a:schemeClr val="accent1">
-                  <a:shade val="50000"/>
-                </a:schemeClr>
-              </a:lnRef>
-              <a:fillRef idx="1">
-                <a:schemeClr val="accent1"/>
-              </a:fillRef>
-              <a:effectRef idx="0">
-                <a:schemeClr val="accent1"/>
-              </a:effectRef>
-              <a:fontRef idx="minor">
-                <a:schemeClr val="lt1"/>
-              </a:fontRef>
-            </p:style>
-            <p:txBody>
-              <a:bodyPr lIns="91440" tIns="45720" rIns="91440" bIns="45720" spcCol="0" rtlCol="0" anchor="ctr"/>
-              <a:lstStyle/>
-              <a:p>
-                <a:pPr algn="ctr"/>
-                <a:endParaRPr lang="en-US">
-                  <a:solidFill>
-                    <a:srgbClr val="0070C0"/>
-                  </a:solidFill>
-                </a:endParaRPr>
-              </a:p>
-            </p:txBody>
-          </p:sp>
-        </p:grpSp>
-        <p:cxnSp>
-          <p:nvCxnSpPr>
-            <p:cNvPr id="35" name="Elbow Connector 34"/>
-            <p:cNvCxnSpPr>
-              <a:stCxn id="34" idx="2"/>
-              <a:endCxn id="53" idx="0"/>
-            </p:cNvCxnSpPr>
-            <p:nvPr/>
-          </p:nvCxnSpPr>
-          <p:spPr>
-            <a:xfrm rot="16200000" flipH="1">
-              <a:off x="496554" y="1020316"/>
-              <a:ext cx="162758" cy="973453"/>
-            </a:xfrm>
-            <a:prstGeom prst="bentConnector3">
-              <a:avLst>
-                <a:gd name="adj1" fmla="val 37853"/>
-              </a:avLst>
-            </a:prstGeom>
-            <a:ln w="6350">
-              <a:solidFill>
-                <a:srgbClr val="0070C0"/>
-              </a:solidFill>
-            </a:ln>
-          </p:spPr>
-          <p:style>
-            <a:lnRef idx="1">
-              <a:schemeClr val="accent1"/>
-            </a:lnRef>
-            <a:fillRef idx="0">
-              <a:schemeClr val="accent1"/>
-            </a:fillRef>
-            <a:effectRef idx="0">
-              <a:schemeClr val="accent1"/>
-            </a:effectRef>
-            <a:fontRef idx="minor">
-              <a:schemeClr val="tx1"/>
-            </a:fontRef>
-          </p:style>
-        </p:cxnSp>
-        <p:cxnSp>
-          <p:nvCxnSpPr>
-            <p:cNvPr id="36" name="Elbow Connector 35"/>
-            <p:cNvCxnSpPr>
-              <a:stCxn id="50" idx="2"/>
-              <a:endCxn id="44" idx="0"/>
-            </p:cNvCxnSpPr>
-            <p:nvPr/>
-          </p:nvCxnSpPr>
-          <p:spPr>
-            <a:xfrm rot="16200000" flipH="1">
-              <a:off x="554824" y="2756045"/>
-              <a:ext cx="282302" cy="1014661"/>
-            </a:xfrm>
-            <a:prstGeom prst="bentConnector3">
-              <a:avLst>
-                <a:gd name="adj1" fmla="val 50000"/>
-              </a:avLst>
-            </a:prstGeom>
-            <a:ln w="6350">
-              <a:solidFill>
-                <a:srgbClr val="0070C0"/>
-              </a:solidFill>
-            </a:ln>
-          </p:spPr>
-          <p:style>
-            <a:lnRef idx="1">
-              <a:schemeClr val="accent1"/>
-            </a:lnRef>
-            <a:fillRef idx="0">
-              <a:schemeClr val="accent1"/>
-            </a:fillRef>
-            <a:effectRef idx="0">
-              <a:schemeClr val="accent1"/>
-            </a:effectRef>
-            <a:fontRef idx="minor">
-              <a:schemeClr val="tx1"/>
-            </a:fontRef>
-          </p:style>
-        </p:cxnSp>
-        <p:cxnSp>
-          <p:nvCxnSpPr>
-            <p:cNvPr id="37" name="Elbow Connector 36"/>
-            <p:cNvCxnSpPr>
-              <a:stCxn id="34" idx="2"/>
-              <a:endCxn id="49" idx="0"/>
-            </p:cNvCxnSpPr>
-            <p:nvPr/>
-          </p:nvCxnSpPr>
-          <p:spPr>
-            <a:xfrm rot="16200000" flipH="1">
-              <a:off x="-114703" y="1631573"/>
-              <a:ext cx="1236982" cy="825163"/>
-            </a:xfrm>
-            <a:prstGeom prst="bentConnector3">
-              <a:avLst>
-                <a:gd name="adj1" fmla="val 85962"/>
-              </a:avLst>
-            </a:prstGeom>
-            <a:ln w="6350">
-              <a:solidFill>
-                <a:srgbClr val="0070C0"/>
-              </a:solidFill>
-            </a:ln>
-          </p:spPr>
-          <p:style>
-            <a:lnRef idx="1">
-              <a:schemeClr val="accent1"/>
-            </a:lnRef>
-            <a:fillRef idx="0">
-              <a:schemeClr val="accent1"/>
-            </a:fillRef>
-            <a:effectRef idx="0">
-              <a:schemeClr val="accent1"/>
-            </a:effectRef>
-            <a:fontRef idx="minor">
-              <a:schemeClr val="tx1"/>
-            </a:fontRef>
-          </p:style>
-        </p:cxnSp>
-        <p:grpSp>
-          <p:nvGrpSpPr>
-            <p:cNvPr id="38" name="Group 37"/>
-            <p:cNvGrpSpPr/>
-            <p:nvPr/>
-          </p:nvGrpSpPr>
-          <p:grpSpPr>
-            <a:xfrm>
-              <a:off x="3389263" y="145916"/>
-              <a:ext cx="582169" cy="422032"/>
-              <a:chOff x="4453762" y="214881"/>
-              <a:chExt cx="582169" cy="422032"/>
-            </a:xfrm>
-          </p:grpSpPr>
-          <p:sp>
-            <p:nvSpPr>
-              <p:cNvPr id="39" name="Rectangle 38"/>
-              <p:cNvSpPr/>
-              <p:nvPr/>
-            </p:nvSpPr>
-            <p:spPr>
-              <a:xfrm>
-                <a:off x="4453762" y="214881"/>
-                <a:ext cx="582169" cy="304800"/>
-              </a:xfrm>
-              <a:prstGeom prst="rect">
-                <a:avLst/>
-              </a:prstGeom>
-              <a:noFill/>
-              <a:ln w="6350">
-                <a:solidFill>
-                  <a:srgbClr val="002060"/>
-                </a:solidFill>
-              </a:ln>
-            </p:spPr>
-            <p:style>
-              <a:lnRef idx="2">
-                <a:schemeClr val="accent1">
-                  <a:shade val="50000"/>
-                </a:schemeClr>
-              </a:lnRef>
-              <a:fillRef idx="1">
-                <a:schemeClr val="accent1"/>
-              </a:fillRef>
-              <a:effectRef idx="0">
-                <a:schemeClr val="accent1"/>
-              </a:effectRef>
-              <a:fontRef idx="minor">
-                <a:schemeClr val="lt1"/>
-              </a:fontRef>
-            </p:style>
-            <p:txBody>
-              <a:bodyPr lIns="91440" tIns="45720" rIns="91440" bIns="45720" spcCol="0" rtlCol="0" anchor="ctr"/>
-              <a:lstStyle/>
-              <a:p>
-                <a:pPr algn="ctr"/>
-                <a:r>
-                  <a:rPr lang="en-US" sz="1100" b="1" dirty="0">
-                    <a:solidFill>
-                      <a:schemeClr val="tx1"/>
-                    </a:solidFill>
-                  </a:rPr>
-                  <a:t>SBase</a:t>
-                </a:r>
-              </a:p>
-            </p:txBody>
-          </p:sp>
-          <p:sp>
-            <p:nvSpPr>
-              <p:cNvPr id="40" name="Isosceles Triangle 39"/>
-              <p:cNvSpPr/>
-              <p:nvPr/>
-            </p:nvSpPr>
-            <p:spPr>
-              <a:xfrm>
-                <a:off x="4682364" y="522613"/>
-                <a:ext cx="159199" cy="114300"/>
-              </a:xfrm>
-              <a:prstGeom prst="triangle">
-                <a:avLst/>
-              </a:prstGeom>
-              <a:noFill/>
-              <a:ln w="6350">
-                <a:solidFill>
-                  <a:srgbClr val="002060"/>
-                </a:solidFill>
-              </a:ln>
-            </p:spPr>
-            <p:style>
-              <a:lnRef idx="2">
-                <a:schemeClr val="accent1">
-                  <a:shade val="50000"/>
-                </a:schemeClr>
-              </a:lnRef>
-              <a:fillRef idx="1">
-                <a:schemeClr val="accent1"/>
-              </a:fillRef>
-              <a:effectRef idx="0">
-                <a:schemeClr val="accent1"/>
-              </a:effectRef>
-              <a:fontRef idx="minor">
-                <a:schemeClr val="lt1"/>
-              </a:fontRef>
-            </p:style>
-            <p:txBody>
-              <a:bodyPr lIns="91440" tIns="45720" rIns="91440" bIns="45720" spcCol="0" rtlCol="0" anchor="ctr"/>
-              <a:lstStyle/>
-              <a:p>
-                <a:pPr algn="ctr"/>
-                <a:endParaRPr lang="en-US" sz="1100" b="1" dirty="0">
-                  <a:solidFill>
-                    <a:schemeClr val="tx1"/>
-                  </a:solidFill>
-                </a:endParaRPr>
-              </a:p>
-            </p:txBody>
-          </p:sp>
-        </p:grpSp>
-        <p:cxnSp>
-          <p:nvCxnSpPr>
-            <p:cNvPr id="41" name="Elbow Connector 40"/>
-            <p:cNvCxnSpPr>
-              <a:stCxn id="49" idx="3"/>
-              <a:endCxn id="40" idx="3"/>
-            </p:cNvCxnSpPr>
-            <p:nvPr/>
-          </p:nvCxnSpPr>
-          <p:spPr>
-            <a:xfrm flipV="1">
-              <a:off x="1644883" y="567948"/>
-              <a:ext cx="2052582" cy="2247098"/>
-            </a:xfrm>
-            <a:prstGeom prst="bentConnector2">
-              <a:avLst/>
-            </a:prstGeom>
-            <a:ln w="6350">
-              <a:solidFill>
-                <a:srgbClr val="0070C0"/>
-              </a:solidFill>
-            </a:ln>
-          </p:spPr>
-          <p:style>
-            <a:lnRef idx="1">
-              <a:schemeClr val="accent1"/>
-            </a:lnRef>
-            <a:fillRef idx="0">
-              <a:schemeClr val="accent1"/>
-            </a:fillRef>
-            <a:effectRef idx="0">
-              <a:schemeClr val="accent1"/>
-            </a:effectRef>
-            <a:fontRef idx="minor">
-              <a:schemeClr val="tx1"/>
-            </a:fontRef>
-          </p:style>
-        </p:cxnSp>
         <p:sp>
           <p:nvSpPr>
-            <p:cNvPr id="42" name="Rectangle 41"/>
+            <p:cNvPr id="49" name="Rectangle 48"/>
             <p:cNvSpPr/>
             <p:nvPr/>
           </p:nvSpPr>
           <p:spPr>
             <a:xfrm>
-              <a:off x="57873" y="2309846"/>
-              <a:ext cx="880369" cy="369332"/>
-            </a:xfrm>
-            <a:prstGeom prst="rect">
-              <a:avLst/>
-            </a:prstGeom>
-            <a:ln>
-              <a:noFill/>
-            </a:ln>
-          </p:spPr>
-          <p:txBody>
-            <a:bodyPr wrap="none" lIns="91440" tIns="45720" rIns="91440" bIns="45720">
-              <a:spAutoFit/>
-            </a:bodyPr>
-            <a:lstStyle/>
-            <a:p>
-              <a:r>
-                <a:rPr lang="en-US" sz="900" dirty="0" err="1" smtClean="0">
-                  <a:solidFill>
-                    <a:srgbClr val="0070C0"/>
-                  </a:solidFill>
-                </a:rPr>
-                <a:t>listOfDeletions</a:t>
-              </a:r>
-              <a:endParaRPr lang="en-US" sz="900" dirty="0">
-                <a:solidFill>
-                  <a:srgbClr val="0070C0"/>
-                </a:solidFill>
-              </a:endParaRPr>
-            </a:p>
-            <a:p>
-              <a:r>
-                <a:rPr lang="en-US" sz="900" dirty="0">
-                  <a:solidFill>
-                    <a:srgbClr val="0070C0"/>
-                  </a:solidFill>
-                </a:rPr>
-                <a:t>0,1</a:t>
-              </a:r>
-            </a:p>
-          </p:txBody>
-        </p:sp>
-        <p:sp>
-          <p:nvSpPr>
-            <p:cNvPr id="43" name="Rectangle 42"/>
-            <p:cNvSpPr/>
-            <p:nvPr/>
-          </p:nvSpPr>
-          <p:spPr>
-            <a:xfrm>
-              <a:off x="51292" y="1320181"/>
-              <a:ext cx="639919" cy="230832"/>
-            </a:xfrm>
-            <a:prstGeom prst="rect">
-              <a:avLst/>
-            </a:prstGeom>
-            <a:ln>
-              <a:noFill/>
-            </a:ln>
-          </p:spPr>
-          <p:txBody>
-            <a:bodyPr wrap="none" lIns="91440" tIns="45720" rIns="91440" bIns="45720">
-              <a:spAutoFit/>
-            </a:bodyPr>
-            <a:lstStyle/>
-            <a:p>
-              <a:r>
-                <a:rPr lang="en-US" sz="900" dirty="0" err="1" smtClean="0">
-                  <a:solidFill>
-                    <a:srgbClr val="0070C0"/>
-                  </a:solidFill>
-                </a:rPr>
-                <a:t>modelRef</a:t>
-              </a:r>
-              <a:endParaRPr lang="en-US" sz="900" dirty="0">
-                <a:solidFill>
-                  <a:srgbClr val="0070C0"/>
-                </a:solidFill>
-              </a:endParaRPr>
-            </a:p>
-          </p:txBody>
-        </p:sp>
-        <p:sp>
-          <p:nvSpPr>
-            <p:cNvPr id="44" name="Rectangle 43"/>
-            <p:cNvSpPr/>
-            <p:nvPr/>
-          </p:nvSpPr>
-          <p:spPr>
-            <a:xfrm>
-              <a:off x="378821" y="3404527"/>
-              <a:ext cx="1648969" cy="472281"/>
-            </a:xfrm>
-            <a:prstGeom prst="rect">
-              <a:avLst/>
-            </a:prstGeom>
-            <a:noFill/>
-            <a:ln w="6350">
-              <a:solidFill>
-                <a:srgbClr val="0070C0"/>
-              </a:solidFill>
-            </a:ln>
-          </p:spPr>
-          <p:style>
-            <a:lnRef idx="2">
-              <a:schemeClr val="accent1">
-                <a:shade val="50000"/>
-              </a:schemeClr>
-            </a:lnRef>
-            <a:fillRef idx="1">
-              <a:schemeClr val="accent1"/>
-            </a:fillRef>
-            <a:effectRef idx="0">
-              <a:schemeClr val="accent1"/>
-            </a:effectRef>
-            <a:fontRef idx="minor">
-              <a:schemeClr val="lt1"/>
-            </a:fontRef>
-          </p:style>
-          <p:txBody>
-            <a:bodyPr lIns="91440" tIns="45720" rIns="91440" bIns="45720" spcCol="0" rtlCol="0" anchor="t"/>
-            <a:lstStyle/>
-            <a:p>
-              <a:pPr algn="ctr"/>
-              <a:r>
-                <a:rPr lang="en-US" sz="1100" b="1" dirty="0" smtClean="0">
-                  <a:solidFill>
-                    <a:srgbClr val="0070C0"/>
-                  </a:solidFill>
-                </a:rPr>
-                <a:t>Deletion</a:t>
-              </a:r>
-            </a:p>
-            <a:p>
-              <a:r>
-                <a:rPr lang="en-US" sz="900" dirty="0">
-                  <a:solidFill>
-                    <a:srgbClr val="0070C0"/>
-                  </a:solidFill>
-                </a:rPr>
-                <a:t>id: </a:t>
-              </a:r>
-              <a:r>
-                <a:rPr lang="en-US" sz="900" dirty="0" err="1" smtClean="0">
-                  <a:solidFill>
-                    <a:srgbClr val="0070C0"/>
-                  </a:solidFill>
-                </a:rPr>
-                <a:t>SId</a:t>
-              </a:r>
-              <a:r>
-                <a:rPr lang="en-US" sz="900" dirty="0" smtClean="0">
-                  <a:solidFill>
-                    <a:srgbClr val="0070C0"/>
-                  </a:solidFill>
-                </a:rPr>
-                <a:t> </a:t>
-              </a:r>
-              <a:r>
-                <a:rPr lang="en-US" sz="900" dirty="0">
-                  <a:solidFill>
-                    <a:srgbClr val="0070C0"/>
-                  </a:solidFill>
-                </a:rPr>
-                <a:t>{use=“optional</a:t>
-              </a:r>
-              <a:r>
-                <a:rPr lang="en-US" sz="900" dirty="0" smtClean="0">
-                  <a:solidFill>
-                    <a:srgbClr val="0070C0"/>
-                  </a:solidFill>
-                </a:rPr>
-                <a:t>”}</a:t>
-              </a:r>
-              <a:endParaRPr lang="en-US" sz="900" dirty="0">
-                <a:solidFill>
-                  <a:srgbClr val="0070C0"/>
-                </a:solidFill>
-              </a:endParaRPr>
-            </a:p>
-          </p:txBody>
-        </p:sp>
-        <p:sp>
-          <p:nvSpPr>
-            <p:cNvPr id="45" name="Rectangle 44"/>
-            <p:cNvSpPr/>
-            <p:nvPr/>
-          </p:nvSpPr>
-          <p:spPr>
-            <a:xfrm>
-              <a:off x="134512" y="3064104"/>
-              <a:ext cx="575799" cy="369332"/>
-            </a:xfrm>
-            <a:prstGeom prst="rect">
-              <a:avLst/>
-            </a:prstGeom>
-            <a:ln>
-              <a:noFill/>
-            </a:ln>
-          </p:spPr>
-          <p:txBody>
-            <a:bodyPr wrap="none" lIns="91440" tIns="45720" rIns="91440" bIns="45720">
-              <a:spAutoFit/>
-            </a:bodyPr>
-            <a:lstStyle/>
-            <a:p>
-              <a:r>
-                <a:rPr lang="en-US" sz="900" dirty="0" smtClean="0">
-                  <a:solidFill>
-                    <a:srgbClr val="0070C0"/>
-                  </a:solidFill>
-                </a:rPr>
-                <a:t>deletion</a:t>
-              </a:r>
-              <a:endParaRPr lang="en-US" sz="900" dirty="0">
-                <a:solidFill>
-                  <a:srgbClr val="0070C0"/>
-                </a:solidFill>
-              </a:endParaRPr>
-            </a:p>
-            <a:p>
-              <a:r>
-                <a:rPr lang="en-US" sz="900" dirty="0">
-                  <a:solidFill>
-                    <a:srgbClr val="0070C0"/>
-                  </a:solidFill>
-                </a:rPr>
-                <a:t>0,…,*</a:t>
-              </a:r>
-            </a:p>
-          </p:txBody>
-        </p:sp>
-        <p:cxnSp>
-          <p:nvCxnSpPr>
-            <p:cNvPr id="46" name="Elbow Connector 45"/>
-            <p:cNvCxnSpPr>
-              <a:stCxn id="53" idx="3"/>
-              <a:endCxn id="40" idx="3"/>
-            </p:cNvCxnSpPr>
-            <p:nvPr/>
-          </p:nvCxnSpPr>
-          <p:spPr>
-            <a:xfrm flipV="1">
-              <a:off x="1941463" y="567948"/>
-              <a:ext cx="1756002" cy="1357024"/>
-            </a:xfrm>
-            <a:prstGeom prst="bentConnector2">
-              <a:avLst/>
-            </a:prstGeom>
-            <a:ln w="6350">
-              <a:solidFill>
-                <a:srgbClr val="0070C0"/>
-              </a:solidFill>
-            </a:ln>
-          </p:spPr>
-          <p:style>
-            <a:lnRef idx="1">
-              <a:schemeClr val="accent1"/>
-            </a:lnRef>
-            <a:fillRef idx="0">
-              <a:schemeClr val="accent1"/>
-            </a:fillRef>
-            <a:effectRef idx="0">
-              <a:schemeClr val="accent1"/>
-            </a:effectRef>
-            <a:fontRef idx="minor">
-              <a:schemeClr val="tx1"/>
-            </a:fontRef>
-          </p:style>
-        </p:cxnSp>
-        <p:cxnSp>
-          <p:nvCxnSpPr>
-            <p:cNvPr id="47" name="Elbow Connector 46"/>
-            <p:cNvCxnSpPr>
-              <a:stCxn id="55" idx="3"/>
-              <a:endCxn id="40" idx="3"/>
-            </p:cNvCxnSpPr>
-            <p:nvPr/>
-          </p:nvCxnSpPr>
-          <p:spPr>
-            <a:xfrm flipV="1">
-              <a:off x="3432353" y="567948"/>
-              <a:ext cx="265112" cy="2572133"/>
-            </a:xfrm>
-            <a:prstGeom prst="bentConnector2">
-              <a:avLst/>
-            </a:prstGeom>
-            <a:ln w="6350">
-              <a:solidFill>
-                <a:srgbClr val="0070C0"/>
-              </a:solidFill>
-            </a:ln>
-          </p:spPr>
-          <p:style>
-            <a:lnRef idx="1">
-              <a:schemeClr val="accent1"/>
-            </a:lnRef>
-            <a:fillRef idx="0">
-              <a:schemeClr val="accent1"/>
-            </a:fillRef>
-            <a:effectRef idx="0">
-              <a:schemeClr val="accent1"/>
-            </a:effectRef>
-            <a:fontRef idx="minor">
-              <a:schemeClr val="tx1"/>
-            </a:fontRef>
-          </p:style>
-        </p:cxnSp>
-        <p:grpSp>
-          <p:nvGrpSpPr>
-            <p:cNvPr id="48" name="Group 47"/>
-            <p:cNvGrpSpPr/>
-            <p:nvPr/>
-          </p:nvGrpSpPr>
-          <p:grpSpPr>
-            <a:xfrm>
-              <a:off x="155210" y="2662646"/>
-              <a:ext cx="1489673" cy="459579"/>
-              <a:chOff x="162625" y="2625999"/>
-              <a:chExt cx="1489673" cy="459579"/>
-            </a:xfrm>
-          </p:grpSpPr>
-          <p:sp>
-            <p:nvSpPr>
-              <p:cNvPr id="49" name="Rectangle 48"/>
-              <p:cNvSpPr/>
-              <p:nvPr/>
-            </p:nvSpPr>
-            <p:spPr>
-              <a:xfrm>
-                <a:off x="195272" y="2625999"/>
-                <a:ext cx="1457026" cy="304800"/>
-              </a:xfrm>
-              <a:prstGeom prst="rect">
-                <a:avLst/>
-              </a:prstGeom>
-              <a:noFill/>
-              <a:ln w="6350">
-                <a:solidFill>
-                  <a:srgbClr val="0070C0"/>
-                </a:solidFill>
-              </a:ln>
-            </p:spPr>
-            <p:style>
-              <a:lnRef idx="2">
-                <a:schemeClr val="accent1">
-                  <a:shade val="50000"/>
-                </a:schemeClr>
-              </a:lnRef>
-              <a:fillRef idx="1">
-                <a:schemeClr val="accent1"/>
-              </a:fillRef>
-              <a:effectRef idx="0">
-                <a:schemeClr val="accent1"/>
-              </a:effectRef>
-              <a:fontRef idx="minor">
-                <a:schemeClr val="lt1"/>
-              </a:fontRef>
-            </p:style>
-            <p:txBody>
-              <a:bodyPr lIns="91440" tIns="45720" rIns="91440" bIns="45720" spcCol="0" rtlCol="0" anchor="ctr"/>
-              <a:lstStyle/>
-              <a:p>
-                <a:pPr algn="ctr"/>
-                <a:r>
-                  <a:rPr lang="en-US" sz="1100" b="1" dirty="0" err="1" smtClean="0">
-                    <a:solidFill>
-                      <a:srgbClr val="0070C0"/>
-                    </a:solidFill>
-                  </a:rPr>
-                  <a:t>ListOfDeletions</a:t>
-                </a:r>
-                <a:endParaRPr lang="en-US" sz="1100" b="1" dirty="0">
-                  <a:solidFill>
-                    <a:srgbClr val="0070C0"/>
-                  </a:solidFill>
-                </a:endParaRPr>
-              </a:p>
-            </p:txBody>
-          </p:sp>
-          <p:sp>
-            <p:nvSpPr>
-              <p:cNvPr id="50" name="Diamond 49"/>
-              <p:cNvSpPr/>
-              <p:nvPr/>
-            </p:nvSpPr>
-            <p:spPr>
-              <a:xfrm>
-                <a:off x="162625" y="2933180"/>
-                <a:ext cx="66869" cy="152398"/>
-              </a:xfrm>
-              <a:prstGeom prst="diamond">
-                <a:avLst/>
-              </a:prstGeom>
-              <a:solidFill>
-                <a:srgbClr val="0070C0"/>
-              </a:solidFill>
-              <a:ln w="6350">
-                <a:solidFill>
-                  <a:srgbClr val="0070C0"/>
-                </a:solidFill>
-              </a:ln>
-            </p:spPr>
-            <p:style>
-              <a:lnRef idx="2">
-                <a:schemeClr val="accent1">
-                  <a:shade val="50000"/>
-                </a:schemeClr>
-              </a:lnRef>
-              <a:fillRef idx="1">
-                <a:schemeClr val="accent1"/>
-              </a:fillRef>
-              <a:effectRef idx="0">
-                <a:schemeClr val="accent1"/>
-              </a:effectRef>
-              <a:fontRef idx="minor">
-                <a:schemeClr val="lt1"/>
-              </a:fontRef>
-            </p:style>
-            <p:txBody>
-              <a:bodyPr lIns="91440" tIns="45720" rIns="91440" bIns="45720" spcCol="0" rtlCol="0" anchor="ctr"/>
-              <a:lstStyle/>
-              <a:p>
-                <a:pPr algn="ctr"/>
-                <a:endParaRPr lang="en-US">
-                  <a:solidFill>
-                    <a:srgbClr val="0070C0"/>
-                  </a:solidFill>
-                </a:endParaRPr>
-              </a:p>
-            </p:txBody>
-          </p:sp>
-        </p:grpSp>
-        <p:cxnSp>
-          <p:nvCxnSpPr>
-            <p:cNvPr id="51" name="Elbow Connector 50"/>
-            <p:cNvCxnSpPr>
-              <a:stCxn id="33" idx="3"/>
-              <a:endCxn id="40" idx="3"/>
-            </p:cNvCxnSpPr>
-            <p:nvPr/>
-          </p:nvCxnSpPr>
-          <p:spPr>
-            <a:xfrm flipV="1">
-              <a:off x="2855977" y="567948"/>
-              <a:ext cx="841488" cy="132815"/>
-            </a:xfrm>
-            <a:prstGeom prst="bentConnector2">
-              <a:avLst/>
-            </a:prstGeom>
-            <a:ln w="6350">
-              <a:solidFill>
-                <a:srgbClr val="0070C0"/>
-              </a:solidFill>
-            </a:ln>
-          </p:spPr>
-          <p:style>
-            <a:lnRef idx="1">
-              <a:schemeClr val="accent1"/>
-            </a:lnRef>
-            <a:fillRef idx="0">
-              <a:schemeClr val="accent1"/>
-            </a:fillRef>
-            <a:effectRef idx="0">
-              <a:schemeClr val="accent1"/>
-            </a:effectRef>
-            <a:fontRef idx="minor">
-              <a:schemeClr val="tx1"/>
-            </a:fontRef>
-          </p:style>
-        </p:cxnSp>
-        <p:grpSp>
-          <p:nvGrpSpPr>
-            <p:cNvPr id="52" name="Group 51"/>
-            <p:cNvGrpSpPr/>
-            <p:nvPr/>
-          </p:nvGrpSpPr>
-          <p:grpSpPr>
-            <a:xfrm>
-              <a:off x="187857" y="1588422"/>
-              <a:ext cx="1753606" cy="673100"/>
-              <a:chOff x="195272" y="1551775"/>
-              <a:chExt cx="1753606" cy="673100"/>
-            </a:xfrm>
-          </p:grpSpPr>
-          <p:sp>
-            <p:nvSpPr>
-              <p:cNvPr id="53" name="Rectangle 52"/>
-              <p:cNvSpPr/>
-              <p:nvPr/>
-            </p:nvSpPr>
-            <p:spPr>
-              <a:xfrm>
-                <a:off x="195272" y="1551775"/>
-                <a:ext cx="1753606" cy="673100"/>
-              </a:xfrm>
-              <a:prstGeom prst="rect">
-                <a:avLst/>
-              </a:prstGeom>
-              <a:noFill/>
-              <a:ln w="6350">
-                <a:solidFill>
-                  <a:srgbClr val="0070C0"/>
-                </a:solidFill>
-              </a:ln>
-            </p:spPr>
-            <p:style>
-              <a:lnRef idx="2">
-                <a:schemeClr val="accent1">
-                  <a:shade val="50000"/>
-                </a:schemeClr>
-              </a:lnRef>
-              <a:fillRef idx="1">
-                <a:schemeClr val="accent1"/>
-              </a:fillRef>
-              <a:effectRef idx="0">
-                <a:schemeClr val="accent1"/>
-              </a:effectRef>
-              <a:fontRef idx="minor">
-                <a:schemeClr val="lt1"/>
-              </a:fontRef>
-            </p:style>
-            <p:txBody>
-              <a:bodyPr lIns="91440" tIns="45720" rIns="91440" bIns="45720" spcCol="0" rtlCol="0" anchor="t"/>
-              <a:lstStyle/>
-              <a:p>
-                <a:pPr algn="ctr"/>
-                <a:r>
-                  <a:rPr lang="en-US" sz="1100" b="1" dirty="0" err="1" smtClean="0">
-                    <a:solidFill>
-                      <a:srgbClr val="0070C0"/>
-                    </a:solidFill>
-                  </a:rPr>
-                  <a:t>ModelRef</a:t>
-                </a:r>
-                <a:endParaRPr lang="en-US" sz="1100" b="1" dirty="0" smtClean="0">
-                  <a:solidFill>
-                    <a:srgbClr val="0070C0"/>
-                  </a:solidFill>
-                </a:endParaRPr>
-              </a:p>
-              <a:p>
-                <a:r>
-                  <a:rPr lang="en-US" sz="900" dirty="0" smtClean="0">
-                    <a:solidFill>
-                      <a:srgbClr val="0070C0"/>
-                    </a:solidFill>
-                  </a:rPr>
-                  <a:t>model: </a:t>
-                </a:r>
-                <a:r>
-                  <a:rPr lang="en-US" sz="900" dirty="0" err="1" smtClean="0">
-                    <a:solidFill>
-                      <a:srgbClr val="0070C0"/>
-                    </a:solidFill>
-                  </a:rPr>
-                  <a:t>SIdRef</a:t>
-                </a:r>
-                <a:r>
-                  <a:rPr lang="en-US" sz="900" dirty="0" smtClean="0">
-                    <a:solidFill>
-                      <a:srgbClr val="0070C0"/>
-                    </a:solidFill>
-                  </a:rPr>
-                  <a:t> {use=“optional”}</a:t>
-                </a:r>
-              </a:p>
-              <a:p>
-                <a:r>
-                  <a:rPr lang="en-US" sz="900" dirty="0" err="1" smtClean="0">
-                    <a:solidFill>
-                      <a:srgbClr val="0070C0"/>
-                    </a:solidFill>
-                  </a:rPr>
-                  <a:t>xlink:href</a:t>
-                </a:r>
-                <a:r>
-                  <a:rPr lang="en-US" sz="900" dirty="0" smtClean="0">
-                    <a:solidFill>
-                      <a:srgbClr val="0070C0"/>
-                    </a:solidFill>
-                  </a:rPr>
-                  <a:t>: string {use=“optional”}</a:t>
-                </a:r>
-              </a:p>
-              <a:p>
-                <a:r>
-                  <a:rPr lang="en-US" sz="900" dirty="0" smtClean="0">
-                    <a:solidFill>
-                      <a:srgbClr val="0070C0"/>
-                    </a:solidFill>
-                  </a:rPr>
-                  <a:t>md5: string {use=“optional”}</a:t>
-                </a:r>
-                <a:endParaRPr lang="en-US" sz="900" dirty="0">
-                  <a:solidFill>
-                    <a:srgbClr val="0070C0"/>
-                  </a:solidFill>
-                </a:endParaRPr>
-              </a:p>
-            </p:txBody>
-          </p:sp>
-          <p:cxnSp>
-            <p:nvCxnSpPr>
-              <p:cNvPr id="54" name="Straight Connector 53"/>
-              <p:cNvCxnSpPr/>
-              <p:nvPr/>
-            </p:nvCxnSpPr>
-            <p:spPr>
-              <a:xfrm>
-                <a:off x="201406" y="1731911"/>
-                <a:ext cx="1747472" cy="0"/>
-              </a:xfrm>
-              <a:prstGeom prst="line">
-                <a:avLst/>
-              </a:prstGeom>
-              <a:ln w="6350">
-                <a:solidFill>
-                  <a:srgbClr val="0070C0"/>
-                </a:solidFill>
-              </a:ln>
-            </p:spPr>
-            <p:style>
-              <a:lnRef idx="1">
-                <a:schemeClr val="accent1"/>
-              </a:lnRef>
-              <a:fillRef idx="0">
-                <a:schemeClr val="accent1"/>
-              </a:fillRef>
-              <a:effectRef idx="0">
-                <a:schemeClr val="accent1"/>
-              </a:effectRef>
-              <a:fontRef idx="minor">
-                <a:schemeClr val="tx1"/>
-              </a:fontRef>
-            </p:style>
-          </p:cxnSp>
-        </p:grpSp>
-        <p:sp>
-          <p:nvSpPr>
-            <p:cNvPr id="55" name="Rectangle 54"/>
-            <p:cNvSpPr/>
-            <p:nvPr/>
-          </p:nvSpPr>
-          <p:spPr>
-            <a:xfrm>
-              <a:off x="2482372" y="2987681"/>
-              <a:ext cx="949981" cy="304800"/>
+              <a:off x="195272" y="2625999"/>
+              <a:ext cx="1457026" cy="304800"/>
             </a:xfrm>
             <a:prstGeom prst="rect">
               <a:avLst/>
@@ -4884,7 +4571,7 @@
                     <a:srgbClr val="0070C0"/>
                   </a:solidFill>
                 </a:rPr>
-                <a:t>Subelement</a:t>
+                <a:t>ListOfDeletions</a:t>
               </a:r>
               <a:endParaRPr lang="en-US" sz="1100" b="1" dirty="0">
                 <a:solidFill>
@@ -4896,19 +4583,21 @@
         </p:sp>
         <p:sp>
           <p:nvSpPr>
-            <p:cNvPr id="56" name="Isosceles Triangle 55"/>
+            <p:cNvPr id="50" name="Diamond 49"/>
             <p:cNvSpPr/>
             <p:nvPr/>
           </p:nvSpPr>
           <p:spPr>
             <a:xfrm>
-              <a:off x="2877762" y="3292481"/>
-              <a:ext cx="159199" cy="114300"/>
+              <a:off x="162625" y="2933180"/>
+              <a:ext cx="66869" cy="152398"/>
             </a:xfrm>
-            <a:prstGeom prst="triangle">
+            <a:prstGeom prst="diamond">
               <a:avLst/>
             </a:prstGeom>
-            <a:noFill/>
+            <a:solidFill>
+              <a:srgbClr val="0070C0"/>
+            </a:solidFill>
             <a:ln w="6350">
               <a:solidFill>
                 <a:srgbClr val="0070C0"/>
@@ -4936,7 +4625,7 @@
             <a:lstStyle/>
             <a:p>
               <a:pPr algn="ctr"/>
-              <a:endParaRPr lang="en-US" sz="1100" b="1" dirty="0">
+              <a:endParaRPr lang="en-US">
                 <a:solidFill>
                   <a:srgbClr val="0070C0"/>
                 </a:solidFill>
@@ -4944,23 +4633,74 @@
             </a:p>
           </p:txBody>
         </p:sp>
-        <p:cxnSp>
-          <p:nvCxnSpPr>
-            <p:cNvPr id="57" name="Elbow Connector 56"/>
-            <p:cNvCxnSpPr>
-              <a:stCxn id="44" idx="3"/>
-              <a:endCxn id="56" idx="3"/>
-            </p:cNvCxnSpPr>
+      </p:grpSp>
+      <p:cxnSp>
+        <p:nvCxnSpPr>
+          <p:cNvPr id="51" name="Elbow Connector 50"/>
+          <p:cNvCxnSpPr>
+            <a:stCxn id="33" idx="3"/>
+            <a:endCxn id="40" idx="3"/>
+          </p:cNvCxnSpPr>
+          <p:nvPr/>
+        </p:nvCxnSpPr>
+        <p:spPr>
+          <a:xfrm flipV="1">
+            <a:off x="2855977" y="567948"/>
+            <a:ext cx="841488" cy="103804"/>
+          </a:xfrm>
+          <a:prstGeom prst="bentConnector2">
+            <a:avLst/>
+          </a:prstGeom>
+          <a:ln w="6350">
+            <a:solidFill>
+              <a:srgbClr val="0070C0"/>
+            </a:solidFill>
+          </a:ln>
+        </p:spPr>
+        <p:style>
+          <a:lnRef idx="1">
+            <a:schemeClr val="accent1"/>
+          </a:lnRef>
+          <a:fillRef idx="0">
+            <a:schemeClr val="accent1"/>
+          </a:fillRef>
+          <a:effectRef idx="0">
+            <a:schemeClr val="accent1"/>
+          </a:effectRef>
+          <a:fontRef idx="minor">
+            <a:schemeClr val="tx1"/>
+          </a:fontRef>
+        </p:style>
+      </p:cxnSp>
+      <p:grpSp>
+        <p:nvGrpSpPr>
+          <p:cNvPr id="52" name="Group 51"/>
+          <p:cNvGrpSpPr/>
+          <p:nvPr/>
+        </p:nvGrpSpPr>
+        <p:grpSpPr>
+          <a:xfrm>
+            <a:off x="187857" y="1588422"/>
+            <a:ext cx="1753606" cy="673100"/>
+            <a:chOff x="195272" y="1551775"/>
+            <a:chExt cx="1753606" cy="673100"/>
+          </a:xfrm>
+        </p:grpSpPr>
+        <p:sp>
+          <p:nvSpPr>
+            <p:cNvPr id="53" name="Rectangle 52"/>
+            <p:cNvSpPr/>
             <p:nvPr/>
-          </p:nvCxnSpPr>
+          </p:nvSpPr>
           <p:spPr>
-            <a:xfrm flipV="1">
-              <a:off x="2027790" y="3406781"/>
-              <a:ext cx="929572" cy="233887"/>
+            <a:xfrm>
+              <a:off x="195272" y="1551775"/>
+              <a:ext cx="1753606" cy="673100"/>
             </a:xfrm>
-            <a:prstGeom prst="bentConnector2">
+            <a:prstGeom prst="rect">
               <a:avLst/>
             </a:prstGeom>
+            <a:noFill/>
             <a:ln w="6350">
               <a:solidFill>
                 <a:srgbClr val="0070C0"/>
@@ -4968,30 +4708,111 @@
             </a:ln>
           </p:spPr>
           <p:style>
-            <a:lnRef idx="1">
-              <a:schemeClr val="accent1"/>
+            <a:lnRef idx="2">
+              <a:schemeClr val="accent1">
+                <a:shade val="50000"/>
+              </a:schemeClr>
             </a:lnRef>
-            <a:fillRef idx="0">
+            <a:fillRef idx="1">
               <a:schemeClr val="accent1"/>
             </a:fillRef>
             <a:effectRef idx="0">
               <a:schemeClr val="accent1"/>
             </a:effectRef>
             <a:fontRef idx="minor">
-              <a:schemeClr val="tx1"/>
+              <a:schemeClr val="lt1"/>
             </a:fontRef>
           </p:style>
-        </p:cxnSp>
+          <p:txBody>
+            <a:bodyPr lIns="91440" tIns="45720" rIns="91440" bIns="45720" spcCol="0" rtlCol="0" anchor="t"/>
+            <a:lstStyle/>
+            <a:p>
+              <a:pPr algn="ctr"/>
+              <a:r>
+                <a:rPr lang="en-US" sz="1100" b="1" dirty="0" err="1" smtClean="0">
+                  <a:solidFill>
+                    <a:srgbClr val="0070C0"/>
+                  </a:solidFill>
+                </a:rPr>
+                <a:t>ModelRef</a:t>
+              </a:r>
+              <a:endParaRPr lang="en-US" sz="1100" b="1" dirty="0" smtClean="0">
+                <a:solidFill>
+                  <a:srgbClr val="0070C0"/>
+                </a:solidFill>
+              </a:endParaRPr>
+            </a:p>
+            <a:p>
+              <a:r>
+                <a:rPr lang="en-US" sz="900" dirty="0" smtClean="0">
+                  <a:solidFill>
+                    <a:srgbClr val="0070C0"/>
+                  </a:solidFill>
+                </a:rPr>
+                <a:t>model: </a:t>
+              </a:r>
+              <a:r>
+                <a:rPr lang="en-US" sz="900" dirty="0" err="1" smtClean="0">
+                  <a:solidFill>
+                    <a:srgbClr val="0070C0"/>
+                  </a:solidFill>
+                </a:rPr>
+                <a:t>SIdRef</a:t>
+              </a:r>
+              <a:r>
+                <a:rPr lang="en-US" sz="900" dirty="0" smtClean="0">
+                  <a:solidFill>
+                    <a:srgbClr val="0070C0"/>
+                  </a:solidFill>
+                </a:rPr>
+                <a:t> {use=“optional”}</a:t>
+              </a:r>
+            </a:p>
+            <a:p>
+              <a:r>
+                <a:rPr lang="en-US" sz="900" dirty="0" err="1" smtClean="0">
+                  <a:solidFill>
+                    <a:srgbClr val="0070C0"/>
+                  </a:solidFill>
+                </a:rPr>
+                <a:t>xlink:href</a:t>
+              </a:r>
+              <a:r>
+                <a:rPr lang="en-US" sz="900" dirty="0" smtClean="0">
+                  <a:solidFill>
+                    <a:srgbClr val="0070C0"/>
+                  </a:solidFill>
+                </a:rPr>
+                <a:t>: string {use=“optional”}</a:t>
+              </a:r>
+            </a:p>
+            <a:p>
+              <a:r>
+                <a:rPr lang="en-US" sz="900" dirty="0" smtClean="0">
+                  <a:solidFill>
+                    <a:srgbClr val="0070C0"/>
+                  </a:solidFill>
+                </a:rPr>
+                <a:t>md5: string {use=“optional”}</a:t>
+              </a:r>
+              <a:endParaRPr lang="en-US" sz="900" dirty="0">
+                <a:solidFill>
+                  <a:srgbClr val="0070C0"/>
+                </a:solidFill>
+              </a:endParaRPr>
+            </a:p>
+          </p:txBody>
+        </p:sp>
         <p:cxnSp>
           <p:nvCxnSpPr>
-            <p:cNvPr id="60" name="Straight Connector 59"/>
+            <p:cNvPr id="54" name="Straight Connector 53"/>
             <p:cNvCxnSpPr/>
             <p:nvPr/>
           </p:nvCxnSpPr>
           <p:spPr>
             <a:xfrm>
-              <a:off x="378821" y="3594947"/>
-              <a:ext cx="1648969" cy="0"/>
+              <a:off x="201406" y="1731911"/>
+              <a:ext cx="1747472" cy="0"/>
             </a:xfrm>
             <a:prstGeom prst="line">
               <a:avLst/>
@@ -5018,6 +4839,187 @@
           </p:style>
         </p:cxnSp>
       </p:grpSp>
+      <p:sp>
+        <p:nvSpPr>
+          <p:cNvPr id="55" name="Rectangle 54"/>
+          <p:cNvSpPr/>
+          <p:nvPr/>
+        </p:nvSpPr>
+        <p:spPr>
+          <a:xfrm>
+            <a:off x="2482372" y="2987681"/>
+            <a:ext cx="949981" cy="304800"/>
+          </a:xfrm>
+          <a:prstGeom prst="rect">
+            <a:avLst/>
+          </a:prstGeom>
+          <a:noFill/>
+          <a:ln w="6350">
+            <a:solidFill>
+              <a:srgbClr val="0070C0"/>
+            </a:solidFill>
+          </a:ln>
+        </p:spPr>
+        <p:style>
+          <a:lnRef idx="2">
+            <a:schemeClr val="accent1">
+              <a:shade val="50000"/>
+            </a:schemeClr>
+          </a:lnRef>
+          <a:fillRef idx="1">
+            <a:schemeClr val="accent1"/>
+          </a:fillRef>
+          <a:effectRef idx="0">
+            <a:schemeClr val="accent1"/>
+          </a:effectRef>
+          <a:fontRef idx="minor">
+            <a:schemeClr val="lt1"/>
+          </a:fontRef>
+        </p:style>
+        <p:txBody>
+          <a:bodyPr lIns="91440" tIns="45720" rIns="91440" bIns="45720" spcCol="0" rtlCol="0" anchor="ctr"/>
+          <a:lstStyle/>
+          <a:p>
+            <a:pPr algn="ctr"/>
+            <a:r>
+              <a:rPr lang="en-US" sz="1100" b="1" dirty="0" err="1" smtClean="0">
+                <a:solidFill>
+                  <a:srgbClr val="0070C0"/>
+                </a:solidFill>
+              </a:rPr>
+              <a:t>Subelement</a:t>
+            </a:r>
+            <a:endParaRPr lang="en-US" sz="1100" b="1" dirty="0">
+              <a:solidFill>
+                <a:srgbClr val="0070C0"/>
+              </a:solidFill>
+            </a:endParaRPr>
+          </a:p>
+        </p:txBody>
+      </p:sp>
+      <p:sp>
+        <p:nvSpPr>
+          <p:cNvPr id="56" name="Isosceles Triangle 55"/>
+          <p:cNvSpPr/>
+          <p:nvPr/>
+        </p:nvSpPr>
+        <p:spPr>
+          <a:xfrm>
+            <a:off x="2877762" y="3292481"/>
+            <a:ext cx="159199" cy="114300"/>
+          </a:xfrm>
+          <a:prstGeom prst="triangle">
+            <a:avLst/>
+          </a:prstGeom>
+          <a:noFill/>
+          <a:ln w="6350">
+            <a:solidFill>
+              <a:srgbClr val="0070C0"/>
+            </a:solidFill>
+          </a:ln>
+        </p:spPr>
+        <p:style>
+          <a:lnRef idx="2">
+            <a:schemeClr val="accent1">
+              <a:shade val="50000"/>
+            </a:schemeClr>
+          </a:lnRef>
+          <a:fillRef idx="1">
+            <a:schemeClr val="accent1"/>
+          </a:fillRef>
+          <a:effectRef idx="0">
+            <a:schemeClr val="accent1"/>
+          </a:effectRef>
+          <a:fontRef idx="minor">
+            <a:schemeClr val="lt1"/>
+          </a:fontRef>
+        </p:style>
+        <p:txBody>
+          <a:bodyPr lIns="91440" tIns="45720" rIns="91440" bIns="45720" spcCol="0" rtlCol="0" anchor="ctr"/>
+          <a:lstStyle/>
+          <a:p>
+            <a:pPr algn="ctr"/>
+            <a:endParaRPr lang="en-US" sz="1100" b="1" dirty="0">
+              <a:solidFill>
+                <a:srgbClr val="0070C0"/>
+              </a:solidFill>
+            </a:endParaRPr>
+          </a:p>
+        </p:txBody>
+      </p:sp>
+      <p:cxnSp>
+        <p:nvCxnSpPr>
+          <p:cNvPr id="57" name="Elbow Connector 56"/>
+          <p:cNvCxnSpPr>
+            <a:stCxn id="44" idx="3"/>
+            <a:endCxn id="56" idx="3"/>
+          </p:cNvCxnSpPr>
+          <p:nvPr/>
+        </p:nvCxnSpPr>
+        <p:spPr>
+          <a:xfrm flipV="1">
+            <a:off x="2027790" y="3406781"/>
+            <a:ext cx="929572" cy="233887"/>
+          </a:xfrm>
+          <a:prstGeom prst="bentConnector2">
+            <a:avLst/>
+          </a:prstGeom>
+          <a:ln w="6350">
+            <a:solidFill>
+              <a:srgbClr val="0070C0"/>
+            </a:solidFill>
+          </a:ln>
+        </p:spPr>
+        <p:style>
+          <a:lnRef idx="1">
+            <a:schemeClr val="accent1"/>
+          </a:lnRef>
+          <a:fillRef idx="0">
+            <a:schemeClr val="accent1"/>
+          </a:fillRef>
+          <a:effectRef idx="0">
+            <a:schemeClr val="accent1"/>
+          </a:effectRef>
+          <a:fontRef idx="minor">
+            <a:schemeClr val="tx1"/>
+          </a:fontRef>
+        </p:style>
+      </p:cxnSp>
+      <p:cxnSp>
+        <p:nvCxnSpPr>
+          <p:cNvPr id="60" name="Straight Connector 59"/>
+          <p:cNvCxnSpPr/>
+          <p:nvPr/>
+        </p:nvCxnSpPr>
+        <p:spPr>
+          <a:xfrm>
+            <a:off x="378821" y="3594947"/>
+            <a:ext cx="1648969" cy="0"/>
+          </a:xfrm>
+          <a:prstGeom prst="line">
+            <a:avLst/>
+          </a:prstGeom>
+          <a:ln w="6350">
+            <a:solidFill>
+              <a:srgbClr val="0070C0"/>
+            </a:solidFill>
+          </a:ln>
+        </p:spPr>
+        <p:style>
+          <a:lnRef idx="1">
+            <a:schemeClr val="accent1"/>
+          </a:lnRef>
+          <a:fillRef idx="0">
+            <a:schemeClr val="accent1"/>
+          </a:fillRef>
+          <a:effectRef idx="0">
+            <a:schemeClr val="accent1"/>
+          </a:effectRef>
+          <a:fontRef idx="minor">
+            <a:schemeClr val="tx1"/>
+          </a:fontRef>
+        </p:style>
+      </p:cxnSp>
     </p:spTree>
     <p:extLst>
       <p:ext uri="{BB962C8B-B14F-4D97-AF65-F5344CB8AC3E}">

</xml_diff>

<commit_message>
A few more smallish changes:  namespace issues for the xml file; a few more Mike-induced text changes to the main document.
</commit_message>
<xml_diff>
--- a/sbml-level-3/version-1/comp/Submodel.pptx
+++ b/sbml-level-3/version-1/comp/Submodel.pptx
@@ -192,7 +192,7 @@
           <a:p>
             <a:fld id="{7754A941-C6C2-4027-B1F4-A5E937B2245F}" type="datetimeFigureOut">
               <a:rPr lang="en-US" smtClean="0"/>
-              <a:t>9/30/2010</a:t>
+              <a:t>10/6/2010</a:t>
             </a:fld>
             <a:endParaRPr lang="en-US"/>
           </a:p>
@@ -730,7 +730,7 @@
           <a:p>
             <a:fld id="{F0172217-DC24-48CD-AE89-68C8C8D878B4}" type="datetimeFigureOut">
               <a:rPr lang="en-US" smtClean="0"/>
-              <a:t>9/30/2010</a:t>
+              <a:t>10/6/2010</a:t>
             </a:fld>
             <a:endParaRPr lang="en-US"/>
           </a:p>
@@ -900,7 +900,7 @@
           <a:p>
             <a:fld id="{F0172217-DC24-48CD-AE89-68C8C8D878B4}" type="datetimeFigureOut">
               <a:rPr lang="en-US" smtClean="0"/>
-              <a:t>9/30/2010</a:t>
+              <a:t>10/6/2010</a:t>
             </a:fld>
             <a:endParaRPr lang="en-US"/>
           </a:p>
@@ -1080,7 +1080,7 @@
           <a:p>
             <a:fld id="{F0172217-DC24-48CD-AE89-68C8C8D878B4}" type="datetimeFigureOut">
               <a:rPr lang="en-US" smtClean="0"/>
-              <a:t>9/30/2010</a:t>
+              <a:t>10/6/2010</a:t>
             </a:fld>
             <a:endParaRPr lang="en-US"/>
           </a:p>
@@ -1250,7 +1250,7 @@
           <a:p>
             <a:fld id="{F0172217-DC24-48CD-AE89-68C8C8D878B4}" type="datetimeFigureOut">
               <a:rPr lang="en-US" smtClean="0"/>
-              <a:t>9/30/2010</a:t>
+              <a:t>10/6/2010</a:t>
             </a:fld>
             <a:endParaRPr lang="en-US"/>
           </a:p>
@@ -1496,7 +1496,7 @@
           <a:p>
             <a:fld id="{F0172217-DC24-48CD-AE89-68C8C8D878B4}" type="datetimeFigureOut">
               <a:rPr lang="en-US" smtClean="0"/>
-              <a:t>9/30/2010</a:t>
+              <a:t>10/6/2010</a:t>
             </a:fld>
             <a:endParaRPr lang="en-US"/>
           </a:p>
@@ -1784,7 +1784,7 @@
           <a:p>
             <a:fld id="{F0172217-DC24-48CD-AE89-68C8C8D878B4}" type="datetimeFigureOut">
               <a:rPr lang="en-US" smtClean="0"/>
-              <a:t>9/30/2010</a:t>
+              <a:t>10/6/2010</a:t>
             </a:fld>
             <a:endParaRPr lang="en-US"/>
           </a:p>
@@ -2206,7 +2206,7 @@
           <a:p>
             <a:fld id="{F0172217-DC24-48CD-AE89-68C8C8D878B4}" type="datetimeFigureOut">
               <a:rPr lang="en-US" smtClean="0"/>
-              <a:t>9/30/2010</a:t>
+              <a:t>10/6/2010</a:t>
             </a:fld>
             <a:endParaRPr lang="en-US"/>
           </a:p>
@@ -2324,7 +2324,7 @@
           <a:p>
             <a:fld id="{F0172217-DC24-48CD-AE89-68C8C8D878B4}" type="datetimeFigureOut">
               <a:rPr lang="en-US" smtClean="0"/>
-              <a:t>9/30/2010</a:t>
+              <a:t>10/6/2010</a:t>
             </a:fld>
             <a:endParaRPr lang="en-US"/>
           </a:p>
@@ -2419,7 +2419,7 @@
           <a:p>
             <a:fld id="{F0172217-DC24-48CD-AE89-68C8C8D878B4}" type="datetimeFigureOut">
               <a:rPr lang="en-US" smtClean="0"/>
-              <a:t>9/30/2010</a:t>
+              <a:t>10/6/2010</a:t>
             </a:fld>
             <a:endParaRPr lang="en-US"/>
           </a:p>
@@ -2696,7 +2696,7 @@
           <a:p>
             <a:fld id="{F0172217-DC24-48CD-AE89-68C8C8D878B4}" type="datetimeFigureOut">
               <a:rPr lang="en-US" smtClean="0"/>
-              <a:t>9/30/2010</a:t>
+              <a:t>10/6/2010</a:t>
             </a:fld>
             <a:endParaRPr lang="en-US"/>
           </a:p>
@@ -2949,7 +2949,7 @@
           <a:p>
             <a:fld id="{F0172217-DC24-48CD-AE89-68C8C8D878B4}" type="datetimeFigureOut">
               <a:rPr lang="en-US" smtClean="0"/>
-              <a:t>9/30/2010</a:t>
+              <a:t>10/6/2010</a:t>
             </a:fld>
             <a:endParaRPr lang="en-US"/>
           </a:p>
@@ -3162,7 +3162,7 @@
           <a:p>
             <a:fld id="{F0172217-DC24-48CD-AE89-68C8C8D878B4}" type="datetimeFigureOut">
               <a:rPr lang="en-US" smtClean="0"/>
-              <a:t>9/30/2010</a:t>
+              <a:t>10/6/2010</a:t>
             </a:fld>
             <a:endParaRPr lang="en-US"/>
           </a:p>
@@ -3537,1002 +3537,65 @@
           <a:chExt cx="0" cy="0"/>
         </a:xfrm>
       </p:grpSpPr>
-      <p:cxnSp>
-        <p:nvCxnSpPr>
-          <p:cNvPr id="31" name="Straight Connector 30"/>
-          <p:cNvCxnSpPr/>
-          <p:nvPr/>
-        </p:nvCxnSpPr>
-        <p:spPr>
-          <a:xfrm>
-            <a:off x="91207" y="285229"/>
-            <a:ext cx="2764770" cy="0"/>
-          </a:xfrm>
-          <a:prstGeom prst="line">
-            <a:avLst/>
-          </a:prstGeom>
-          <a:ln w="6350">
-            <a:solidFill>
-              <a:srgbClr val="0070C0"/>
-            </a:solidFill>
-          </a:ln>
-        </p:spPr>
-        <p:style>
-          <a:lnRef idx="1">
-            <a:schemeClr val="accent1"/>
-          </a:lnRef>
-          <a:fillRef idx="0">
-            <a:schemeClr val="accent1"/>
-          </a:fillRef>
-          <a:effectRef idx="0">
-            <a:schemeClr val="accent1"/>
-          </a:effectRef>
-          <a:fontRef idx="minor">
-            <a:schemeClr val="tx1"/>
-          </a:fontRef>
-        </p:style>
-      </p:cxnSp>
-      <p:sp>
-        <p:nvSpPr>
-          <p:cNvPr id="33" name="Rectangle 32"/>
-          <p:cNvSpPr/>
-          <p:nvPr/>
-        </p:nvSpPr>
-        <p:spPr>
-          <a:xfrm>
-            <a:off x="91207" y="84619"/>
-            <a:ext cx="2764770" cy="1174265"/>
-          </a:xfrm>
-          <a:prstGeom prst="rect">
-            <a:avLst/>
-          </a:prstGeom>
-          <a:noFill/>
-          <a:ln w="6350">
-            <a:solidFill>
-              <a:srgbClr val="0070C0"/>
-            </a:solidFill>
-          </a:ln>
-        </p:spPr>
-        <p:style>
-          <a:lnRef idx="2">
-            <a:schemeClr val="accent1">
-              <a:shade val="50000"/>
-            </a:schemeClr>
-          </a:lnRef>
-          <a:fillRef idx="1">
-            <a:schemeClr val="accent1"/>
-          </a:fillRef>
-          <a:effectRef idx="0">
-            <a:schemeClr val="accent1"/>
-          </a:effectRef>
-          <a:fontRef idx="minor">
-            <a:schemeClr val="lt1"/>
-          </a:fontRef>
-        </p:style>
-        <p:txBody>
-          <a:bodyPr rtlCol="0" anchor="t"/>
-          <a:lstStyle/>
-          <a:p>
-            <a:pPr algn="ctr"/>
-            <a:r>
-              <a:rPr lang="en-US" sz="1100" b="1" dirty="0" smtClean="0">
-                <a:solidFill>
-                  <a:srgbClr val="0070C0"/>
-                </a:solidFill>
-              </a:rPr>
-              <a:t>Submodel</a:t>
-            </a:r>
-            <a:endParaRPr lang="en-US" sz="1100" b="1" dirty="0">
-              <a:solidFill>
-                <a:srgbClr val="0070C0"/>
-              </a:solidFill>
-            </a:endParaRPr>
-          </a:p>
-          <a:p>
-            <a:r>
-              <a:rPr lang="en-US" sz="900" dirty="0" smtClean="0">
-                <a:solidFill>
-                  <a:srgbClr val="0070C0"/>
-                </a:solidFill>
-              </a:rPr>
-              <a:t>id: </a:t>
-            </a:r>
-            <a:r>
-              <a:rPr lang="en-US" sz="900" dirty="0" err="1" smtClean="0">
-                <a:solidFill>
-                  <a:srgbClr val="0070C0"/>
-                </a:solidFill>
-              </a:rPr>
-              <a:t>SId</a:t>
-            </a:r>
-            <a:r>
-              <a:rPr lang="en-US" sz="900" dirty="0" smtClean="0">
-                <a:solidFill>
-                  <a:srgbClr val="0070C0"/>
-                </a:solidFill>
-              </a:rPr>
-              <a:t> {use=“optional”}</a:t>
-            </a:r>
-          </a:p>
-          <a:p>
-            <a:r>
-              <a:rPr lang="en-US" sz="900" dirty="0" err="1">
-                <a:solidFill>
-                  <a:srgbClr val="0070C0"/>
-                </a:solidFill>
-              </a:rPr>
-              <a:t>lengthConversionFactor</a:t>
-            </a:r>
-            <a:r>
-              <a:rPr lang="en-US" sz="900" dirty="0">
-                <a:solidFill>
-                  <a:srgbClr val="0070C0"/>
-                </a:solidFill>
-              </a:rPr>
-              <a:t>: </a:t>
-            </a:r>
-            <a:r>
-              <a:rPr lang="en-US" sz="900" dirty="0" err="1">
-                <a:solidFill>
-                  <a:srgbClr val="0070C0"/>
-                </a:solidFill>
-              </a:rPr>
-              <a:t>SIdRef</a:t>
-            </a:r>
-            <a:r>
-              <a:rPr lang="en-US" sz="900" dirty="0">
-                <a:solidFill>
-                  <a:srgbClr val="0070C0"/>
-                </a:solidFill>
-              </a:rPr>
-              <a:t> {use=“optional”}</a:t>
-            </a:r>
-          </a:p>
-          <a:p>
-            <a:r>
-              <a:rPr lang="en-US" sz="900" dirty="0" err="1">
-                <a:solidFill>
-                  <a:srgbClr val="0070C0"/>
-                </a:solidFill>
-              </a:rPr>
-              <a:t>volumeConversionFactor</a:t>
-            </a:r>
-            <a:r>
-              <a:rPr lang="en-US" sz="900" dirty="0">
-                <a:solidFill>
-                  <a:srgbClr val="0070C0"/>
-                </a:solidFill>
-              </a:rPr>
-              <a:t>: </a:t>
-            </a:r>
-            <a:r>
-              <a:rPr lang="en-US" sz="900" dirty="0" err="1">
-                <a:solidFill>
-                  <a:srgbClr val="0070C0"/>
-                </a:solidFill>
-              </a:rPr>
-              <a:t>SIdRef</a:t>
-            </a:r>
-            <a:r>
-              <a:rPr lang="en-US" sz="900" dirty="0">
-                <a:solidFill>
-                  <a:srgbClr val="0070C0"/>
-                </a:solidFill>
-              </a:rPr>
-              <a:t> {use=“optional”}</a:t>
-            </a:r>
-          </a:p>
-          <a:p>
-            <a:r>
-              <a:rPr lang="en-US" sz="900" dirty="0" err="1" smtClean="0">
-                <a:solidFill>
-                  <a:srgbClr val="0070C0"/>
-                </a:solidFill>
-              </a:rPr>
-              <a:t>areaConversionFactor</a:t>
-            </a:r>
-            <a:r>
-              <a:rPr lang="en-US" sz="900" dirty="0" smtClean="0">
-                <a:solidFill>
-                  <a:srgbClr val="0070C0"/>
-                </a:solidFill>
-              </a:rPr>
-              <a:t>: </a:t>
-            </a:r>
-            <a:r>
-              <a:rPr lang="en-US" sz="900" dirty="0" err="1" smtClean="0">
-                <a:solidFill>
-                  <a:srgbClr val="0070C0"/>
-                </a:solidFill>
-              </a:rPr>
-              <a:t>SIdRef</a:t>
-            </a:r>
-            <a:r>
-              <a:rPr lang="en-US" sz="900" dirty="0" smtClean="0">
-                <a:solidFill>
-                  <a:srgbClr val="0070C0"/>
-                </a:solidFill>
-              </a:rPr>
-              <a:t> {use=“optional”}</a:t>
-            </a:r>
-          </a:p>
-          <a:p>
-            <a:r>
-              <a:rPr lang="en-US" sz="900" dirty="0" err="1" smtClean="0">
-                <a:solidFill>
-                  <a:srgbClr val="0070C0"/>
-                </a:solidFill>
-              </a:rPr>
-              <a:t>substanceConversionFactor</a:t>
-            </a:r>
-            <a:r>
-              <a:rPr lang="en-US" sz="900" dirty="0" smtClean="0">
-                <a:solidFill>
-                  <a:srgbClr val="0070C0"/>
-                </a:solidFill>
-              </a:rPr>
-              <a:t>: </a:t>
-            </a:r>
-            <a:r>
-              <a:rPr lang="en-US" sz="900" dirty="0" err="1" smtClean="0">
-                <a:solidFill>
-                  <a:srgbClr val="0070C0"/>
-                </a:solidFill>
-              </a:rPr>
-              <a:t>SIdRef</a:t>
-            </a:r>
-            <a:r>
-              <a:rPr lang="en-US" sz="900" dirty="0" smtClean="0">
-                <a:solidFill>
-                  <a:srgbClr val="0070C0"/>
-                </a:solidFill>
-              </a:rPr>
-              <a:t> {use=“optional”}</a:t>
-            </a:r>
-          </a:p>
-          <a:p>
-            <a:r>
-              <a:rPr lang="en-US" sz="900" dirty="0" err="1" smtClean="0">
-                <a:solidFill>
-                  <a:srgbClr val="0070C0"/>
-                </a:solidFill>
-              </a:rPr>
-              <a:t>timeConversionFactor</a:t>
-            </a:r>
-            <a:r>
-              <a:rPr lang="en-US" sz="900" dirty="0" smtClean="0">
-                <a:solidFill>
-                  <a:srgbClr val="0070C0"/>
-                </a:solidFill>
-              </a:rPr>
-              <a:t>: </a:t>
-            </a:r>
-            <a:r>
-              <a:rPr lang="en-US" sz="900" dirty="0" err="1" smtClean="0">
-                <a:solidFill>
-                  <a:srgbClr val="0070C0"/>
-                </a:solidFill>
-              </a:rPr>
-              <a:t>SIdRef</a:t>
-            </a:r>
-            <a:r>
-              <a:rPr lang="en-US" sz="900" dirty="0" smtClean="0">
-                <a:solidFill>
-                  <a:srgbClr val="0070C0"/>
-                </a:solidFill>
-              </a:rPr>
-              <a:t> {use=“optional</a:t>
-            </a:r>
-            <a:r>
-              <a:rPr lang="en-US" sz="900" dirty="0" smtClean="0">
-                <a:solidFill>
-                  <a:srgbClr val="0070C0"/>
-                </a:solidFill>
-              </a:rPr>
-              <a:t>”}</a:t>
-            </a:r>
-          </a:p>
-          <a:p>
-            <a:r>
-              <a:rPr lang="en-US" sz="900" dirty="0" err="1" smtClean="0">
-                <a:solidFill>
-                  <a:srgbClr val="0070C0"/>
-                </a:solidFill>
-              </a:rPr>
-              <a:t>extentConversionFactor</a:t>
-            </a:r>
-            <a:r>
-              <a:rPr lang="en-US" sz="900" dirty="0" smtClean="0">
-                <a:solidFill>
-                  <a:srgbClr val="0070C0"/>
-                </a:solidFill>
-              </a:rPr>
-              <a:t>: </a:t>
-            </a:r>
-            <a:r>
-              <a:rPr lang="en-US" sz="900" dirty="0" err="1" smtClean="0">
-                <a:solidFill>
-                  <a:srgbClr val="0070C0"/>
-                </a:solidFill>
-              </a:rPr>
-              <a:t>SIdRef</a:t>
-            </a:r>
-            <a:r>
-              <a:rPr lang="en-US" sz="900" dirty="0" smtClean="0">
-                <a:solidFill>
-                  <a:srgbClr val="0070C0"/>
-                </a:solidFill>
-              </a:rPr>
-              <a:t> {use=“optional”}</a:t>
-            </a:r>
-            <a:endParaRPr lang="en-US" sz="900" dirty="0" smtClean="0">
-              <a:solidFill>
-                <a:srgbClr val="0070C0"/>
-              </a:solidFill>
-            </a:endParaRPr>
-          </a:p>
-          <a:p>
-            <a:endParaRPr lang="en-US" sz="900" dirty="0">
-              <a:solidFill>
-                <a:srgbClr val="0070C0"/>
-              </a:solidFill>
-            </a:endParaRPr>
-          </a:p>
-        </p:txBody>
-      </p:sp>
-      <p:sp>
-        <p:nvSpPr>
-          <p:cNvPr id="34" name="Diamond 33"/>
-          <p:cNvSpPr/>
-          <p:nvPr/>
-        </p:nvSpPr>
-        <p:spPr>
-          <a:xfrm>
-            <a:off x="57847" y="1261265"/>
-            <a:ext cx="66869" cy="167916"/>
-          </a:xfrm>
-          <a:prstGeom prst="diamond">
-            <a:avLst/>
-          </a:prstGeom>
-          <a:solidFill>
-            <a:srgbClr val="0070C0"/>
-          </a:solidFill>
-          <a:ln w="6350">
-            <a:solidFill>
-              <a:srgbClr val="0070C0"/>
-            </a:solidFill>
-          </a:ln>
-        </p:spPr>
-        <p:style>
-          <a:lnRef idx="2">
-            <a:schemeClr val="accent1">
-              <a:shade val="50000"/>
-            </a:schemeClr>
-          </a:lnRef>
-          <a:fillRef idx="1">
-            <a:schemeClr val="accent1"/>
-          </a:fillRef>
-          <a:effectRef idx="0">
-            <a:schemeClr val="accent1"/>
-          </a:effectRef>
-          <a:fontRef idx="minor">
-            <a:schemeClr val="lt1"/>
-          </a:fontRef>
-        </p:style>
-        <p:txBody>
-          <a:bodyPr lIns="91440" tIns="45720" rIns="91440" bIns="45720" spcCol="0" rtlCol="0" anchor="ctr"/>
-          <a:lstStyle/>
-          <a:p>
-            <a:pPr algn="ctr"/>
-            <a:endParaRPr lang="en-US">
-              <a:solidFill>
-                <a:srgbClr val="0070C0"/>
-              </a:solidFill>
-            </a:endParaRPr>
-          </a:p>
-        </p:txBody>
-      </p:sp>
-      <p:cxnSp>
-        <p:nvCxnSpPr>
-          <p:cNvPr id="35" name="Elbow Connector 34"/>
-          <p:cNvCxnSpPr>
-            <a:stCxn id="34" idx="2"/>
-            <a:endCxn id="53" idx="0"/>
-          </p:cNvCxnSpPr>
-          <p:nvPr/>
-        </p:nvCxnSpPr>
-        <p:spPr>
-          <a:xfrm rot="16200000" flipH="1">
-            <a:off x="498351" y="1022112"/>
-            <a:ext cx="159241" cy="973378"/>
-          </a:xfrm>
-          <a:prstGeom prst="bentConnector3">
-            <a:avLst>
-              <a:gd name="adj1" fmla="val 50000"/>
-            </a:avLst>
-          </a:prstGeom>
-          <a:ln w="6350">
-            <a:solidFill>
-              <a:srgbClr val="0070C0"/>
-            </a:solidFill>
-          </a:ln>
-        </p:spPr>
-        <p:style>
-          <a:lnRef idx="1">
-            <a:schemeClr val="accent1"/>
-          </a:lnRef>
-          <a:fillRef idx="0">
-            <a:schemeClr val="accent1"/>
-          </a:fillRef>
-          <a:effectRef idx="0">
-            <a:schemeClr val="accent1"/>
-          </a:effectRef>
-          <a:fontRef idx="minor">
-            <a:schemeClr val="tx1"/>
-          </a:fontRef>
-        </p:style>
-      </p:cxnSp>
-      <p:cxnSp>
-        <p:nvCxnSpPr>
-          <p:cNvPr id="36" name="Elbow Connector 35"/>
-          <p:cNvCxnSpPr>
-            <a:stCxn id="50" idx="2"/>
-            <a:endCxn id="44" idx="0"/>
-          </p:cNvCxnSpPr>
-          <p:nvPr/>
-        </p:nvCxnSpPr>
-        <p:spPr>
-          <a:xfrm rot="16200000" flipH="1">
-            <a:off x="554824" y="2756045"/>
-            <a:ext cx="282302" cy="1014661"/>
-          </a:xfrm>
-          <a:prstGeom prst="bentConnector3">
-            <a:avLst>
-              <a:gd name="adj1" fmla="val 50000"/>
-            </a:avLst>
-          </a:prstGeom>
-          <a:ln w="6350">
-            <a:solidFill>
-              <a:srgbClr val="0070C0"/>
-            </a:solidFill>
-          </a:ln>
-        </p:spPr>
-        <p:style>
-          <a:lnRef idx="1">
-            <a:schemeClr val="accent1"/>
-          </a:lnRef>
-          <a:fillRef idx="0">
-            <a:schemeClr val="accent1"/>
-          </a:fillRef>
-          <a:effectRef idx="0">
-            <a:schemeClr val="accent1"/>
-          </a:effectRef>
-          <a:fontRef idx="minor">
-            <a:schemeClr val="tx1"/>
-          </a:fontRef>
-        </p:style>
-      </p:cxnSp>
-      <p:cxnSp>
-        <p:nvCxnSpPr>
-          <p:cNvPr id="37" name="Elbow Connector 36"/>
-          <p:cNvCxnSpPr>
-            <a:stCxn id="34" idx="2"/>
-            <a:endCxn id="49" idx="0"/>
-          </p:cNvCxnSpPr>
-          <p:nvPr/>
-        </p:nvCxnSpPr>
-        <p:spPr>
-          <a:xfrm rot="16200000" flipH="1">
-            <a:off x="-112906" y="1633369"/>
-            <a:ext cx="1233465" cy="825088"/>
-          </a:xfrm>
-          <a:prstGeom prst="bentConnector3">
-            <a:avLst>
-              <a:gd name="adj1" fmla="val 85203"/>
-            </a:avLst>
-          </a:prstGeom>
-          <a:ln w="6350">
-            <a:solidFill>
-              <a:srgbClr val="0070C0"/>
-            </a:solidFill>
-          </a:ln>
-        </p:spPr>
-        <p:style>
-          <a:lnRef idx="1">
-            <a:schemeClr val="accent1"/>
-          </a:lnRef>
-          <a:fillRef idx="0">
-            <a:schemeClr val="accent1"/>
-          </a:fillRef>
-          <a:effectRef idx="0">
-            <a:schemeClr val="accent1"/>
-          </a:effectRef>
-          <a:fontRef idx="minor">
-            <a:schemeClr val="tx1"/>
-          </a:fontRef>
-        </p:style>
-      </p:cxnSp>
-      <p:sp>
-        <p:nvSpPr>
-          <p:cNvPr id="39" name="Rectangle 38"/>
-          <p:cNvSpPr/>
-          <p:nvPr/>
-        </p:nvSpPr>
-        <p:spPr>
-          <a:xfrm>
-            <a:off x="3389263" y="145916"/>
-            <a:ext cx="582169" cy="304800"/>
-          </a:xfrm>
-          <a:prstGeom prst="rect">
-            <a:avLst/>
-          </a:prstGeom>
-          <a:noFill/>
-          <a:ln w="6350">
-            <a:solidFill>
-              <a:srgbClr val="002060"/>
-            </a:solidFill>
-          </a:ln>
-        </p:spPr>
-        <p:style>
-          <a:lnRef idx="2">
-            <a:schemeClr val="accent1">
-              <a:shade val="50000"/>
-            </a:schemeClr>
-          </a:lnRef>
-          <a:fillRef idx="1">
-            <a:schemeClr val="accent1"/>
-          </a:fillRef>
-          <a:effectRef idx="0">
-            <a:schemeClr val="accent1"/>
-          </a:effectRef>
-          <a:fontRef idx="minor">
-            <a:schemeClr val="lt1"/>
-          </a:fontRef>
-        </p:style>
-        <p:txBody>
-          <a:bodyPr lIns="91440" tIns="45720" rIns="91440" bIns="45720" spcCol="0" rtlCol="0" anchor="ctr"/>
-          <a:lstStyle/>
-          <a:p>
-            <a:pPr algn="ctr"/>
-            <a:r>
-              <a:rPr lang="en-US" sz="1100" b="1" dirty="0">
-                <a:solidFill>
-                  <a:schemeClr val="tx1"/>
-                </a:solidFill>
-              </a:rPr>
-              <a:t>SBase</a:t>
-            </a:r>
-          </a:p>
-        </p:txBody>
-      </p:sp>
-      <p:sp>
-        <p:nvSpPr>
-          <p:cNvPr id="40" name="Isosceles Triangle 39"/>
-          <p:cNvSpPr/>
-          <p:nvPr/>
-        </p:nvSpPr>
-        <p:spPr>
-          <a:xfrm>
-            <a:off x="3617865" y="453648"/>
-            <a:ext cx="159199" cy="114300"/>
-          </a:xfrm>
-          <a:prstGeom prst="triangle">
-            <a:avLst/>
-          </a:prstGeom>
-          <a:noFill/>
-          <a:ln w="6350">
-            <a:solidFill>
-              <a:schemeClr val="accent1"/>
-            </a:solidFill>
-          </a:ln>
-        </p:spPr>
-        <p:style>
-          <a:lnRef idx="2">
-            <a:schemeClr val="accent1">
-              <a:shade val="50000"/>
-            </a:schemeClr>
-          </a:lnRef>
-          <a:fillRef idx="1">
-            <a:schemeClr val="accent1"/>
-          </a:fillRef>
-          <a:effectRef idx="0">
-            <a:schemeClr val="accent1"/>
-          </a:effectRef>
-          <a:fontRef idx="minor">
-            <a:schemeClr val="lt1"/>
-          </a:fontRef>
-        </p:style>
-        <p:txBody>
-          <a:bodyPr lIns="91440" tIns="45720" rIns="91440" bIns="45720" spcCol="0" rtlCol="0" anchor="ctr"/>
-          <a:lstStyle/>
-          <a:p>
-            <a:pPr algn="ctr"/>
-            <a:endParaRPr lang="en-US" sz="1100" b="1" dirty="0">
-              <a:solidFill>
-                <a:schemeClr val="tx1"/>
-              </a:solidFill>
-            </a:endParaRPr>
-          </a:p>
-        </p:txBody>
-      </p:sp>
-      <p:cxnSp>
-        <p:nvCxnSpPr>
-          <p:cNvPr id="41" name="Elbow Connector 40"/>
-          <p:cNvCxnSpPr>
-            <a:stCxn id="49" idx="3"/>
-            <a:endCxn id="40" idx="3"/>
-          </p:cNvCxnSpPr>
-          <p:nvPr/>
-        </p:nvCxnSpPr>
-        <p:spPr>
-          <a:xfrm flipV="1">
-            <a:off x="1644883" y="567948"/>
-            <a:ext cx="2052582" cy="2247098"/>
-          </a:xfrm>
-          <a:prstGeom prst="bentConnector2">
-            <a:avLst/>
-          </a:prstGeom>
-          <a:ln w="6350">
-            <a:solidFill>
-              <a:srgbClr val="0070C0"/>
-            </a:solidFill>
-          </a:ln>
-        </p:spPr>
-        <p:style>
-          <a:lnRef idx="1">
-            <a:schemeClr val="accent1"/>
-          </a:lnRef>
-          <a:fillRef idx="0">
-            <a:schemeClr val="accent1"/>
-          </a:fillRef>
-          <a:effectRef idx="0">
-            <a:schemeClr val="accent1"/>
-          </a:effectRef>
-          <a:fontRef idx="minor">
-            <a:schemeClr val="tx1"/>
-          </a:fontRef>
-        </p:style>
-      </p:cxnSp>
-      <p:sp>
-        <p:nvSpPr>
-          <p:cNvPr id="42" name="Rectangle 41"/>
-          <p:cNvSpPr/>
-          <p:nvPr/>
-        </p:nvSpPr>
-        <p:spPr>
-          <a:xfrm>
-            <a:off x="57873" y="2309846"/>
-            <a:ext cx="880369" cy="369332"/>
-          </a:xfrm>
-          <a:prstGeom prst="rect">
-            <a:avLst/>
-          </a:prstGeom>
-          <a:ln>
-            <a:noFill/>
-          </a:ln>
-        </p:spPr>
-        <p:txBody>
-          <a:bodyPr wrap="none" lIns="91440" tIns="45720" rIns="91440" bIns="45720">
-            <a:spAutoFit/>
-          </a:bodyPr>
-          <a:lstStyle/>
-          <a:p>
-            <a:r>
-              <a:rPr lang="en-US" sz="900" dirty="0" err="1" smtClean="0">
-                <a:solidFill>
-                  <a:srgbClr val="0070C0"/>
-                </a:solidFill>
-              </a:rPr>
-              <a:t>listOfDeletions</a:t>
-            </a:r>
-            <a:endParaRPr lang="en-US" sz="900" dirty="0">
-              <a:solidFill>
-                <a:srgbClr val="0070C0"/>
-              </a:solidFill>
-            </a:endParaRPr>
-          </a:p>
-          <a:p>
-            <a:r>
-              <a:rPr lang="en-US" sz="900" dirty="0">
-                <a:solidFill>
-                  <a:srgbClr val="0070C0"/>
-                </a:solidFill>
-              </a:rPr>
-              <a:t>0,1</a:t>
-            </a:r>
-          </a:p>
-        </p:txBody>
-      </p:sp>
-      <p:sp>
-        <p:nvSpPr>
-          <p:cNvPr id="43" name="Rectangle 42"/>
-          <p:cNvSpPr/>
-          <p:nvPr/>
-        </p:nvSpPr>
-        <p:spPr>
-          <a:xfrm>
-            <a:off x="51292" y="1320181"/>
-            <a:ext cx="639919" cy="230832"/>
-          </a:xfrm>
-          <a:prstGeom prst="rect">
-            <a:avLst/>
-          </a:prstGeom>
-          <a:ln>
-            <a:noFill/>
-          </a:ln>
-        </p:spPr>
-        <p:txBody>
-          <a:bodyPr wrap="none" lIns="91440" tIns="45720" rIns="91440" bIns="45720">
-            <a:spAutoFit/>
-          </a:bodyPr>
-          <a:lstStyle/>
-          <a:p>
-            <a:r>
-              <a:rPr lang="en-US" sz="900" dirty="0" err="1" smtClean="0">
-                <a:solidFill>
-                  <a:srgbClr val="0070C0"/>
-                </a:solidFill>
-              </a:rPr>
-              <a:t>modelRef</a:t>
-            </a:r>
-            <a:endParaRPr lang="en-US" sz="900" dirty="0">
-              <a:solidFill>
-                <a:srgbClr val="0070C0"/>
-              </a:solidFill>
-            </a:endParaRPr>
-          </a:p>
-        </p:txBody>
-      </p:sp>
-      <p:sp>
-        <p:nvSpPr>
-          <p:cNvPr id="44" name="Rectangle 43"/>
-          <p:cNvSpPr/>
-          <p:nvPr/>
-        </p:nvSpPr>
-        <p:spPr>
-          <a:xfrm>
-            <a:off x="378821" y="3404527"/>
-            <a:ext cx="1648969" cy="472281"/>
-          </a:xfrm>
-          <a:prstGeom prst="rect">
-            <a:avLst/>
-          </a:prstGeom>
-          <a:noFill/>
-          <a:ln w="6350">
-            <a:solidFill>
-              <a:srgbClr val="0070C0"/>
-            </a:solidFill>
-          </a:ln>
-        </p:spPr>
-        <p:style>
-          <a:lnRef idx="2">
-            <a:schemeClr val="accent1">
-              <a:shade val="50000"/>
-            </a:schemeClr>
-          </a:lnRef>
-          <a:fillRef idx="1">
-            <a:schemeClr val="accent1"/>
-          </a:fillRef>
-          <a:effectRef idx="0">
-            <a:schemeClr val="accent1"/>
-          </a:effectRef>
-          <a:fontRef idx="minor">
-            <a:schemeClr val="lt1"/>
-          </a:fontRef>
-        </p:style>
-        <p:txBody>
-          <a:bodyPr lIns="91440" tIns="45720" rIns="91440" bIns="45720" spcCol="0" rtlCol="0" anchor="t"/>
-          <a:lstStyle/>
-          <a:p>
-            <a:pPr algn="ctr"/>
-            <a:r>
-              <a:rPr lang="en-US" sz="1100" b="1" dirty="0" smtClean="0">
-                <a:solidFill>
-                  <a:srgbClr val="0070C0"/>
-                </a:solidFill>
-              </a:rPr>
-              <a:t>Deletion</a:t>
-            </a:r>
-          </a:p>
-          <a:p>
-            <a:r>
-              <a:rPr lang="en-US" sz="900" dirty="0">
-                <a:solidFill>
-                  <a:srgbClr val="0070C0"/>
-                </a:solidFill>
-              </a:rPr>
-              <a:t>id: </a:t>
-            </a:r>
-            <a:r>
-              <a:rPr lang="en-US" sz="900" dirty="0" err="1" smtClean="0">
-                <a:solidFill>
-                  <a:srgbClr val="0070C0"/>
-                </a:solidFill>
-              </a:rPr>
-              <a:t>SId</a:t>
-            </a:r>
-            <a:r>
-              <a:rPr lang="en-US" sz="900" dirty="0" smtClean="0">
-                <a:solidFill>
-                  <a:srgbClr val="0070C0"/>
-                </a:solidFill>
-              </a:rPr>
-              <a:t> </a:t>
-            </a:r>
-            <a:r>
-              <a:rPr lang="en-US" sz="900" dirty="0">
-                <a:solidFill>
-                  <a:srgbClr val="0070C0"/>
-                </a:solidFill>
-              </a:rPr>
-              <a:t>{use=“optional</a:t>
-            </a:r>
-            <a:r>
-              <a:rPr lang="en-US" sz="900" dirty="0" smtClean="0">
-                <a:solidFill>
-                  <a:srgbClr val="0070C0"/>
-                </a:solidFill>
-              </a:rPr>
-              <a:t>”}</a:t>
-            </a:r>
-            <a:endParaRPr lang="en-US" sz="900" dirty="0">
-              <a:solidFill>
-                <a:srgbClr val="0070C0"/>
-              </a:solidFill>
-            </a:endParaRPr>
-          </a:p>
-        </p:txBody>
-      </p:sp>
-      <p:sp>
-        <p:nvSpPr>
-          <p:cNvPr id="45" name="Rectangle 44"/>
-          <p:cNvSpPr/>
-          <p:nvPr/>
-        </p:nvSpPr>
-        <p:spPr>
-          <a:xfrm>
-            <a:off x="134512" y="3064104"/>
-            <a:ext cx="575799" cy="369332"/>
-          </a:xfrm>
-          <a:prstGeom prst="rect">
-            <a:avLst/>
-          </a:prstGeom>
-          <a:ln>
-            <a:noFill/>
-          </a:ln>
-        </p:spPr>
-        <p:txBody>
-          <a:bodyPr wrap="none" lIns="91440" tIns="45720" rIns="91440" bIns="45720">
-            <a:spAutoFit/>
-          </a:bodyPr>
-          <a:lstStyle/>
-          <a:p>
-            <a:r>
-              <a:rPr lang="en-US" sz="900" dirty="0" smtClean="0">
-                <a:solidFill>
-                  <a:srgbClr val="0070C0"/>
-                </a:solidFill>
-              </a:rPr>
-              <a:t>deletion</a:t>
-            </a:r>
-            <a:endParaRPr lang="en-US" sz="900" dirty="0">
-              <a:solidFill>
-                <a:srgbClr val="0070C0"/>
-              </a:solidFill>
-            </a:endParaRPr>
-          </a:p>
-          <a:p>
-            <a:r>
-              <a:rPr lang="en-US" sz="900" dirty="0">
-                <a:solidFill>
-                  <a:srgbClr val="0070C0"/>
-                </a:solidFill>
-              </a:rPr>
-              <a:t>0,…,*</a:t>
-            </a:r>
-          </a:p>
-        </p:txBody>
-      </p:sp>
-      <p:cxnSp>
-        <p:nvCxnSpPr>
-          <p:cNvPr id="46" name="Elbow Connector 45"/>
-          <p:cNvCxnSpPr>
-            <a:stCxn id="53" idx="3"/>
-            <a:endCxn id="40" idx="3"/>
-          </p:cNvCxnSpPr>
-          <p:nvPr/>
-        </p:nvCxnSpPr>
-        <p:spPr>
-          <a:xfrm flipV="1">
-            <a:off x="1941463" y="567948"/>
-            <a:ext cx="1756002" cy="1357024"/>
-          </a:xfrm>
-          <a:prstGeom prst="bentConnector2">
-            <a:avLst/>
-          </a:prstGeom>
-          <a:ln w="6350">
-            <a:solidFill>
-              <a:srgbClr val="0070C0"/>
-            </a:solidFill>
-          </a:ln>
-        </p:spPr>
-        <p:style>
-          <a:lnRef idx="1">
-            <a:schemeClr val="accent1"/>
-          </a:lnRef>
-          <a:fillRef idx="0">
-            <a:schemeClr val="accent1"/>
-          </a:fillRef>
-          <a:effectRef idx="0">
-            <a:schemeClr val="accent1"/>
-          </a:effectRef>
-          <a:fontRef idx="minor">
-            <a:schemeClr val="tx1"/>
-          </a:fontRef>
-        </p:style>
-      </p:cxnSp>
-      <p:cxnSp>
-        <p:nvCxnSpPr>
-          <p:cNvPr id="47" name="Elbow Connector 46"/>
-          <p:cNvCxnSpPr>
-            <a:stCxn id="55" idx="3"/>
-            <a:endCxn id="40" idx="3"/>
-          </p:cNvCxnSpPr>
-          <p:nvPr/>
-        </p:nvCxnSpPr>
-        <p:spPr>
-          <a:xfrm flipV="1">
-            <a:off x="3432353" y="567948"/>
-            <a:ext cx="265112" cy="2572133"/>
-          </a:xfrm>
-          <a:prstGeom prst="bentConnector2">
-            <a:avLst/>
-          </a:prstGeom>
-          <a:ln w="6350">
-            <a:solidFill>
-              <a:srgbClr val="0070C0"/>
-            </a:solidFill>
-          </a:ln>
-        </p:spPr>
-        <p:style>
-          <a:lnRef idx="1">
-            <a:schemeClr val="accent1"/>
-          </a:lnRef>
-          <a:fillRef idx="0">
-            <a:schemeClr val="accent1"/>
-          </a:fillRef>
-          <a:effectRef idx="0">
-            <a:schemeClr val="accent1"/>
-          </a:effectRef>
-          <a:fontRef idx="minor">
-            <a:schemeClr val="tx1"/>
-          </a:fontRef>
-        </p:style>
-      </p:cxnSp>
       <p:grpSp>
         <p:nvGrpSpPr>
-          <p:cNvPr id="48" name="Group 47"/>
+          <p:cNvPr id="2" name="Group 1"/>
           <p:cNvGrpSpPr/>
           <p:nvPr/>
         </p:nvGrpSpPr>
         <p:grpSpPr>
           <a:xfrm>
-            <a:off x="155210" y="2662646"/>
-            <a:ext cx="1489673" cy="459579"/>
-            <a:chOff x="162625" y="2625999"/>
-            <a:chExt cx="1489673" cy="459579"/>
+            <a:off x="51292" y="84619"/>
+            <a:ext cx="3920140" cy="3792189"/>
+            <a:chOff x="51292" y="84619"/>
+            <a:chExt cx="3920140" cy="3792189"/>
           </a:xfrm>
         </p:grpSpPr>
+        <p:cxnSp>
+          <p:nvCxnSpPr>
+            <p:cNvPr id="31" name="Straight Connector 30"/>
+            <p:cNvCxnSpPr/>
+            <p:nvPr/>
+          </p:nvCxnSpPr>
+          <p:spPr>
+            <a:xfrm>
+              <a:off x="91207" y="285229"/>
+              <a:ext cx="2764770" cy="0"/>
+            </a:xfrm>
+            <a:prstGeom prst="line">
+              <a:avLst/>
+            </a:prstGeom>
+            <a:ln w="6350">
+              <a:solidFill>
+                <a:srgbClr val="0070C0"/>
+              </a:solidFill>
+            </a:ln>
+          </p:spPr>
+          <p:style>
+            <a:lnRef idx="1">
+              <a:schemeClr val="accent1"/>
+            </a:lnRef>
+            <a:fillRef idx="0">
+              <a:schemeClr val="accent1"/>
+            </a:fillRef>
+            <a:effectRef idx="0">
+              <a:schemeClr val="accent1"/>
+            </a:effectRef>
+            <a:fontRef idx="minor">
+              <a:schemeClr val="tx1"/>
+            </a:fontRef>
+          </p:style>
+        </p:cxnSp>
         <p:sp>
           <p:nvSpPr>
-            <p:cNvPr id="49" name="Rectangle 48"/>
+            <p:cNvPr id="33" name="Rectangle 32"/>
             <p:cNvSpPr/>
             <p:nvPr/>
           </p:nvSpPr>
           <p:spPr>
             <a:xfrm>
-              <a:off x="195272" y="2625999"/>
-              <a:ext cx="1457026" cy="304800"/>
+              <a:off x="91207" y="84619"/>
+              <a:ext cx="2764770" cy="1174265"/>
             </a:xfrm>
             <a:prstGeom prst="rect">
               <a:avLst/>
@@ -4561,19 +3624,256 @@
             </a:fontRef>
           </p:style>
           <p:txBody>
-            <a:bodyPr lIns="91440" tIns="45720" rIns="91440" bIns="45720" spcCol="0" rtlCol="0" anchor="ctr"/>
+            <a:bodyPr rtlCol="0" anchor="t"/>
             <a:lstStyle/>
             <a:p>
               <a:pPr algn="ctr"/>
               <a:r>
-                <a:rPr lang="en-US" sz="1100" b="1" dirty="0" err="1" smtClean="0">
+                <a:rPr lang="en-US" sz="1100" b="1" dirty="0" smtClean="0">
                   <a:solidFill>
                     <a:srgbClr val="0070C0"/>
                   </a:solidFill>
                 </a:rPr>
-                <a:t>ListOfDeletions</a:t>
+                <a:t>Submodel</a:t>
               </a:r>
               <a:endParaRPr lang="en-US" sz="1100" b="1" dirty="0">
+                <a:solidFill>
+                  <a:srgbClr val="0070C0"/>
+                </a:solidFill>
+              </a:endParaRPr>
+            </a:p>
+            <a:p>
+              <a:r>
+                <a:rPr lang="en-US" sz="900" dirty="0" smtClean="0">
+                  <a:solidFill>
+                    <a:srgbClr val="0070C0"/>
+                  </a:solidFill>
+                </a:rPr>
+                <a:t>id: </a:t>
+              </a:r>
+              <a:r>
+                <a:rPr lang="en-US" sz="900" dirty="0" err="1" smtClean="0">
+                  <a:solidFill>
+                    <a:srgbClr val="0070C0"/>
+                  </a:solidFill>
+                </a:rPr>
+                <a:t>SId</a:t>
+              </a:r>
+              <a:r>
+                <a:rPr lang="en-US" sz="900" dirty="0" smtClean="0">
+                  <a:solidFill>
+                    <a:srgbClr val="0070C0"/>
+                  </a:solidFill>
+                </a:rPr>
+                <a:t> {use=“optional”}</a:t>
+              </a:r>
+            </a:p>
+            <a:p>
+              <a:r>
+                <a:rPr lang="en-US" sz="900" dirty="0" err="1">
+                  <a:solidFill>
+                    <a:srgbClr val="0070C0"/>
+                  </a:solidFill>
+                </a:rPr>
+                <a:t>lengthConversionFactor</a:t>
+              </a:r>
+              <a:r>
+                <a:rPr lang="en-US" sz="900" dirty="0">
+                  <a:solidFill>
+                    <a:srgbClr val="0070C0"/>
+                  </a:solidFill>
+                </a:rPr>
+                <a:t>: </a:t>
+              </a:r>
+              <a:r>
+                <a:rPr lang="en-US" sz="900" dirty="0" err="1">
+                  <a:solidFill>
+                    <a:srgbClr val="0070C0"/>
+                  </a:solidFill>
+                </a:rPr>
+                <a:t>SIdRef</a:t>
+              </a:r>
+              <a:r>
+                <a:rPr lang="en-US" sz="900" dirty="0">
+                  <a:solidFill>
+                    <a:srgbClr val="0070C0"/>
+                  </a:solidFill>
+                </a:rPr>
+                <a:t> {use=“optional”}</a:t>
+              </a:r>
+            </a:p>
+            <a:p>
+              <a:r>
+                <a:rPr lang="en-US" sz="900" dirty="0" err="1">
+                  <a:solidFill>
+                    <a:srgbClr val="0070C0"/>
+                  </a:solidFill>
+                </a:rPr>
+                <a:t>volumeConversionFactor</a:t>
+              </a:r>
+              <a:r>
+                <a:rPr lang="en-US" sz="900" dirty="0">
+                  <a:solidFill>
+                    <a:srgbClr val="0070C0"/>
+                  </a:solidFill>
+                </a:rPr>
+                <a:t>: </a:t>
+              </a:r>
+              <a:r>
+                <a:rPr lang="en-US" sz="900" dirty="0" err="1">
+                  <a:solidFill>
+                    <a:srgbClr val="0070C0"/>
+                  </a:solidFill>
+                </a:rPr>
+                <a:t>SIdRef</a:t>
+              </a:r>
+              <a:r>
+                <a:rPr lang="en-US" sz="900" dirty="0">
+                  <a:solidFill>
+                    <a:srgbClr val="0070C0"/>
+                  </a:solidFill>
+                </a:rPr>
+                <a:t> {use=“optional”}</a:t>
+              </a:r>
+            </a:p>
+            <a:p>
+              <a:r>
+                <a:rPr lang="en-US" sz="900" dirty="0" err="1" smtClean="0">
+                  <a:solidFill>
+                    <a:srgbClr val="0070C0"/>
+                  </a:solidFill>
+                </a:rPr>
+                <a:t>areaConversionFactor</a:t>
+              </a:r>
+              <a:r>
+                <a:rPr lang="en-US" sz="900" dirty="0" smtClean="0">
+                  <a:solidFill>
+                    <a:srgbClr val="0070C0"/>
+                  </a:solidFill>
+                </a:rPr>
+                <a:t>: </a:t>
+              </a:r>
+              <a:r>
+                <a:rPr lang="en-US" sz="900" dirty="0" err="1" smtClean="0">
+                  <a:solidFill>
+                    <a:srgbClr val="0070C0"/>
+                  </a:solidFill>
+                </a:rPr>
+                <a:t>SIdRef</a:t>
+              </a:r>
+              <a:r>
+                <a:rPr lang="en-US" sz="900" dirty="0" smtClean="0">
+                  <a:solidFill>
+                    <a:srgbClr val="0070C0"/>
+                  </a:solidFill>
+                </a:rPr>
+                <a:t> {use=“optional”}</a:t>
+              </a:r>
+            </a:p>
+            <a:p>
+              <a:r>
+                <a:rPr lang="en-US" sz="900" dirty="0" err="1" smtClean="0">
+                  <a:solidFill>
+                    <a:srgbClr val="0070C0"/>
+                  </a:solidFill>
+                </a:rPr>
+                <a:t>substanceConversionFactor</a:t>
+              </a:r>
+              <a:r>
+                <a:rPr lang="en-US" sz="900" dirty="0" smtClean="0">
+                  <a:solidFill>
+                    <a:srgbClr val="0070C0"/>
+                  </a:solidFill>
+                </a:rPr>
+                <a:t>: </a:t>
+              </a:r>
+              <a:r>
+                <a:rPr lang="en-US" sz="900" dirty="0" err="1" smtClean="0">
+                  <a:solidFill>
+                    <a:srgbClr val="0070C0"/>
+                  </a:solidFill>
+                </a:rPr>
+                <a:t>SIdRef</a:t>
+              </a:r>
+              <a:r>
+                <a:rPr lang="en-US" sz="900" dirty="0" smtClean="0">
+                  <a:solidFill>
+                    <a:srgbClr val="0070C0"/>
+                  </a:solidFill>
+                </a:rPr>
+                <a:t> {use=“optional”}</a:t>
+              </a:r>
+            </a:p>
+            <a:p>
+              <a:r>
+                <a:rPr lang="en-US" sz="900" dirty="0" err="1" smtClean="0">
+                  <a:solidFill>
+                    <a:srgbClr val="0070C0"/>
+                  </a:solidFill>
+                </a:rPr>
+                <a:t>timeConversionFactor</a:t>
+              </a:r>
+              <a:r>
+                <a:rPr lang="en-US" sz="900" dirty="0" smtClean="0">
+                  <a:solidFill>
+                    <a:srgbClr val="0070C0"/>
+                  </a:solidFill>
+                </a:rPr>
+                <a:t>: </a:t>
+              </a:r>
+              <a:r>
+                <a:rPr lang="en-US" sz="900" dirty="0" err="1" smtClean="0">
+                  <a:solidFill>
+                    <a:srgbClr val="0070C0"/>
+                  </a:solidFill>
+                </a:rPr>
+                <a:t>SIdRef</a:t>
+              </a:r>
+              <a:r>
+                <a:rPr lang="en-US" sz="900" dirty="0" smtClean="0">
+                  <a:solidFill>
+                    <a:srgbClr val="0070C0"/>
+                  </a:solidFill>
+                </a:rPr>
+                <a:t> {use=“optional”}</a:t>
+              </a:r>
+            </a:p>
+            <a:p>
+              <a:r>
+                <a:rPr lang="en-US" sz="900" dirty="0" err="1" smtClean="0">
+                  <a:solidFill>
+                    <a:srgbClr val="0070C0"/>
+                  </a:solidFill>
+                </a:rPr>
+                <a:t>extentConversionFactor</a:t>
+              </a:r>
+              <a:r>
+                <a:rPr lang="en-US" sz="900" dirty="0" smtClean="0">
+                  <a:solidFill>
+                    <a:srgbClr val="0070C0"/>
+                  </a:solidFill>
+                </a:rPr>
+                <a:t>: </a:t>
+              </a:r>
+              <a:r>
+                <a:rPr lang="en-US" sz="900" dirty="0" err="1" smtClean="0">
+                  <a:solidFill>
+                    <a:srgbClr val="0070C0"/>
+                  </a:solidFill>
+                </a:rPr>
+                <a:t>SIdRef</a:t>
+              </a:r>
+              <a:r>
+                <a:rPr lang="en-US" sz="900" dirty="0" smtClean="0">
+                  <a:solidFill>
+                    <a:srgbClr val="0070C0"/>
+                  </a:solidFill>
+                </a:rPr>
+                <a:t> {use=“optional”}</a:t>
+              </a:r>
+            </a:p>
+            <a:p>
+              <a:endParaRPr lang="en-US" sz="900" dirty="0">
                 <a:solidFill>
                   <a:srgbClr val="0070C0"/>
                 </a:solidFill>
@@ -4583,14 +3883,14 @@
         </p:sp>
         <p:sp>
           <p:nvSpPr>
-            <p:cNvPr id="50" name="Diamond 49"/>
+            <p:cNvPr id="34" name="Diamond 33"/>
             <p:cNvSpPr/>
             <p:nvPr/>
           </p:nvSpPr>
           <p:spPr>
             <a:xfrm>
-              <a:off x="162625" y="2933180"/>
-              <a:ext cx="66869" cy="152398"/>
+              <a:off x="57847" y="1261265"/>
+              <a:ext cx="66869" cy="167916"/>
             </a:xfrm>
             <a:prstGeom prst="diamond">
               <a:avLst/>
@@ -4633,69 +3933,367 @@
             </a:p>
           </p:txBody>
         </p:sp>
-      </p:grpSp>
-      <p:cxnSp>
-        <p:nvCxnSpPr>
-          <p:cNvPr id="51" name="Elbow Connector 50"/>
-          <p:cNvCxnSpPr>
-            <a:stCxn id="33" idx="3"/>
-            <a:endCxn id="40" idx="3"/>
-          </p:cNvCxnSpPr>
-          <p:nvPr/>
-        </p:nvCxnSpPr>
-        <p:spPr>
-          <a:xfrm flipV="1">
-            <a:off x="2855977" y="567948"/>
-            <a:ext cx="841488" cy="103804"/>
-          </a:xfrm>
-          <a:prstGeom prst="bentConnector2">
-            <a:avLst/>
-          </a:prstGeom>
-          <a:ln w="6350">
-            <a:solidFill>
-              <a:srgbClr val="0070C0"/>
-            </a:solidFill>
-          </a:ln>
-        </p:spPr>
-        <p:style>
-          <a:lnRef idx="1">
-            <a:schemeClr val="accent1"/>
-          </a:lnRef>
-          <a:fillRef idx="0">
-            <a:schemeClr val="accent1"/>
-          </a:fillRef>
-          <a:effectRef idx="0">
-            <a:schemeClr val="accent1"/>
-          </a:effectRef>
-          <a:fontRef idx="minor">
-            <a:schemeClr val="tx1"/>
-          </a:fontRef>
-        </p:style>
-      </p:cxnSp>
-      <p:grpSp>
-        <p:nvGrpSpPr>
-          <p:cNvPr id="52" name="Group 51"/>
-          <p:cNvGrpSpPr/>
-          <p:nvPr/>
-        </p:nvGrpSpPr>
-        <p:grpSpPr>
-          <a:xfrm>
-            <a:off x="187857" y="1588422"/>
-            <a:ext cx="1753606" cy="673100"/>
-            <a:chOff x="195272" y="1551775"/>
-            <a:chExt cx="1753606" cy="673100"/>
-          </a:xfrm>
-        </p:grpSpPr>
+        <p:cxnSp>
+          <p:nvCxnSpPr>
+            <p:cNvPr id="35" name="Elbow Connector 34"/>
+            <p:cNvCxnSpPr>
+              <a:stCxn id="34" idx="2"/>
+              <a:endCxn id="53" idx="0"/>
+            </p:cNvCxnSpPr>
+            <p:nvPr/>
+          </p:nvCxnSpPr>
+          <p:spPr>
+            <a:xfrm rot="16200000" flipH="1">
+              <a:off x="498351" y="1022112"/>
+              <a:ext cx="159241" cy="973378"/>
+            </a:xfrm>
+            <a:prstGeom prst="bentConnector3">
+              <a:avLst>
+                <a:gd name="adj1" fmla="val 50000"/>
+              </a:avLst>
+            </a:prstGeom>
+            <a:ln w="6350">
+              <a:solidFill>
+                <a:srgbClr val="0070C0"/>
+              </a:solidFill>
+            </a:ln>
+          </p:spPr>
+          <p:style>
+            <a:lnRef idx="1">
+              <a:schemeClr val="accent1"/>
+            </a:lnRef>
+            <a:fillRef idx="0">
+              <a:schemeClr val="accent1"/>
+            </a:fillRef>
+            <a:effectRef idx="0">
+              <a:schemeClr val="accent1"/>
+            </a:effectRef>
+            <a:fontRef idx="minor">
+              <a:schemeClr val="tx1"/>
+            </a:fontRef>
+          </p:style>
+        </p:cxnSp>
+        <p:cxnSp>
+          <p:nvCxnSpPr>
+            <p:cNvPr id="36" name="Elbow Connector 35"/>
+            <p:cNvCxnSpPr>
+              <a:stCxn id="50" idx="2"/>
+              <a:endCxn id="44" idx="0"/>
+            </p:cNvCxnSpPr>
+            <p:nvPr/>
+          </p:nvCxnSpPr>
+          <p:spPr>
+            <a:xfrm rot="16200000" flipH="1">
+              <a:off x="554824" y="2756045"/>
+              <a:ext cx="282302" cy="1014661"/>
+            </a:xfrm>
+            <a:prstGeom prst="bentConnector3">
+              <a:avLst>
+                <a:gd name="adj1" fmla="val 50000"/>
+              </a:avLst>
+            </a:prstGeom>
+            <a:ln w="6350">
+              <a:solidFill>
+                <a:srgbClr val="0070C0"/>
+              </a:solidFill>
+            </a:ln>
+          </p:spPr>
+          <p:style>
+            <a:lnRef idx="1">
+              <a:schemeClr val="accent1"/>
+            </a:lnRef>
+            <a:fillRef idx="0">
+              <a:schemeClr val="accent1"/>
+            </a:fillRef>
+            <a:effectRef idx="0">
+              <a:schemeClr val="accent1"/>
+            </a:effectRef>
+            <a:fontRef idx="minor">
+              <a:schemeClr val="tx1"/>
+            </a:fontRef>
+          </p:style>
+        </p:cxnSp>
+        <p:cxnSp>
+          <p:nvCxnSpPr>
+            <p:cNvPr id="37" name="Elbow Connector 36"/>
+            <p:cNvCxnSpPr>
+              <a:stCxn id="34" idx="2"/>
+              <a:endCxn id="49" idx="0"/>
+            </p:cNvCxnSpPr>
+            <p:nvPr/>
+          </p:nvCxnSpPr>
+          <p:spPr>
+            <a:xfrm rot="16200000" flipH="1">
+              <a:off x="-112906" y="1633369"/>
+              <a:ext cx="1233465" cy="825088"/>
+            </a:xfrm>
+            <a:prstGeom prst="bentConnector3">
+              <a:avLst>
+                <a:gd name="adj1" fmla="val 85203"/>
+              </a:avLst>
+            </a:prstGeom>
+            <a:ln w="6350">
+              <a:solidFill>
+                <a:srgbClr val="0070C0"/>
+              </a:solidFill>
+            </a:ln>
+          </p:spPr>
+          <p:style>
+            <a:lnRef idx="1">
+              <a:schemeClr val="accent1"/>
+            </a:lnRef>
+            <a:fillRef idx="0">
+              <a:schemeClr val="accent1"/>
+            </a:fillRef>
+            <a:effectRef idx="0">
+              <a:schemeClr val="accent1"/>
+            </a:effectRef>
+            <a:fontRef idx="minor">
+              <a:schemeClr val="tx1"/>
+            </a:fontRef>
+          </p:style>
+        </p:cxnSp>
         <p:sp>
           <p:nvSpPr>
-            <p:cNvPr id="53" name="Rectangle 52"/>
+            <p:cNvPr id="39" name="Rectangle 38"/>
             <p:cNvSpPr/>
             <p:nvPr/>
           </p:nvSpPr>
           <p:spPr>
             <a:xfrm>
-              <a:off x="195272" y="1551775"/>
-              <a:ext cx="1753606" cy="673100"/>
+              <a:off x="3389263" y="145916"/>
+              <a:ext cx="582169" cy="304800"/>
+            </a:xfrm>
+            <a:prstGeom prst="rect">
+              <a:avLst/>
+            </a:prstGeom>
+            <a:noFill/>
+            <a:ln w="6350">
+              <a:solidFill>
+                <a:srgbClr val="002060"/>
+              </a:solidFill>
+            </a:ln>
+          </p:spPr>
+          <p:style>
+            <a:lnRef idx="2">
+              <a:schemeClr val="accent1">
+                <a:shade val="50000"/>
+              </a:schemeClr>
+            </a:lnRef>
+            <a:fillRef idx="1">
+              <a:schemeClr val="accent1"/>
+            </a:fillRef>
+            <a:effectRef idx="0">
+              <a:schemeClr val="accent1"/>
+            </a:effectRef>
+            <a:fontRef idx="minor">
+              <a:schemeClr val="lt1"/>
+            </a:fontRef>
+          </p:style>
+          <p:txBody>
+            <a:bodyPr lIns="91440" tIns="45720" rIns="91440" bIns="45720" spcCol="0" rtlCol="0" anchor="ctr"/>
+            <a:lstStyle/>
+            <a:p>
+              <a:pPr algn="ctr"/>
+              <a:r>
+                <a:rPr lang="en-US" sz="1100" b="1" dirty="0">
+                  <a:solidFill>
+                    <a:schemeClr val="tx1"/>
+                  </a:solidFill>
+                </a:rPr>
+                <a:t>SBase</a:t>
+              </a:r>
+            </a:p>
+          </p:txBody>
+        </p:sp>
+        <p:sp>
+          <p:nvSpPr>
+            <p:cNvPr id="40" name="Isosceles Triangle 39"/>
+            <p:cNvSpPr/>
+            <p:nvPr/>
+          </p:nvSpPr>
+          <p:spPr>
+            <a:xfrm>
+              <a:off x="3617865" y="453648"/>
+              <a:ext cx="159199" cy="114300"/>
+            </a:xfrm>
+            <a:prstGeom prst="triangle">
+              <a:avLst/>
+            </a:prstGeom>
+            <a:noFill/>
+            <a:ln w="6350">
+              <a:solidFill>
+                <a:schemeClr val="accent1"/>
+              </a:solidFill>
+            </a:ln>
+          </p:spPr>
+          <p:style>
+            <a:lnRef idx="2">
+              <a:schemeClr val="accent1">
+                <a:shade val="50000"/>
+              </a:schemeClr>
+            </a:lnRef>
+            <a:fillRef idx="1">
+              <a:schemeClr val="accent1"/>
+            </a:fillRef>
+            <a:effectRef idx="0">
+              <a:schemeClr val="accent1"/>
+            </a:effectRef>
+            <a:fontRef idx="minor">
+              <a:schemeClr val="lt1"/>
+            </a:fontRef>
+          </p:style>
+          <p:txBody>
+            <a:bodyPr lIns="91440" tIns="45720" rIns="91440" bIns="45720" spcCol="0" rtlCol="0" anchor="ctr"/>
+            <a:lstStyle/>
+            <a:p>
+              <a:pPr algn="ctr"/>
+              <a:endParaRPr lang="en-US" sz="1100" b="1" dirty="0">
+                <a:solidFill>
+                  <a:schemeClr val="tx1"/>
+                </a:solidFill>
+              </a:endParaRPr>
+            </a:p>
+          </p:txBody>
+        </p:sp>
+        <p:cxnSp>
+          <p:nvCxnSpPr>
+            <p:cNvPr id="41" name="Elbow Connector 40"/>
+            <p:cNvCxnSpPr>
+              <a:stCxn id="49" idx="3"/>
+              <a:endCxn id="40" idx="3"/>
+            </p:cNvCxnSpPr>
+            <p:nvPr/>
+          </p:nvCxnSpPr>
+          <p:spPr>
+            <a:xfrm flipV="1">
+              <a:off x="1644883" y="567948"/>
+              <a:ext cx="2052582" cy="2247098"/>
+            </a:xfrm>
+            <a:prstGeom prst="bentConnector2">
+              <a:avLst/>
+            </a:prstGeom>
+            <a:ln w="6350">
+              <a:solidFill>
+                <a:srgbClr val="0070C0"/>
+              </a:solidFill>
+            </a:ln>
+          </p:spPr>
+          <p:style>
+            <a:lnRef idx="1">
+              <a:schemeClr val="accent1"/>
+            </a:lnRef>
+            <a:fillRef idx="0">
+              <a:schemeClr val="accent1"/>
+            </a:fillRef>
+            <a:effectRef idx="0">
+              <a:schemeClr val="accent1"/>
+            </a:effectRef>
+            <a:fontRef idx="minor">
+              <a:schemeClr val="tx1"/>
+            </a:fontRef>
+          </p:style>
+        </p:cxnSp>
+        <p:sp>
+          <p:nvSpPr>
+            <p:cNvPr id="42" name="Rectangle 41"/>
+            <p:cNvSpPr/>
+            <p:nvPr/>
+          </p:nvSpPr>
+          <p:spPr>
+            <a:xfrm>
+              <a:off x="57873" y="2309846"/>
+              <a:ext cx="880369" cy="369332"/>
+            </a:xfrm>
+            <a:prstGeom prst="rect">
+              <a:avLst/>
+            </a:prstGeom>
+            <a:ln>
+              <a:noFill/>
+            </a:ln>
+          </p:spPr>
+          <p:txBody>
+            <a:bodyPr wrap="none" lIns="91440" tIns="45720" rIns="91440" bIns="45720">
+              <a:spAutoFit/>
+            </a:bodyPr>
+            <a:lstStyle/>
+            <a:p>
+              <a:r>
+                <a:rPr lang="en-US" sz="900" dirty="0" err="1" smtClean="0">
+                  <a:solidFill>
+                    <a:srgbClr val="0070C0"/>
+                  </a:solidFill>
+                </a:rPr>
+                <a:t>listOfDeletions</a:t>
+              </a:r>
+              <a:endParaRPr lang="en-US" sz="900" dirty="0">
+                <a:solidFill>
+                  <a:srgbClr val="0070C0"/>
+                </a:solidFill>
+              </a:endParaRPr>
+            </a:p>
+            <a:p>
+              <a:r>
+                <a:rPr lang="en-US" sz="900" dirty="0">
+                  <a:solidFill>
+                    <a:srgbClr val="0070C0"/>
+                  </a:solidFill>
+                </a:rPr>
+                <a:t>0,1</a:t>
+              </a:r>
+            </a:p>
+          </p:txBody>
+        </p:sp>
+        <p:sp>
+          <p:nvSpPr>
+            <p:cNvPr id="43" name="Rectangle 42"/>
+            <p:cNvSpPr/>
+            <p:nvPr/>
+          </p:nvSpPr>
+          <p:spPr>
+            <a:xfrm>
+              <a:off x="51292" y="1320181"/>
+              <a:ext cx="639919" cy="230832"/>
+            </a:xfrm>
+            <a:prstGeom prst="rect">
+              <a:avLst/>
+            </a:prstGeom>
+            <a:ln>
+              <a:noFill/>
+            </a:ln>
+          </p:spPr>
+          <p:txBody>
+            <a:bodyPr wrap="none" lIns="91440" tIns="45720" rIns="91440" bIns="45720">
+              <a:spAutoFit/>
+            </a:bodyPr>
+            <a:lstStyle/>
+            <a:p>
+              <a:r>
+                <a:rPr lang="en-US" sz="900" dirty="0" err="1" smtClean="0">
+                  <a:solidFill>
+                    <a:srgbClr val="0070C0"/>
+                  </a:solidFill>
+                </a:rPr>
+                <a:t>modelRef</a:t>
+              </a:r>
+              <a:endParaRPr lang="en-US" sz="900" dirty="0">
+                <a:solidFill>
+                  <a:srgbClr val="0070C0"/>
+                </a:solidFill>
+              </a:endParaRPr>
+            </a:p>
+          </p:txBody>
+        </p:sp>
+        <p:sp>
+          <p:nvSpPr>
+            <p:cNvPr id="44" name="Rectangle 43"/>
+            <p:cNvSpPr/>
+            <p:nvPr/>
+          </p:nvSpPr>
+          <p:spPr>
+            <a:xfrm>
+              <a:off x="378821" y="3404527"/>
+              <a:ext cx="1648969" cy="472281"/>
             </a:xfrm>
             <a:prstGeom prst="rect">
               <a:avLst/>
@@ -4729,27 +4327,22 @@
             <a:p>
               <a:pPr algn="ctr"/>
               <a:r>
-                <a:rPr lang="en-US" sz="1100" b="1" dirty="0" err="1" smtClean="0">
+                <a:rPr lang="en-US" sz="1100" b="1" dirty="0" smtClean="0">
                   <a:solidFill>
                     <a:srgbClr val="0070C0"/>
                   </a:solidFill>
                 </a:rPr>
-                <a:t>ModelRef</a:t>
+                <a:t>Deletion</a:t>
               </a:r>
-              <a:endParaRPr lang="en-US" sz="1100" b="1" dirty="0" smtClean="0">
-                <a:solidFill>
-                  <a:srgbClr val="0070C0"/>
-                </a:solidFill>
-              </a:endParaRPr>
             </a:p>
             <a:p>
               <a:r>
-                <a:rPr lang="en-US" sz="900" dirty="0" smtClean="0">
+                <a:rPr lang="en-US" sz="900" dirty="0">
                   <a:solidFill>
                     <a:srgbClr val="0070C0"/>
                   </a:solidFill>
                 </a:rPr>
-                <a:t>model: </a:t>
+                <a:t>id: </a:t>
               </a:r>
               <a:r>
                 <a:rPr lang="en-US" sz="900" dirty="0" err="1" smtClean="0">
@@ -4757,7 +4350,7 @@
                     <a:srgbClr val="0070C0"/>
                   </a:solidFill>
                 </a:rPr>
-                <a:t>SIdRef</a:t>
+                <a:t>SId</a:t>
               </a:r>
               <a:r>
                 <a:rPr lang="en-US" sz="900" dirty="0" smtClean="0">
@@ -4765,17 +4358,15 @@
                     <a:srgbClr val="0070C0"/>
                   </a:solidFill>
                 </a:rPr>
-                <a:t> {use=“optional”}</a:t>
+                <a:t> </a:t>
               </a:r>
-            </a:p>
-            <a:p>
               <a:r>
-                <a:rPr lang="en-US" sz="900" dirty="0" err="1" smtClean="0">
+                <a:rPr lang="en-US" sz="900" dirty="0">
                   <a:solidFill>
                     <a:srgbClr val="0070C0"/>
                   </a:solidFill>
                 </a:rPr>
-                <a:t>xlink:href</a:t>
+                <a:t>{use=“optional</a:t>
               </a:r>
               <a:r>
                 <a:rPr lang="en-US" sz="900" dirty="0" smtClean="0">
@@ -4783,17 +4374,7 @@
                     <a:srgbClr val="0070C0"/>
                   </a:solidFill>
                 </a:rPr>
-                <a:t>: string {use=“optional”}</a:t>
-              </a:r>
-            </a:p>
-            <a:p>
-              <a:r>
-                <a:rPr lang="en-US" sz="900" dirty="0" smtClean="0">
-                  <a:solidFill>
-                    <a:srgbClr val="0070C0"/>
-                  </a:solidFill>
-                </a:rPr>
-                <a:t>md5: string {use=“optional”}</a:t>
+                <a:t>”}</a:t>
               </a:r>
               <a:endParaRPr lang="en-US" sz="900" dirty="0">
                 <a:solidFill>
@@ -4803,16 +4384,618 @@
             </a:p>
           </p:txBody>
         </p:sp>
+        <p:sp>
+          <p:nvSpPr>
+            <p:cNvPr id="45" name="Rectangle 44"/>
+            <p:cNvSpPr/>
+            <p:nvPr/>
+          </p:nvSpPr>
+          <p:spPr>
+            <a:xfrm>
+              <a:off x="134512" y="3064104"/>
+              <a:ext cx="575799" cy="369332"/>
+            </a:xfrm>
+            <a:prstGeom prst="rect">
+              <a:avLst/>
+            </a:prstGeom>
+            <a:ln>
+              <a:noFill/>
+            </a:ln>
+          </p:spPr>
+          <p:txBody>
+            <a:bodyPr wrap="none" lIns="91440" tIns="45720" rIns="91440" bIns="45720">
+              <a:spAutoFit/>
+            </a:bodyPr>
+            <a:lstStyle/>
+            <a:p>
+              <a:r>
+                <a:rPr lang="en-US" sz="900" dirty="0" smtClean="0">
+                  <a:solidFill>
+                    <a:srgbClr val="0070C0"/>
+                  </a:solidFill>
+                </a:rPr>
+                <a:t>deletion</a:t>
+              </a:r>
+              <a:endParaRPr lang="en-US" sz="900" dirty="0">
+                <a:solidFill>
+                  <a:srgbClr val="0070C0"/>
+                </a:solidFill>
+              </a:endParaRPr>
+            </a:p>
+            <a:p>
+              <a:r>
+                <a:rPr lang="en-US" sz="900" dirty="0">
+                  <a:solidFill>
+                    <a:srgbClr val="0070C0"/>
+                  </a:solidFill>
+                </a:rPr>
+                <a:t>0,…,*</a:t>
+              </a:r>
+            </a:p>
+          </p:txBody>
+        </p:sp>
         <p:cxnSp>
           <p:nvCxnSpPr>
-            <p:cNvPr id="54" name="Straight Connector 53"/>
+            <p:cNvPr id="46" name="Elbow Connector 45"/>
+            <p:cNvCxnSpPr>
+              <a:stCxn id="53" idx="3"/>
+              <a:endCxn id="40" idx="3"/>
+            </p:cNvCxnSpPr>
+            <p:nvPr/>
+          </p:nvCxnSpPr>
+          <p:spPr>
+            <a:xfrm flipV="1">
+              <a:off x="1941463" y="567948"/>
+              <a:ext cx="1756002" cy="1357024"/>
+            </a:xfrm>
+            <a:prstGeom prst="bentConnector2">
+              <a:avLst/>
+            </a:prstGeom>
+            <a:ln w="6350">
+              <a:solidFill>
+                <a:srgbClr val="0070C0"/>
+              </a:solidFill>
+            </a:ln>
+          </p:spPr>
+          <p:style>
+            <a:lnRef idx="1">
+              <a:schemeClr val="accent1"/>
+            </a:lnRef>
+            <a:fillRef idx="0">
+              <a:schemeClr val="accent1"/>
+            </a:fillRef>
+            <a:effectRef idx="0">
+              <a:schemeClr val="accent1"/>
+            </a:effectRef>
+            <a:fontRef idx="minor">
+              <a:schemeClr val="tx1"/>
+            </a:fontRef>
+          </p:style>
+        </p:cxnSp>
+        <p:cxnSp>
+          <p:nvCxnSpPr>
+            <p:cNvPr id="47" name="Elbow Connector 46"/>
+            <p:cNvCxnSpPr>
+              <a:stCxn id="55" idx="3"/>
+              <a:endCxn id="40" idx="3"/>
+            </p:cNvCxnSpPr>
+            <p:nvPr/>
+          </p:nvCxnSpPr>
+          <p:spPr>
+            <a:xfrm flipV="1">
+              <a:off x="3432353" y="567948"/>
+              <a:ext cx="265112" cy="2572133"/>
+            </a:xfrm>
+            <a:prstGeom prst="bentConnector2">
+              <a:avLst/>
+            </a:prstGeom>
+            <a:ln w="6350">
+              <a:solidFill>
+                <a:srgbClr val="0070C0"/>
+              </a:solidFill>
+            </a:ln>
+          </p:spPr>
+          <p:style>
+            <a:lnRef idx="1">
+              <a:schemeClr val="accent1"/>
+            </a:lnRef>
+            <a:fillRef idx="0">
+              <a:schemeClr val="accent1"/>
+            </a:fillRef>
+            <a:effectRef idx="0">
+              <a:schemeClr val="accent1"/>
+            </a:effectRef>
+            <a:fontRef idx="minor">
+              <a:schemeClr val="tx1"/>
+            </a:fontRef>
+          </p:style>
+        </p:cxnSp>
+        <p:grpSp>
+          <p:nvGrpSpPr>
+            <p:cNvPr id="48" name="Group 47"/>
+            <p:cNvGrpSpPr/>
+            <p:nvPr/>
+          </p:nvGrpSpPr>
+          <p:grpSpPr>
+            <a:xfrm>
+              <a:off x="155210" y="2662646"/>
+              <a:ext cx="1489673" cy="459579"/>
+              <a:chOff x="162625" y="2625999"/>
+              <a:chExt cx="1489673" cy="459579"/>
+            </a:xfrm>
+          </p:grpSpPr>
+          <p:sp>
+            <p:nvSpPr>
+              <p:cNvPr id="49" name="Rectangle 48"/>
+              <p:cNvSpPr/>
+              <p:nvPr/>
+            </p:nvSpPr>
+            <p:spPr>
+              <a:xfrm>
+                <a:off x="195272" y="2625999"/>
+                <a:ext cx="1457026" cy="304800"/>
+              </a:xfrm>
+              <a:prstGeom prst="rect">
+                <a:avLst/>
+              </a:prstGeom>
+              <a:noFill/>
+              <a:ln w="6350">
+                <a:solidFill>
+                  <a:srgbClr val="0070C0"/>
+                </a:solidFill>
+              </a:ln>
+            </p:spPr>
+            <p:style>
+              <a:lnRef idx="2">
+                <a:schemeClr val="accent1">
+                  <a:shade val="50000"/>
+                </a:schemeClr>
+              </a:lnRef>
+              <a:fillRef idx="1">
+                <a:schemeClr val="accent1"/>
+              </a:fillRef>
+              <a:effectRef idx="0">
+                <a:schemeClr val="accent1"/>
+              </a:effectRef>
+              <a:fontRef idx="minor">
+                <a:schemeClr val="lt1"/>
+              </a:fontRef>
+            </p:style>
+            <p:txBody>
+              <a:bodyPr lIns="91440" tIns="45720" rIns="91440" bIns="45720" spcCol="0" rtlCol="0" anchor="ctr"/>
+              <a:lstStyle/>
+              <a:p>
+                <a:pPr algn="ctr"/>
+                <a:r>
+                  <a:rPr lang="en-US" sz="1100" b="1" dirty="0" err="1" smtClean="0">
+                    <a:solidFill>
+                      <a:srgbClr val="0070C0"/>
+                    </a:solidFill>
+                  </a:rPr>
+                  <a:t>ListOfDeletions</a:t>
+                </a:r>
+                <a:endParaRPr lang="en-US" sz="1100" b="1" dirty="0">
+                  <a:solidFill>
+                    <a:srgbClr val="0070C0"/>
+                  </a:solidFill>
+                </a:endParaRPr>
+              </a:p>
+            </p:txBody>
+          </p:sp>
+          <p:sp>
+            <p:nvSpPr>
+              <p:cNvPr id="50" name="Diamond 49"/>
+              <p:cNvSpPr/>
+              <p:nvPr/>
+            </p:nvSpPr>
+            <p:spPr>
+              <a:xfrm>
+                <a:off x="162625" y="2933180"/>
+                <a:ext cx="66869" cy="152398"/>
+              </a:xfrm>
+              <a:prstGeom prst="diamond">
+                <a:avLst/>
+              </a:prstGeom>
+              <a:solidFill>
+                <a:srgbClr val="0070C0"/>
+              </a:solidFill>
+              <a:ln w="6350">
+                <a:solidFill>
+                  <a:srgbClr val="0070C0"/>
+                </a:solidFill>
+              </a:ln>
+            </p:spPr>
+            <p:style>
+              <a:lnRef idx="2">
+                <a:schemeClr val="accent1">
+                  <a:shade val="50000"/>
+                </a:schemeClr>
+              </a:lnRef>
+              <a:fillRef idx="1">
+                <a:schemeClr val="accent1"/>
+              </a:fillRef>
+              <a:effectRef idx="0">
+                <a:schemeClr val="accent1"/>
+              </a:effectRef>
+              <a:fontRef idx="minor">
+                <a:schemeClr val="lt1"/>
+              </a:fontRef>
+            </p:style>
+            <p:txBody>
+              <a:bodyPr lIns="91440" tIns="45720" rIns="91440" bIns="45720" spcCol="0" rtlCol="0" anchor="ctr"/>
+              <a:lstStyle/>
+              <a:p>
+                <a:pPr algn="ctr"/>
+                <a:endParaRPr lang="en-US">
+                  <a:solidFill>
+                    <a:srgbClr val="0070C0"/>
+                  </a:solidFill>
+                </a:endParaRPr>
+              </a:p>
+            </p:txBody>
+          </p:sp>
+        </p:grpSp>
+        <p:cxnSp>
+          <p:nvCxnSpPr>
+            <p:cNvPr id="51" name="Elbow Connector 50"/>
+            <p:cNvCxnSpPr>
+              <a:stCxn id="33" idx="3"/>
+              <a:endCxn id="40" idx="3"/>
+            </p:cNvCxnSpPr>
+            <p:nvPr/>
+          </p:nvCxnSpPr>
+          <p:spPr>
+            <a:xfrm flipV="1">
+              <a:off x="2855977" y="567948"/>
+              <a:ext cx="841488" cy="103804"/>
+            </a:xfrm>
+            <a:prstGeom prst="bentConnector2">
+              <a:avLst/>
+            </a:prstGeom>
+            <a:ln w="6350">
+              <a:solidFill>
+                <a:srgbClr val="0070C0"/>
+              </a:solidFill>
+            </a:ln>
+          </p:spPr>
+          <p:style>
+            <a:lnRef idx="1">
+              <a:schemeClr val="accent1"/>
+            </a:lnRef>
+            <a:fillRef idx="0">
+              <a:schemeClr val="accent1"/>
+            </a:fillRef>
+            <a:effectRef idx="0">
+              <a:schemeClr val="accent1"/>
+            </a:effectRef>
+            <a:fontRef idx="minor">
+              <a:schemeClr val="tx1"/>
+            </a:fontRef>
+          </p:style>
+        </p:cxnSp>
+        <p:grpSp>
+          <p:nvGrpSpPr>
+            <p:cNvPr id="52" name="Group 51"/>
+            <p:cNvGrpSpPr/>
+            <p:nvPr/>
+          </p:nvGrpSpPr>
+          <p:grpSpPr>
+            <a:xfrm>
+              <a:off x="187857" y="1588422"/>
+              <a:ext cx="1753606" cy="673100"/>
+              <a:chOff x="195272" y="1551775"/>
+              <a:chExt cx="1753606" cy="673100"/>
+            </a:xfrm>
+          </p:grpSpPr>
+          <p:sp>
+            <p:nvSpPr>
+              <p:cNvPr id="53" name="Rectangle 52"/>
+              <p:cNvSpPr/>
+              <p:nvPr/>
+            </p:nvSpPr>
+            <p:spPr>
+              <a:xfrm>
+                <a:off x="195272" y="1551775"/>
+                <a:ext cx="1753606" cy="673100"/>
+              </a:xfrm>
+              <a:prstGeom prst="rect">
+                <a:avLst/>
+              </a:prstGeom>
+              <a:noFill/>
+              <a:ln w="6350">
+                <a:solidFill>
+                  <a:srgbClr val="0070C0"/>
+                </a:solidFill>
+              </a:ln>
+            </p:spPr>
+            <p:style>
+              <a:lnRef idx="2">
+                <a:schemeClr val="accent1">
+                  <a:shade val="50000"/>
+                </a:schemeClr>
+              </a:lnRef>
+              <a:fillRef idx="1">
+                <a:schemeClr val="accent1"/>
+              </a:fillRef>
+              <a:effectRef idx="0">
+                <a:schemeClr val="accent1"/>
+              </a:effectRef>
+              <a:fontRef idx="minor">
+                <a:schemeClr val="lt1"/>
+              </a:fontRef>
+            </p:style>
+            <p:txBody>
+              <a:bodyPr lIns="91440" tIns="45720" rIns="91440" bIns="45720" spcCol="0" rtlCol="0" anchor="t"/>
+              <a:lstStyle/>
+              <a:p>
+                <a:pPr algn="ctr"/>
+                <a:r>
+                  <a:rPr lang="en-US" sz="1100" b="1" dirty="0" err="1" smtClean="0">
+                    <a:solidFill>
+                      <a:srgbClr val="0070C0"/>
+                    </a:solidFill>
+                  </a:rPr>
+                  <a:t>ModelRef</a:t>
+                </a:r>
+                <a:endParaRPr lang="en-US" sz="1100" b="1" dirty="0" smtClean="0">
+                  <a:solidFill>
+                    <a:srgbClr val="0070C0"/>
+                  </a:solidFill>
+                </a:endParaRPr>
+              </a:p>
+              <a:p>
+                <a:r>
+                  <a:rPr lang="en-US" sz="900" dirty="0" smtClean="0">
+                    <a:solidFill>
+                      <a:srgbClr val="0070C0"/>
+                    </a:solidFill>
+                  </a:rPr>
+                  <a:t>model: </a:t>
+                </a:r>
+                <a:r>
+                  <a:rPr lang="en-US" sz="900" dirty="0" err="1" smtClean="0">
+                    <a:solidFill>
+                      <a:srgbClr val="0070C0"/>
+                    </a:solidFill>
+                  </a:rPr>
+                  <a:t>SIdRef</a:t>
+                </a:r>
+                <a:r>
+                  <a:rPr lang="en-US" sz="900" dirty="0" smtClean="0">
+                    <a:solidFill>
+                      <a:srgbClr val="0070C0"/>
+                    </a:solidFill>
+                  </a:rPr>
+                  <a:t> {use=“optional”}</a:t>
+                </a:r>
+              </a:p>
+              <a:p>
+                <a:r>
+                  <a:rPr lang="en-US" sz="900" dirty="0" err="1" smtClean="0">
+                    <a:solidFill>
+                      <a:srgbClr val="0070C0"/>
+                    </a:solidFill>
+                  </a:rPr>
+                  <a:t>xlink:href</a:t>
+                </a:r>
+                <a:r>
+                  <a:rPr lang="en-US" sz="900" dirty="0" smtClean="0">
+                    <a:solidFill>
+                      <a:srgbClr val="0070C0"/>
+                    </a:solidFill>
+                  </a:rPr>
+                  <a:t>: string {use=“optional”}</a:t>
+                </a:r>
+              </a:p>
+              <a:p>
+                <a:r>
+                  <a:rPr lang="en-US" sz="900" dirty="0" smtClean="0">
+                    <a:solidFill>
+                      <a:srgbClr val="0070C0"/>
+                    </a:solidFill>
+                  </a:rPr>
+                  <a:t>md5: string {use=“optional”}</a:t>
+                </a:r>
+                <a:endParaRPr lang="en-US" sz="900" dirty="0">
+                  <a:solidFill>
+                    <a:srgbClr val="0070C0"/>
+                  </a:solidFill>
+                </a:endParaRPr>
+              </a:p>
+            </p:txBody>
+          </p:sp>
+          <p:cxnSp>
+            <p:nvCxnSpPr>
+              <p:cNvPr id="54" name="Straight Connector 53"/>
+              <p:cNvCxnSpPr/>
+              <p:nvPr/>
+            </p:nvCxnSpPr>
+            <p:spPr>
+              <a:xfrm>
+                <a:off x="201406" y="1731911"/>
+                <a:ext cx="1747472" cy="0"/>
+              </a:xfrm>
+              <a:prstGeom prst="line">
+                <a:avLst/>
+              </a:prstGeom>
+              <a:ln w="6350">
+                <a:solidFill>
+                  <a:srgbClr val="0070C0"/>
+                </a:solidFill>
+              </a:ln>
+            </p:spPr>
+            <p:style>
+              <a:lnRef idx="1">
+                <a:schemeClr val="accent1"/>
+              </a:lnRef>
+              <a:fillRef idx="0">
+                <a:schemeClr val="accent1"/>
+              </a:fillRef>
+              <a:effectRef idx="0">
+                <a:schemeClr val="accent1"/>
+              </a:effectRef>
+              <a:fontRef idx="minor">
+                <a:schemeClr val="tx1"/>
+              </a:fontRef>
+            </p:style>
+          </p:cxnSp>
+        </p:grpSp>
+        <p:sp>
+          <p:nvSpPr>
+            <p:cNvPr id="55" name="Rectangle 54"/>
+            <p:cNvSpPr/>
+            <p:nvPr/>
+          </p:nvSpPr>
+          <p:spPr>
+            <a:xfrm>
+              <a:off x="2482372" y="2987681"/>
+              <a:ext cx="949981" cy="304800"/>
+            </a:xfrm>
+            <a:prstGeom prst="rect">
+              <a:avLst/>
+            </a:prstGeom>
+            <a:noFill/>
+            <a:ln w="6350">
+              <a:solidFill>
+                <a:srgbClr val="0070C0"/>
+              </a:solidFill>
+            </a:ln>
+          </p:spPr>
+          <p:style>
+            <a:lnRef idx="2">
+              <a:schemeClr val="accent1">
+                <a:shade val="50000"/>
+              </a:schemeClr>
+            </a:lnRef>
+            <a:fillRef idx="1">
+              <a:schemeClr val="accent1"/>
+            </a:fillRef>
+            <a:effectRef idx="0">
+              <a:schemeClr val="accent1"/>
+            </a:effectRef>
+            <a:fontRef idx="minor">
+              <a:schemeClr val="lt1"/>
+            </a:fontRef>
+          </p:style>
+          <p:txBody>
+            <a:bodyPr lIns="91440" tIns="45720" rIns="91440" bIns="45720" spcCol="0" rtlCol="0" anchor="ctr"/>
+            <a:lstStyle/>
+            <a:p>
+              <a:pPr algn="ctr"/>
+              <a:r>
+                <a:rPr lang="en-US" sz="1100" b="1" dirty="0" err="1" smtClean="0">
+                  <a:solidFill>
+                    <a:srgbClr val="0070C0"/>
+                  </a:solidFill>
+                </a:rPr>
+                <a:t>Subelement</a:t>
+              </a:r>
+              <a:endParaRPr lang="en-US" sz="1100" b="1" dirty="0">
+                <a:solidFill>
+                  <a:srgbClr val="0070C0"/>
+                </a:solidFill>
+              </a:endParaRPr>
+            </a:p>
+          </p:txBody>
+        </p:sp>
+        <p:sp>
+          <p:nvSpPr>
+            <p:cNvPr id="56" name="Isosceles Triangle 55"/>
+            <p:cNvSpPr/>
+            <p:nvPr/>
+          </p:nvSpPr>
+          <p:spPr>
+            <a:xfrm>
+              <a:off x="2877762" y="3292481"/>
+              <a:ext cx="159199" cy="114300"/>
+            </a:xfrm>
+            <a:prstGeom prst="triangle">
+              <a:avLst/>
+            </a:prstGeom>
+            <a:noFill/>
+            <a:ln w="6350">
+              <a:solidFill>
+                <a:srgbClr val="0070C0"/>
+              </a:solidFill>
+            </a:ln>
+          </p:spPr>
+          <p:style>
+            <a:lnRef idx="2">
+              <a:schemeClr val="accent1">
+                <a:shade val="50000"/>
+              </a:schemeClr>
+            </a:lnRef>
+            <a:fillRef idx="1">
+              <a:schemeClr val="accent1"/>
+            </a:fillRef>
+            <a:effectRef idx="0">
+              <a:schemeClr val="accent1"/>
+            </a:effectRef>
+            <a:fontRef idx="minor">
+              <a:schemeClr val="lt1"/>
+            </a:fontRef>
+          </p:style>
+          <p:txBody>
+            <a:bodyPr lIns="91440" tIns="45720" rIns="91440" bIns="45720" spcCol="0" rtlCol="0" anchor="ctr"/>
+            <a:lstStyle/>
+            <a:p>
+              <a:pPr algn="ctr"/>
+              <a:endParaRPr lang="en-US" sz="1100" b="1" dirty="0">
+                <a:solidFill>
+                  <a:srgbClr val="0070C0"/>
+                </a:solidFill>
+              </a:endParaRPr>
+            </a:p>
+          </p:txBody>
+        </p:sp>
+        <p:cxnSp>
+          <p:nvCxnSpPr>
+            <p:cNvPr id="57" name="Elbow Connector 56"/>
+            <p:cNvCxnSpPr>
+              <a:stCxn id="44" idx="3"/>
+              <a:endCxn id="56" idx="3"/>
+            </p:cNvCxnSpPr>
+            <p:nvPr/>
+          </p:nvCxnSpPr>
+          <p:spPr>
+            <a:xfrm flipV="1">
+              <a:off x="2027790" y="3406781"/>
+              <a:ext cx="929572" cy="233887"/>
+            </a:xfrm>
+            <a:prstGeom prst="bentConnector2">
+              <a:avLst/>
+            </a:prstGeom>
+            <a:ln w="6350">
+              <a:solidFill>
+                <a:srgbClr val="0070C0"/>
+              </a:solidFill>
+            </a:ln>
+          </p:spPr>
+          <p:style>
+            <a:lnRef idx="1">
+              <a:schemeClr val="accent1"/>
+            </a:lnRef>
+            <a:fillRef idx="0">
+              <a:schemeClr val="accent1"/>
+            </a:fillRef>
+            <a:effectRef idx="0">
+              <a:schemeClr val="accent1"/>
+            </a:effectRef>
+            <a:fontRef idx="minor">
+              <a:schemeClr val="tx1"/>
+            </a:fontRef>
+          </p:style>
+        </p:cxnSp>
+        <p:cxnSp>
+          <p:nvCxnSpPr>
+            <p:cNvPr id="60" name="Straight Connector 59"/>
             <p:cNvCxnSpPr/>
             <p:nvPr/>
           </p:nvCxnSpPr>
           <p:spPr>
             <a:xfrm>
-              <a:off x="201406" y="1731911"/>
-              <a:ext cx="1747472" cy="0"/>
+              <a:off x="378821" y="3594947"/>
+              <a:ext cx="1648969" cy="0"/>
             </a:xfrm>
             <a:prstGeom prst="line">
               <a:avLst/>
@@ -4839,187 +5022,6 @@
           </p:style>
         </p:cxnSp>
       </p:grpSp>
-      <p:sp>
-        <p:nvSpPr>
-          <p:cNvPr id="55" name="Rectangle 54"/>
-          <p:cNvSpPr/>
-          <p:nvPr/>
-        </p:nvSpPr>
-        <p:spPr>
-          <a:xfrm>
-            <a:off x="2482372" y="2987681"/>
-            <a:ext cx="949981" cy="304800"/>
-          </a:xfrm>
-          <a:prstGeom prst="rect">
-            <a:avLst/>
-          </a:prstGeom>
-          <a:noFill/>
-          <a:ln w="6350">
-            <a:solidFill>
-              <a:srgbClr val="0070C0"/>
-            </a:solidFill>
-          </a:ln>
-        </p:spPr>
-        <p:style>
-          <a:lnRef idx="2">
-            <a:schemeClr val="accent1">
-              <a:shade val="50000"/>
-            </a:schemeClr>
-          </a:lnRef>
-          <a:fillRef idx="1">
-            <a:schemeClr val="accent1"/>
-          </a:fillRef>
-          <a:effectRef idx="0">
-            <a:schemeClr val="accent1"/>
-          </a:effectRef>
-          <a:fontRef idx="minor">
-            <a:schemeClr val="lt1"/>
-          </a:fontRef>
-        </p:style>
-        <p:txBody>
-          <a:bodyPr lIns="91440" tIns="45720" rIns="91440" bIns="45720" spcCol="0" rtlCol="0" anchor="ctr"/>
-          <a:lstStyle/>
-          <a:p>
-            <a:pPr algn="ctr"/>
-            <a:r>
-              <a:rPr lang="en-US" sz="1100" b="1" dirty="0" err="1" smtClean="0">
-                <a:solidFill>
-                  <a:srgbClr val="0070C0"/>
-                </a:solidFill>
-              </a:rPr>
-              <a:t>Subelement</a:t>
-            </a:r>
-            <a:endParaRPr lang="en-US" sz="1100" b="1" dirty="0">
-              <a:solidFill>
-                <a:srgbClr val="0070C0"/>
-              </a:solidFill>
-            </a:endParaRPr>
-          </a:p>
-        </p:txBody>
-      </p:sp>
-      <p:sp>
-        <p:nvSpPr>
-          <p:cNvPr id="56" name="Isosceles Triangle 55"/>
-          <p:cNvSpPr/>
-          <p:nvPr/>
-        </p:nvSpPr>
-        <p:spPr>
-          <a:xfrm>
-            <a:off x="2877762" y="3292481"/>
-            <a:ext cx="159199" cy="114300"/>
-          </a:xfrm>
-          <a:prstGeom prst="triangle">
-            <a:avLst/>
-          </a:prstGeom>
-          <a:noFill/>
-          <a:ln w="6350">
-            <a:solidFill>
-              <a:srgbClr val="0070C0"/>
-            </a:solidFill>
-          </a:ln>
-        </p:spPr>
-        <p:style>
-          <a:lnRef idx="2">
-            <a:schemeClr val="accent1">
-              <a:shade val="50000"/>
-            </a:schemeClr>
-          </a:lnRef>
-          <a:fillRef idx="1">
-            <a:schemeClr val="accent1"/>
-          </a:fillRef>
-          <a:effectRef idx="0">
-            <a:schemeClr val="accent1"/>
-          </a:effectRef>
-          <a:fontRef idx="minor">
-            <a:schemeClr val="lt1"/>
-          </a:fontRef>
-        </p:style>
-        <p:txBody>
-          <a:bodyPr lIns="91440" tIns="45720" rIns="91440" bIns="45720" spcCol="0" rtlCol="0" anchor="ctr"/>
-          <a:lstStyle/>
-          <a:p>
-            <a:pPr algn="ctr"/>
-            <a:endParaRPr lang="en-US" sz="1100" b="1" dirty="0">
-              <a:solidFill>
-                <a:srgbClr val="0070C0"/>
-              </a:solidFill>
-            </a:endParaRPr>
-          </a:p>
-        </p:txBody>
-      </p:sp>
-      <p:cxnSp>
-        <p:nvCxnSpPr>
-          <p:cNvPr id="57" name="Elbow Connector 56"/>
-          <p:cNvCxnSpPr>
-            <a:stCxn id="44" idx="3"/>
-            <a:endCxn id="56" idx="3"/>
-          </p:cNvCxnSpPr>
-          <p:nvPr/>
-        </p:nvCxnSpPr>
-        <p:spPr>
-          <a:xfrm flipV="1">
-            <a:off x="2027790" y="3406781"/>
-            <a:ext cx="929572" cy="233887"/>
-          </a:xfrm>
-          <a:prstGeom prst="bentConnector2">
-            <a:avLst/>
-          </a:prstGeom>
-          <a:ln w="6350">
-            <a:solidFill>
-              <a:srgbClr val="0070C0"/>
-            </a:solidFill>
-          </a:ln>
-        </p:spPr>
-        <p:style>
-          <a:lnRef idx="1">
-            <a:schemeClr val="accent1"/>
-          </a:lnRef>
-          <a:fillRef idx="0">
-            <a:schemeClr val="accent1"/>
-          </a:fillRef>
-          <a:effectRef idx="0">
-            <a:schemeClr val="accent1"/>
-          </a:effectRef>
-          <a:fontRef idx="minor">
-            <a:schemeClr val="tx1"/>
-          </a:fontRef>
-        </p:style>
-      </p:cxnSp>
-      <p:cxnSp>
-        <p:nvCxnSpPr>
-          <p:cNvPr id="60" name="Straight Connector 59"/>
-          <p:cNvCxnSpPr/>
-          <p:nvPr/>
-        </p:nvCxnSpPr>
-        <p:spPr>
-          <a:xfrm>
-            <a:off x="378821" y="3594947"/>
-            <a:ext cx="1648969" cy="0"/>
-          </a:xfrm>
-          <a:prstGeom prst="line">
-            <a:avLst/>
-          </a:prstGeom>
-          <a:ln w="6350">
-            <a:solidFill>
-              <a:srgbClr val="0070C0"/>
-            </a:solidFill>
-          </a:ln>
-        </p:spPr>
-        <p:style>
-          <a:lnRef idx="1">
-            <a:schemeClr val="accent1"/>
-          </a:lnRef>
-          <a:fillRef idx="0">
-            <a:schemeClr val="accent1"/>
-          </a:fillRef>
-          <a:effectRef idx="0">
-            <a:schemeClr val="accent1"/>
-          </a:effectRef>
-          <a:fontRef idx="minor">
-            <a:schemeClr val="tx1"/>
-          </a:fontRef>
-        </p:style>
-      </p:cxnSp>
     </p:spTree>
     <p:extLst>
       <p:ext uri="{BB962C8B-B14F-4D97-AF65-F5344CB8AC3E}">

</xml_diff>